<commit_message>
Bitnami Bilder für die Anleitung hinzugefügt und Präsentation upgedated
</commit_message>
<xml_diff>
--- a/wordpress-portfolio-website-presentation.pptx
+++ b/wordpress-portfolio-website-presentation.pptx
@@ -1,23 +1,31 @@
 
 <file path=ppt/presentation.xml><?xml version="1.0" encoding="utf-8"?>
-<p:presentation xmlns:a="http://schemas.openxmlformats.org/drawingml/2006/main" xmlns:r="http://schemas.openxmlformats.org/officeDocument/2006/relationships" xmlns:p="http://schemas.openxmlformats.org/presentationml/2006/main" saveSubsetFonts="1">
+<p:presentation xmlns:a="http://schemas.openxmlformats.org/drawingml/2006/main" xmlns:r="http://schemas.openxmlformats.org/officeDocument/2006/relationships" xmlns:p="http://schemas.openxmlformats.org/presentationml/2006/main" showSpecialPlsOnTitleSld="0" saveSubsetFonts="1">
   <p:sldMasterIdLst>
     <p:sldMasterId id="2147483648" r:id="rId1"/>
   </p:sldMasterIdLst>
+  <p:notesMasterIdLst>
+    <p:notesMasterId r:id="rId20"/>
+  </p:notesMasterIdLst>
   <p:sldIdLst>
     <p:sldId id="256" r:id="rId2"/>
-    <p:sldId id="262" r:id="rId3"/>
-    <p:sldId id="269" r:id="rId4"/>
-    <p:sldId id="260" r:id="rId5"/>
-    <p:sldId id="257" r:id="rId6"/>
-    <p:sldId id="259" r:id="rId7"/>
-    <p:sldId id="258" r:id="rId8"/>
-    <p:sldId id="261" r:id="rId9"/>
-    <p:sldId id="263" r:id="rId10"/>
-    <p:sldId id="264" r:id="rId11"/>
-    <p:sldId id="266" r:id="rId12"/>
-    <p:sldId id="267" r:id="rId13"/>
-    <p:sldId id="268" r:id="rId14"/>
+    <p:sldId id="272" r:id="rId3"/>
+    <p:sldId id="262" r:id="rId4"/>
+    <p:sldId id="269" r:id="rId5"/>
+    <p:sldId id="260" r:id="rId6"/>
+    <p:sldId id="257" r:id="rId7"/>
+    <p:sldId id="259" r:id="rId8"/>
+    <p:sldId id="258" r:id="rId9"/>
+    <p:sldId id="261" r:id="rId10"/>
+    <p:sldId id="263" r:id="rId11"/>
+    <p:sldId id="264" r:id="rId12"/>
+    <p:sldId id="273" r:id="rId13"/>
+    <p:sldId id="266" r:id="rId14"/>
+    <p:sldId id="267" r:id="rId15"/>
+    <p:sldId id="268" r:id="rId16"/>
+    <p:sldId id="270" r:id="rId17"/>
+    <p:sldId id="271" r:id="rId18"/>
+    <p:sldId id="274" r:id="rId19"/>
   </p:sldIdLst>
   <p:sldSz cx="12192000" cy="6858000"/>
   <p:notesSz cx="6858000" cy="9144000"/>
@@ -3142,6 +3150,17 @@
               <a:latin typeface="Avenir Next LT Pro Light" panose="020B0304020202020204" pitchFamily="34" charset="0"/>
             </a:rPr>
             <a:t>Digitaler Fußabdruck</a:t>
+          </a:r>
+          <a:br>
+            <a:rPr lang="de-DE" dirty="0">
+              <a:latin typeface="Avenir Next LT Pro Light" panose="020B0304020202020204" pitchFamily="34" charset="0"/>
+            </a:rPr>
+          </a:br>
+          <a:r>
+            <a:rPr lang="de-DE" dirty="0">
+              <a:latin typeface="Avenir Next LT Pro Light" panose="020B0304020202020204" pitchFamily="34" charset="0"/>
+            </a:rPr>
+            <a:t>(Visitenkarte)</a:t>
           </a:r>
           <a:endParaRPr lang="en-US" dirty="0">
             <a:latin typeface="Avenir Next LT Pro Light" panose="020B0304020202020204" pitchFamily="34" charset="0"/>
@@ -4672,10 +4691,14 @@
         <a:lstStyle/>
         <a:p>
           <a:r>
-            <a:rPr lang="de-DE" dirty="0"/>
-            <a:t>Option 2</a:t>
+            <a:rPr lang="de-DE" dirty="0">
+              <a:latin typeface="Avenir Next LT Pro Light" panose="020B0304020202020204" pitchFamily="34" charset="0"/>
+            </a:rPr>
+            <a:t>Option 1</a:t>
           </a:r>
-          <a:endParaRPr lang="en-US" dirty="0"/>
+          <a:endParaRPr lang="en-US" dirty="0">
+            <a:latin typeface="Avenir Next LT Pro Light" panose="020B0304020202020204" pitchFamily="34" charset="0"/>
+          </a:endParaRPr>
         </a:p>
       </dgm:t>
     </dgm:pt>
@@ -4686,7 +4709,9 @@
         <a:bodyPr/>
         <a:lstStyle/>
         <a:p>
-          <a:endParaRPr lang="en-US"/>
+          <a:endParaRPr lang="en-US">
+            <a:latin typeface="Avenir Next LT Pro Light" panose="020B0304020202020204" pitchFamily="34" charset="0"/>
+          </a:endParaRPr>
         </a:p>
       </dgm:t>
     </dgm:pt>
@@ -4697,7 +4722,9 @@
         <a:bodyPr/>
         <a:lstStyle/>
         <a:p>
-          <a:endParaRPr lang="en-US"/>
+          <a:endParaRPr lang="en-US">
+            <a:latin typeface="Avenir Next LT Pro Light" panose="020B0304020202020204" pitchFamily="34" charset="0"/>
+          </a:endParaRPr>
         </a:p>
       </dgm:t>
     </dgm:pt>
@@ -4711,15 +4738,17 @@
           <a:r>
             <a:rPr lang="de-DE" dirty="0">
               <a:solidFill>
-                <a:srgbClr val="00B050"/>
+                <a:srgbClr val="FFFF00"/>
               </a:solidFill>
+              <a:latin typeface="Avenir Next LT Pro Light" panose="020B0304020202020204" pitchFamily="34" charset="0"/>
             </a:rPr>
-            <a:t>Empfehlung</a:t>
+            <a:t>Keine Empfehlung (nur wenn eine Domain keinen Sinn ergibt)!</a:t>
           </a:r>
           <a:endParaRPr lang="en-US" dirty="0">
             <a:solidFill>
-              <a:srgbClr val="00B050"/>
+              <a:srgbClr val="FFFF00"/>
             </a:solidFill>
+            <a:latin typeface="Avenir Next LT Pro Light" panose="020B0304020202020204" pitchFamily="34" charset="0"/>
           </a:endParaRPr>
         </a:p>
       </dgm:t>
@@ -4731,7 +4760,9 @@
         <a:bodyPr/>
         <a:lstStyle/>
         <a:p>
-          <a:endParaRPr lang="en-US"/>
+          <a:endParaRPr lang="en-US">
+            <a:latin typeface="Avenir Next LT Pro Light" panose="020B0304020202020204" pitchFamily="34" charset="0"/>
+          </a:endParaRPr>
         </a:p>
       </dgm:t>
     </dgm:pt>
@@ -4742,7 +4773,9 @@
         <a:bodyPr/>
         <a:lstStyle/>
         <a:p>
-          <a:endParaRPr lang="en-US"/>
+          <a:endParaRPr lang="en-US">
+            <a:latin typeface="Avenir Next LT Pro Light" panose="020B0304020202020204" pitchFamily="34" charset="0"/>
+          </a:endParaRPr>
         </a:p>
       </dgm:t>
     </dgm:pt>
@@ -4761,6 +4794,7 @@
                   <a:lumOff val="15000"/>
                 </a:schemeClr>
               </a:solidFill>
+              <a:latin typeface="Avenir Next LT Pro Light" panose="020B0304020202020204" pitchFamily="34" charset="0"/>
               <a:hlinkClick xmlns:r="http://schemas.openxmlformats.org/officeDocument/2006/relationships" r:id="rId1">
                 <a:extLst>
                   <a:ext uri="{A12FA001-AC4F-418D-AE19-62706E023703}">
@@ -4769,7 +4803,7 @@
                 </a:extLst>
               </a:hlinkClick>
             </a:rPr>
-            <a:t>https://github.com/maximotus/skill-saturday-wordpress-portfolio-website/wiki/Option-2</a:t>
+            <a:t>https://github.com/maximotus/skill-saturday-wordpress-portfolio-website/wiki/Option-1</a:t>
           </a:r>
           <a:endParaRPr lang="en-US" dirty="0">
             <a:solidFill>
@@ -4778,6 +4812,7 @@
                 <a:lumOff val="15000"/>
               </a:schemeClr>
             </a:solidFill>
+            <a:latin typeface="Avenir Next LT Pro Light" panose="020B0304020202020204" pitchFamily="34" charset="0"/>
           </a:endParaRPr>
         </a:p>
       </dgm:t>
@@ -4789,7 +4824,9 @@
         <a:bodyPr/>
         <a:lstStyle/>
         <a:p>
-          <a:endParaRPr lang="en-US"/>
+          <a:endParaRPr lang="en-US">
+            <a:latin typeface="Avenir Next LT Pro Light" panose="020B0304020202020204" pitchFamily="34" charset="0"/>
+          </a:endParaRPr>
         </a:p>
       </dgm:t>
     </dgm:pt>
@@ -4800,7 +4837,9 @@
         <a:bodyPr/>
         <a:lstStyle/>
         <a:p>
-          <a:endParaRPr lang="en-US"/>
+          <a:endParaRPr lang="en-US">
+            <a:latin typeface="Avenir Next LT Pro Light" panose="020B0304020202020204" pitchFamily="34" charset="0"/>
+          </a:endParaRPr>
         </a:p>
       </dgm:t>
     </dgm:pt>
@@ -4812,10 +4851,14 @@
         <a:lstStyle/>
         <a:p>
           <a:r>
-            <a:rPr lang="de-DE" dirty="0"/>
+            <a:rPr lang="de-DE" dirty="0">
+              <a:latin typeface="Avenir Next LT Pro Light" panose="020B0304020202020204" pitchFamily="34" charset="0"/>
+            </a:rPr>
             <a:t>Option 2</a:t>
           </a:r>
-          <a:endParaRPr lang="en-US" dirty="0"/>
+          <a:endParaRPr lang="en-US" dirty="0">
+            <a:latin typeface="Avenir Next LT Pro Light" panose="020B0304020202020204" pitchFamily="34" charset="0"/>
+          </a:endParaRPr>
         </a:p>
       </dgm:t>
     </dgm:pt>
@@ -4826,7 +4869,9 @@
         <a:bodyPr/>
         <a:lstStyle/>
         <a:p>
-          <a:endParaRPr lang="en-US"/>
+          <a:endParaRPr lang="en-US">
+            <a:latin typeface="Avenir Next LT Pro Light" panose="020B0304020202020204" pitchFamily="34" charset="0"/>
+          </a:endParaRPr>
         </a:p>
       </dgm:t>
     </dgm:pt>
@@ -4837,7 +4882,9 @@
         <a:bodyPr/>
         <a:lstStyle/>
         <a:p>
-          <a:endParaRPr lang="en-US"/>
+          <a:endParaRPr lang="en-US">
+            <a:latin typeface="Avenir Next LT Pro Light" panose="020B0304020202020204" pitchFamily="34" charset="0"/>
+          </a:endParaRPr>
         </a:p>
       </dgm:t>
     </dgm:pt>
@@ -4851,13 +4898,18 @@
           <a:r>
             <a:rPr lang="de-DE" dirty="0">
               <a:solidFill>
-                <a:srgbClr val="FFFF00"/>
+                <a:srgbClr val="00B050"/>
               </a:solidFill>
               <a:latin typeface="Avenir Next LT Pro Light" panose="020B0304020202020204" pitchFamily="34" charset="0"/>
             </a:rPr>
-            <a:t>Keine Empfehlung (es gibt aber eine Anleitung)!</a:t>
+            <a:t>Empfehlung!</a:t>
           </a:r>
-          <a:endParaRPr lang="en-US" dirty="0"/>
+          <a:endParaRPr lang="en-US" dirty="0">
+            <a:solidFill>
+              <a:srgbClr val="00B050"/>
+            </a:solidFill>
+            <a:latin typeface="Avenir Next LT Pro Light" panose="020B0304020202020204" pitchFamily="34" charset="0"/>
+          </a:endParaRPr>
         </a:p>
       </dgm:t>
     </dgm:pt>
@@ -4868,7 +4920,9 @@
         <a:bodyPr/>
         <a:lstStyle/>
         <a:p>
-          <a:endParaRPr lang="en-US"/>
+          <a:endParaRPr lang="en-US">
+            <a:latin typeface="Avenir Next LT Pro Light" panose="020B0304020202020204" pitchFamily="34" charset="0"/>
+          </a:endParaRPr>
         </a:p>
       </dgm:t>
     </dgm:pt>
@@ -4879,7 +4933,9 @@
         <a:bodyPr/>
         <a:lstStyle/>
         <a:p>
-          <a:endParaRPr lang="en-US"/>
+          <a:endParaRPr lang="en-US">
+            <a:latin typeface="Avenir Next LT Pro Light" panose="020B0304020202020204" pitchFamily="34" charset="0"/>
+          </a:endParaRPr>
         </a:p>
       </dgm:t>
     </dgm:pt>
@@ -4898,7 +4954,157 @@
                   <a:lumOff val="15000"/>
                 </a:schemeClr>
               </a:solidFill>
+              <a:latin typeface="Avenir Next LT Pro Light" panose="020B0304020202020204" pitchFamily="34" charset="0"/>
               <a:hlinkClick xmlns:r="http://schemas.openxmlformats.org/officeDocument/2006/relationships" r:id="rId2">
+                <a:extLst>
+                  <a:ext uri="{A12FA001-AC4F-418D-AE19-62706E023703}">
+                    <ahyp:hlinkClr xmlns:ahyp="http://schemas.microsoft.com/office/drawing/2018/hyperlinkcolor" val="tx"/>
+                  </a:ext>
+                </a:extLst>
+              </a:hlinkClick>
+            </a:rPr>
+            <a:t>https://github.com/maximotus/skill-saturday-wordpress-portfolio-website/wiki/Option-2</a:t>
+          </a:r>
+          <a:endParaRPr lang="en-US" dirty="0">
+            <a:solidFill>
+              <a:schemeClr val="tx1">
+                <a:lumMod val="85000"/>
+                <a:lumOff val="15000"/>
+              </a:schemeClr>
+            </a:solidFill>
+            <a:latin typeface="Avenir Next LT Pro Light" panose="020B0304020202020204" pitchFamily="34" charset="0"/>
+          </a:endParaRPr>
+        </a:p>
+      </dgm:t>
+    </dgm:pt>
+    <dgm:pt modelId="{B688070F-38FB-4DAE-8DBF-E040B9B8DCE6}" type="parTrans" cxnId="{CFD273A8-E048-4695-969D-518067520BC5}">
+      <dgm:prSet/>
+      <dgm:spPr/>
+      <dgm:t>
+        <a:bodyPr/>
+        <a:lstStyle/>
+        <a:p>
+          <a:endParaRPr lang="en-US">
+            <a:latin typeface="Avenir Next LT Pro Light" panose="020B0304020202020204" pitchFamily="34" charset="0"/>
+          </a:endParaRPr>
+        </a:p>
+      </dgm:t>
+    </dgm:pt>
+    <dgm:pt modelId="{BCFB4885-78B7-44AD-B2AD-429A34EA38DF}" type="sibTrans" cxnId="{CFD273A8-E048-4695-969D-518067520BC5}">
+      <dgm:prSet/>
+      <dgm:spPr/>
+      <dgm:t>
+        <a:bodyPr/>
+        <a:lstStyle/>
+        <a:p>
+          <a:endParaRPr lang="en-US">
+            <a:latin typeface="Avenir Next LT Pro Light" panose="020B0304020202020204" pitchFamily="34" charset="0"/>
+          </a:endParaRPr>
+        </a:p>
+      </dgm:t>
+    </dgm:pt>
+    <dgm:pt modelId="{43AB12C8-5610-4BDE-AE3D-D10A6CC11934}">
+      <dgm:prSet/>
+      <dgm:spPr/>
+      <dgm:t>
+        <a:bodyPr/>
+        <a:lstStyle/>
+        <a:p>
+          <a:r>
+            <a:rPr lang="de-DE" dirty="0">
+              <a:latin typeface="Avenir Next LT Pro Light" panose="020B0304020202020204" pitchFamily="34" charset="0"/>
+            </a:rPr>
+            <a:t>Option 3</a:t>
+          </a:r>
+          <a:endParaRPr lang="en-US" dirty="0">
+            <a:latin typeface="Avenir Next LT Pro Light" panose="020B0304020202020204" pitchFamily="34" charset="0"/>
+          </a:endParaRPr>
+        </a:p>
+      </dgm:t>
+    </dgm:pt>
+    <dgm:pt modelId="{0D8480C5-6BE9-4A07-A3EA-B9AF786CFFC9}" type="parTrans" cxnId="{F287F846-3F56-4942-BAE7-2772DCB8F2B8}">
+      <dgm:prSet/>
+      <dgm:spPr/>
+      <dgm:t>
+        <a:bodyPr/>
+        <a:lstStyle/>
+        <a:p>
+          <a:endParaRPr lang="en-US"/>
+        </a:p>
+      </dgm:t>
+    </dgm:pt>
+    <dgm:pt modelId="{86BEE249-383E-4F53-A254-034DD3637F3C}" type="sibTrans" cxnId="{F287F846-3F56-4942-BAE7-2772DCB8F2B8}">
+      <dgm:prSet/>
+      <dgm:spPr/>
+      <dgm:t>
+        <a:bodyPr/>
+        <a:lstStyle/>
+        <a:p>
+          <a:endParaRPr lang="en-US"/>
+        </a:p>
+      </dgm:t>
+    </dgm:pt>
+    <dgm:pt modelId="{9A32242B-3EC3-4BBD-B795-8D2D1C2A27B1}">
+      <dgm:prSet/>
+      <dgm:spPr/>
+      <dgm:t>
+        <a:bodyPr/>
+        <a:lstStyle/>
+        <a:p>
+          <a:r>
+            <a:rPr lang="de-DE">
+              <a:solidFill>
+                <a:srgbClr val="FFFF00"/>
+              </a:solidFill>
+              <a:latin typeface="Avenir Next LT Pro Light" panose="020B0304020202020204" pitchFamily="34" charset="0"/>
+            </a:rPr>
+            <a:t>Keine Empfehlung (es gibt aber eine Anleitung)!</a:t>
+          </a:r>
+          <a:endParaRPr lang="en-US" dirty="0">
+            <a:latin typeface="Avenir Next LT Pro Light" panose="020B0304020202020204" pitchFamily="34" charset="0"/>
+          </a:endParaRPr>
+        </a:p>
+      </dgm:t>
+    </dgm:pt>
+    <dgm:pt modelId="{FFBD578B-75ED-4C02-B11B-A96CEC6E4F8E}" type="parTrans" cxnId="{3E0B863B-875C-4BBA-B96D-5637C7FA4A43}">
+      <dgm:prSet/>
+      <dgm:spPr/>
+      <dgm:t>
+        <a:bodyPr/>
+        <a:lstStyle/>
+        <a:p>
+          <a:endParaRPr lang="en-US"/>
+        </a:p>
+      </dgm:t>
+    </dgm:pt>
+    <dgm:pt modelId="{4775DBA1-92CB-4F42-AAFA-60FDA860BECF}" type="sibTrans" cxnId="{3E0B863B-875C-4BBA-B96D-5637C7FA4A43}">
+      <dgm:prSet/>
+      <dgm:spPr/>
+      <dgm:t>
+        <a:bodyPr/>
+        <a:lstStyle/>
+        <a:p>
+          <a:endParaRPr lang="en-US"/>
+        </a:p>
+      </dgm:t>
+    </dgm:pt>
+    <dgm:pt modelId="{4E2A04C8-432F-4A43-8B98-23B295AC1D53}">
+      <dgm:prSet/>
+      <dgm:spPr/>
+      <dgm:t>
+        <a:bodyPr/>
+        <a:lstStyle/>
+        <a:p>
+          <a:r>
+            <a:rPr lang="en-US" dirty="0">
+              <a:solidFill>
+                <a:schemeClr val="tx1">
+                  <a:lumMod val="85000"/>
+                  <a:lumOff val="15000"/>
+                </a:schemeClr>
+              </a:solidFill>
+              <a:latin typeface="Avenir Next LT Pro Light" panose="020B0304020202020204" pitchFamily="34" charset="0"/>
+              <a:hlinkClick xmlns:r="http://schemas.openxmlformats.org/officeDocument/2006/relationships" r:id="rId3">
                 <a:extLst>
                   <a:ext uri="{A12FA001-AC4F-418D-AE19-62706E023703}">
                     <ahyp:hlinkClr xmlns:ahyp="http://schemas.microsoft.com/office/drawing/2018/hyperlinkcolor" val="tx"/>
@@ -4915,11 +5121,12 @@
                 <a:lumOff val="15000"/>
               </a:schemeClr>
             </a:solidFill>
+            <a:latin typeface="Avenir Next LT Pro Light" panose="020B0304020202020204" pitchFamily="34" charset="0"/>
           </a:endParaRPr>
         </a:p>
       </dgm:t>
     </dgm:pt>
-    <dgm:pt modelId="{B688070F-38FB-4DAE-8DBF-E040B9B8DCE6}" type="parTrans" cxnId="{CFD273A8-E048-4695-969D-518067520BC5}">
+    <dgm:pt modelId="{9F526BE9-EF3A-45DC-A8C6-DE989DBDC7AA}" type="parTrans" cxnId="{D980DE9C-7524-4043-87C3-5A21B0C38B77}">
       <dgm:prSet/>
       <dgm:spPr/>
       <dgm:t>
@@ -4930,7 +5137,7 @@
         </a:p>
       </dgm:t>
     </dgm:pt>
-    <dgm:pt modelId="{BCFB4885-78B7-44AD-B2AD-429A34EA38DF}" type="sibTrans" cxnId="{CFD273A8-E048-4695-969D-518067520BC5}">
+    <dgm:pt modelId="{4A007F0E-75BC-4CA9-B60C-4648A88D8E3B}" type="sibTrans" cxnId="{D980DE9C-7524-4043-87C3-5A21B0C38B77}">
       <dgm:prSet/>
       <dgm:spPr/>
       <dgm:t>
@@ -4955,11 +5162,11 @@
       <dgm:spPr/>
     </dgm:pt>
     <dgm:pt modelId="{4C3F45E2-0089-46DA-822A-9F4B7C76BBB7}" type="pres">
-      <dgm:prSet presAssocID="{D36D91AA-A698-440A-A2E7-650B4772B315}" presName="box" presStyleLbl="node1" presStyleIdx="0" presStyleCnt="2"/>
+      <dgm:prSet presAssocID="{D36D91AA-A698-440A-A2E7-650B4772B315}" presName="box" presStyleLbl="node1" presStyleIdx="0" presStyleCnt="3"/>
       <dgm:spPr/>
     </dgm:pt>
     <dgm:pt modelId="{3543167E-0B84-4A2E-8412-B8340644D301}" type="pres">
-      <dgm:prSet presAssocID="{D36D91AA-A698-440A-A2E7-650B4772B315}" presName="img" presStyleLbl="fgImgPlace1" presStyleIdx="0" presStyleCnt="2"/>
+      <dgm:prSet presAssocID="{D36D91AA-A698-440A-A2E7-650B4772B315}" presName="img" presStyleLbl="fgImgPlace1" presStyleIdx="0" presStyleCnt="3"/>
       <dgm:spPr>
         <a:solidFill>
           <a:schemeClr val="bg1"/>
@@ -4967,7 +5174,7 @@
       </dgm:spPr>
     </dgm:pt>
     <dgm:pt modelId="{71740332-8654-4465-80E5-0D70AB61A957}" type="pres">
-      <dgm:prSet presAssocID="{D36D91AA-A698-440A-A2E7-650B4772B315}" presName="text" presStyleLbl="node1" presStyleIdx="0" presStyleCnt="2">
+      <dgm:prSet presAssocID="{D36D91AA-A698-440A-A2E7-650B4772B315}" presName="text" presStyleLbl="node1" presStyleIdx="0" presStyleCnt="3">
         <dgm:presLayoutVars>
           <dgm:bulletEnabled val="1"/>
         </dgm:presLayoutVars>
@@ -4983,11 +5190,11 @@
       <dgm:spPr/>
     </dgm:pt>
     <dgm:pt modelId="{5146AC4C-C65D-4679-BD99-A7C261AFA3E3}" type="pres">
-      <dgm:prSet presAssocID="{FF869937-3662-48A5-B8E2-C991522DD447}" presName="box" presStyleLbl="node1" presStyleIdx="1" presStyleCnt="2"/>
+      <dgm:prSet presAssocID="{FF869937-3662-48A5-B8E2-C991522DD447}" presName="box" presStyleLbl="node1" presStyleIdx="1" presStyleCnt="3"/>
       <dgm:spPr/>
     </dgm:pt>
     <dgm:pt modelId="{9CFC517E-AB5B-48A5-8D3A-042E49721566}" type="pres">
-      <dgm:prSet presAssocID="{FF869937-3662-48A5-B8E2-C991522DD447}" presName="img" presStyleLbl="fgImgPlace1" presStyleIdx="1" presStyleCnt="2"/>
+      <dgm:prSet presAssocID="{FF869937-3662-48A5-B8E2-C991522DD447}" presName="img" presStyleLbl="fgImgPlace1" presStyleIdx="1" presStyleCnt="3"/>
       <dgm:spPr>
         <a:solidFill>
           <a:schemeClr val="bg1"/>
@@ -4995,7 +5202,35 @@
       </dgm:spPr>
     </dgm:pt>
     <dgm:pt modelId="{076644E2-374B-42F0-B777-E8268CA8EDAC}" type="pres">
-      <dgm:prSet presAssocID="{FF869937-3662-48A5-B8E2-C991522DD447}" presName="text" presStyleLbl="node1" presStyleIdx="1" presStyleCnt="2">
+      <dgm:prSet presAssocID="{FF869937-3662-48A5-B8E2-C991522DD447}" presName="text" presStyleLbl="node1" presStyleIdx="1" presStyleCnt="3">
+        <dgm:presLayoutVars>
+          <dgm:bulletEnabled val="1"/>
+        </dgm:presLayoutVars>
+      </dgm:prSet>
+      <dgm:spPr/>
+    </dgm:pt>
+    <dgm:pt modelId="{33A1C1F9-E01A-4289-8B9C-5DEF52585EB8}" type="pres">
+      <dgm:prSet presAssocID="{7F01C478-6E74-455D-A06B-31E2DC2E21E8}" presName="spacer" presStyleCnt="0"/>
+      <dgm:spPr/>
+    </dgm:pt>
+    <dgm:pt modelId="{48994EAD-3173-4FA7-8703-5CF9821AA834}" type="pres">
+      <dgm:prSet presAssocID="{43AB12C8-5610-4BDE-AE3D-D10A6CC11934}" presName="comp" presStyleCnt="0"/>
+      <dgm:spPr/>
+    </dgm:pt>
+    <dgm:pt modelId="{51FDB375-FAAF-4524-95B4-61CE2DBB7DAB}" type="pres">
+      <dgm:prSet presAssocID="{43AB12C8-5610-4BDE-AE3D-D10A6CC11934}" presName="box" presStyleLbl="node1" presStyleIdx="2" presStyleCnt="3"/>
+      <dgm:spPr/>
+    </dgm:pt>
+    <dgm:pt modelId="{51898C19-AC47-487B-87D8-39E177834466}" type="pres">
+      <dgm:prSet presAssocID="{43AB12C8-5610-4BDE-AE3D-D10A6CC11934}" presName="img" presStyleLbl="fgImgPlace1" presStyleIdx="2" presStyleCnt="3"/>
+      <dgm:spPr>
+        <a:solidFill>
+          <a:schemeClr val="bg1"/>
+        </a:solidFill>
+      </dgm:spPr>
+    </dgm:pt>
+    <dgm:pt modelId="{81F15C10-84E5-43EE-B028-AE2FBAC3CB40}" type="pres">
+      <dgm:prSet presAssocID="{43AB12C8-5610-4BDE-AE3D-D10A6CC11934}" presName="text" presStyleLbl="node1" presStyleIdx="2" presStyleCnt="3">
         <dgm:presLayoutVars>
           <dgm:bulletEnabled val="1"/>
         </dgm:presLayoutVars>
@@ -5006,9 +5241,14 @@
   <dgm:cxnLst>
     <dgm:cxn modelId="{8D80CE06-28D5-48B5-A58E-31F288630928}" srcId="{88F3C1AA-CE67-4663-8C4E-5739587C4C85}" destId="{D36D91AA-A698-440A-A2E7-650B4772B315}" srcOrd="0" destOrd="0" parTransId="{0C6D27D9-0390-4420-8C8E-189A0F1434FC}" sibTransId="{80831EC4-31ED-4038-AC0A-774C020F8DE1}"/>
     <dgm:cxn modelId="{AC809B14-12A3-4D2B-9BE2-623ABA367CDD}" type="presOf" srcId="{4F44F2B1-1F88-4DA0-BD41-D64F93313F40}" destId="{4C3F45E2-0089-46DA-822A-9F4B7C76BBB7}" srcOrd="0" destOrd="2" presId="urn:microsoft.com/office/officeart/2005/8/layout/vList4"/>
+    <dgm:cxn modelId="{E397F617-18D4-4069-8623-A404FF16E7D5}" type="presOf" srcId="{43AB12C8-5610-4BDE-AE3D-D10A6CC11934}" destId="{51FDB375-FAAF-4524-95B4-61CE2DBB7DAB}" srcOrd="0" destOrd="0" presId="urn:microsoft.com/office/officeart/2005/8/layout/vList4"/>
     <dgm:cxn modelId="{05B6A123-D08D-49A6-91B9-C1101DD4E260}" srcId="{D36D91AA-A698-440A-A2E7-650B4772B315}" destId="{534E9A7E-57F2-48B5-AB09-7FC267998813}" srcOrd="0" destOrd="0" parTransId="{871163A8-C156-4908-A079-837EF5E4F8DF}" sibTransId="{10329004-61E4-40D4-9DFD-FCC69DA53FDB}"/>
     <dgm:cxn modelId="{18066026-661E-4DB9-B59B-B3132CB507B3}" type="presOf" srcId="{DB3DCDB3-64EC-467F-8691-C8D04C0CB373}" destId="{5146AC4C-C65D-4679-BD99-A7C261AFA3E3}" srcOrd="0" destOrd="1" presId="urn:microsoft.com/office/officeart/2005/8/layout/vList4"/>
+    <dgm:cxn modelId="{EB57E431-FD90-49B1-B316-1E6DA28B5348}" type="presOf" srcId="{9A32242B-3EC3-4BBD-B795-8D2D1C2A27B1}" destId="{81F15C10-84E5-43EE-B028-AE2FBAC3CB40}" srcOrd="1" destOrd="1" presId="urn:microsoft.com/office/officeart/2005/8/layout/vList4"/>
+    <dgm:cxn modelId="{3E0B863B-875C-4BBA-B96D-5637C7FA4A43}" srcId="{43AB12C8-5610-4BDE-AE3D-D10A6CC11934}" destId="{9A32242B-3EC3-4BBD-B795-8D2D1C2A27B1}" srcOrd="0" destOrd="0" parTransId="{FFBD578B-75ED-4C02-B11B-A96CEC6E4F8E}" sibTransId="{4775DBA1-92CB-4F42-AAFA-60FDA860BECF}"/>
     <dgm:cxn modelId="{DA8DCE3E-32D2-40F1-AC61-58C2B70CD01B}" type="presOf" srcId="{D36D91AA-A698-440A-A2E7-650B4772B315}" destId="{71740332-8654-4465-80E5-0D70AB61A957}" srcOrd="1" destOrd="0" presId="urn:microsoft.com/office/officeart/2005/8/layout/vList4"/>
+    <dgm:cxn modelId="{EC552344-0B39-44D5-8E79-A2F8215197C6}" type="presOf" srcId="{43AB12C8-5610-4BDE-AE3D-D10A6CC11934}" destId="{81F15C10-84E5-43EE-B028-AE2FBAC3CB40}" srcOrd="1" destOrd="0" presId="urn:microsoft.com/office/officeart/2005/8/layout/vList4"/>
+    <dgm:cxn modelId="{F287F846-3F56-4942-BAE7-2772DCB8F2B8}" srcId="{88F3C1AA-CE67-4663-8C4E-5739587C4C85}" destId="{43AB12C8-5610-4BDE-AE3D-D10A6CC11934}" srcOrd="2" destOrd="0" parTransId="{0D8480C5-6BE9-4A07-A3EA-B9AF786CFFC9}" sibTransId="{86BEE249-383E-4F53-A254-034DD3637F3C}"/>
     <dgm:cxn modelId="{1315336D-EE89-4B7F-BF66-1579D96252CE}" type="presOf" srcId="{D36D91AA-A698-440A-A2E7-650B4772B315}" destId="{4C3F45E2-0089-46DA-822A-9F4B7C76BBB7}" srcOrd="0" destOrd="0" presId="urn:microsoft.com/office/officeart/2005/8/layout/vList4"/>
     <dgm:cxn modelId="{BCD0AE4D-1B5C-44E1-BD89-3F57CC173BE4}" type="presOf" srcId="{FF869937-3662-48A5-B8E2-C991522DD447}" destId="{5146AC4C-C65D-4679-BD99-A7C261AFA3E3}" srcOrd="0" destOrd="0" presId="urn:microsoft.com/office/officeart/2005/8/layout/vList4"/>
     <dgm:cxn modelId="{BAD8FF7A-646F-4175-9E12-C5CF12BC2896}" type="presOf" srcId="{4F44F2B1-1F88-4DA0-BD41-D64F93313F40}" destId="{71740332-8654-4465-80E5-0D70AB61A957}" srcOrd="1" destOrd="2" presId="urn:microsoft.com/office/officeart/2005/8/layout/vList4"/>
@@ -5017,11 +5257,15 @@
     <dgm:cxn modelId="{62B7758D-92F3-41DB-8209-EF2A9BD8098D}" type="presOf" srcId="{534E9A7E-57F2-48B5-AB09-7FC267998813}" destId="{4C3F45E2-0089-46DA-822A-9F4B7C76BBB7}" srcOrd="0" destOrd="1" presId="urn:microsoft.com/office/officeart/2005/8/layout/vList4"/>
     <dgm:cxn modelId="{DF734C8F-4858-49E2-8ACB-EB6A32397E85}" type="presOf" srcId="{E708BED1-C5DF-47B9-8D40-6E3403B66E69}" destId="{076644E2-374B-42F0-B777-E8268CA8EDAC}" srcOrd="1" destOrd="2" presId="urn:microsoft.com/office/officeart/2005/8/layout/vList4"/>
     <dgm:cxn modelId="{094DD498-3373-413C-A36B-EC2A3FE67467}" srcId="{D36D91AA-A698-440A-A2E7-650B4772B315}" destId="{4F44F2B1-1F88-4DA0-BD41-D64F93313F40}" srcOrd="1" destOrd="0" parTransId="{517AD3AA-EF90-4EBE-A5DE-913725FBF4CB}" sibTransId="{E0D00119-02DE-48DE-AF4D-671A20534577}"/>
+    <dgm:cxn modelId="{6C24919A-5816-4A35-8397-A55E56639043}" type="presOf" srcId="{4E2A04C8-432F-4A43-8B98-23B295AC1D53}" destId="{81F15C10-84E5-43EE-B028-AE2FBAC3CB40}" srcOrd="1" destOrd="2" presId="urn:microsoft.com/office/officeart/2005/8/layout/vList4"/>
+    <dgm:cxn modelId="{D980DE9C-7524-4043-87C3-5A21B0C38B77}" srcId="{43AB12C8-5610-4BDE-AE3D-D10A6CC11934}" destId="{4E2A04C8-432F-4A43-8B98-23B295AC1D53}" srcOrd="1" destOrd="0" parTransId="{9F526BE9-EF3A-45DC-A8C6-DE989DBDC7AA}" sibTransId="{4A007F0E-75BC-4CA9-B60C-4648A88D8E3B}"/>
     <dgm:cxn modelId="{CFD273A8-E048-4695-969D-518067520BC5}" srcId="{FF869937-3662-48A5-B8E2-C991522DD447}" destId="{E708BED1-C5DF-47B9-8D40-6E3403B66E69}" srcOrd="1" destOrd="0" parTransId="{B688070F-38FB-4DAE-8DBF-E040B9B8DCE6}" sibTransId="{BCFB4885-78B7-44AD-B2AD-429A34EA38DF}"/>
     <dgm:cxn modelId="{FBD49FA9-D72C-473C-B0A8-EA7462469390}" type="presOf" srcId="{88F3C1AA-CE67-4663-8C4E-5739587C4C85}" destId="{30183D65-48F9-4297-A449-6903C6264016}" srcOrd="0" destOrd="0" presId="urn:microsoft.com/office/officeart/2005/8/layout/vList4"/>
+    <dgm:cxn modelId="{EDDBF8A9-86E2-4A96-85CA-16DF77C760D2}" type="presOf" srcId="{9A32242B-3EC3-4BBD-B795-8D2D1C2A27B1}" destId="{51FDB375-FAAF-4524-95B4-61CE2DBB7DAB}" srcOrd="0" destOrd="1" presId="urn:microsoft.com/office/officeart/2005/8/layout/vList4"/>
     <dgm:cxn modelId="{D628A9B8-4E0E-446C-95CF-DBDFF9134D81}" type="presOf" srcId="{534E9A7E-57F2-48B5-AB09-7FC267998813}" destId="{71740332-8654-4465-80E5-0D70AB61A957}" srcOrd="1" destOrd="1" presId="urn:microsoft.com/office/officeart/2005/8/layout/vList4"/>
     <dgm:cxn modelId="{D9805DC5-D442-4F0A-8B5F-5D760229CE1C}" type="presOf" srcId="{FF869937-3662-48A5-B8E2-C991522DD447}" destId="{076644E2-374B-42F0-B777-E8268CA8EDAC}" srcOrd="1" destOrd="0" presId="urn:microsoft.com/office/officeart/2005/8/layout/vList4"/>
     <dgm:cxn modelId="{A094C5CB-54B0-4A12-BD87-8A3CF461C7B5}" srcId="{FF869937-3662-48A5-B8E2-C991522DD447}" destId="{DB3DCDB3-64EC-467F-8691-C8D04C0CB373}" srcOrd="0" destOrd="0" parTransId="{D194B764-1BCF-4364-9570-49D4EACB13D5}" sibTransId="{BE9B4E90-2BA0-4AC7-8D7B-0C0E213D5347}"/>
+    <dgm:cxn modelId="{0CF3E5F5-DF65-4760-9DAD-C25325C12663}" type="presOf" srcId="{4E2A04C8-432F-4A43-8B98-23B295AC1D53}" destId="{51FDB375-FAAF-4524-95B4-61CE2DBB7DAB}" srcOrd="0" destOrd="2" presId="urn:microsoft.com/office/officeart/2005/8/layout/vList4"/>
     <dgm:cxn modelId="{39C2F8F9-6D8E-4DA6-B94E-712983912C8D}" type="presOf" srcId="{DB3DCDB3-64EC-467F-8691-C8D04C0CB373}" destId="{076644E2-374B-42F0-B777-E8268CA8EDAC}" srcOrd="1" destOrd="1" presId="urn:microsoft.com/office/officeart/2005/8/layout/vList4"/>
     <dgm:cxn modelId="{8BFB1EA6-2560-408E-B1DA-95C4B619D368}" type="presParOf" srcId="{30183D65-48F9-4297-A449-6903C6264016}" destId="{E2C7033F-DB72-4AA7-93EB-B521FEA1E64A}" srcOrd="0" destOrd="0" presId="urn:microsoft.com/office/officeart/2005/8/layout/vList4"/>
     <dgm:cxn modelId="{39C30E0F-D6BC-4787-A517-CE65864880E8}" type="presParOf" srcId="{E2C7033F-DB72-4AA7-93EB-B521FEA1E64A}" destId="{4C3F45E2-0089-46DA-822A-9F4B7C76BBB7}" srcOrd="0" destOrd="0" presId="urn:microsoft.com/office/officeart/2005/8/layout/vList4"/>
@@ -5032,6 +5276,11 @@
     <dgm:cxn modelId="{0F5300AC-5B92-414E-8A46-D8AE16EA364D}" type="presParOf" srcId="{D78BD2E8-1617-4406-9EB8-886D022D0E09}" destId="{5146AC4C-C65D-4679-BD99-A7C261AFA3E3}" srcOrd="0" destOrd="0" presId="urn:microsoft.com/office/officeart/2005/8/layout/vList4"/>
     <dgm:cxn modelId="{FC4DF67F-D360-4179-98AD-56C893626442}" type="presParOf" srcId="{D78BD2E8-1617-4406-9EB8-886D022D0E09}" destId="{9CFC517E-AB5B-48A5-8D3A-042E49721566}" srcOrd="1" destOrd="0" presId="urn:microsoft.com/office/officeart/2005/8/layout/vList4"/>
     <dgm:cxn modelId="{5FE7753B-4172-42F1-A7C0-D24FDD22A962}" type="presParOf" srcId="{D78BD2E8-1617-4406-9EB8-886D022D0E09}" destId="{076644E2-374B-42F0-B777-E8268CA8EDAC}" srcOrd="2" destOrd="0" presId="urn:microsoft.com/office/officeart/2005/8/layout/vList4"/>
+    <dgm:cxn modelId="{D929F847-8A2B-4565-B9AF-AAFA4B2B254F}" type="presParOf" srcId="{30183D65-48F9-4297-A449-6903C6264016}" destId="{33A1C1F9-E01A-4289-8B9C-5DEF52585EB8}" srcOrd="3" destOrd="0" presId="urn:microsoft.com/office/officeart/2005/8/layout/vList4"/>
+    <dgm:cxn modelId="{DA20CC99-A87E-46B3-B127-21F273450E8D}" type="presParOf" srcId="{30183D65-48F9-4297-A449-6903C6264016}" destId="{48994EAD-3173-4FA7-8703-5CF9821AA834}" srcOrd="4" destOrd="0" presId="urn:microsoft.com/office/officeart/2005/8/layout/vList4"/>
+    <dgm:cxn modelId="{7272591A-002D-4BCA-B588-FDA224A1B807}" type="presParOf" srcId="{48994EAD-3173-4FA7-8703-5CF9821AA834}" destId="{51FDB375-FAAF-4524-95B4-61CE2DBB7DAB}" srcOrd="0" destOrd="0" presId="urn:microsoft.com/office/officeart/2005/8/layout/vList4"/>
+    <dgm:cxn modelId="{7F3D3704-266D-4024-A623-2A70FBC150B0}" type="presParOf" srcId="{48994EAD-3173-4FA7-8703-5CF9821AA834}" destId="{51898C19-AC47-487B-87D8-39E177834466}" srcOrd="1" destOrd="0" presId="urn:microsoft.com/office/officeart/2005/8/layout/vList4"/>
+    <dgm:cxn modelId="{692014E2-F13B-4C91-8B5A-6E0D8BF27A9B}" type="presParOf" srcId="{48994EAD-3173-4FA7-8703-5CF9821AA834}" destId="{81F15C10-84E5-43EE-B028-AE2FBAC3CB40}" srcOrd="2" destOrd="0" presId="urn:microsoft.com/office/officeart/2005/8/layout/vList4"/>
   </dgm:cxnLst>
   <dgm:bg/>
   <dgm:whole/>
@@ -5116,6 +5365,17 @@
               <a:latin typeface="Avenir Next LT Pro Light" panose="020B0304020202020204" pitchFamily="34" charset="0"/>
             </a:rPr>
             <a:t>Digitaler Fußabdruck</a:t>
+          </a:r>
+          <a:br>
+            <a:rPr lang="de-DE" sz="2600" kern="1200" dirty="0">
+              <a:latin typeface="Avenir Next LT Pro Light" panose="020B0304020202020204" pitchFamily="34" charset="0"/>
+            </a:rPr>
+          </a:br>
+          <a:r>
+            <a:rPr lang="de-DE" sz="2600" kern="1200" dirty="0">
+              <a:latin typeface="Avenir Next LT Pro Light" panose="020B0304020202020204" pitchFamily="34" charset="0"/>
+            </a:rPr>
+            <a:t>(Visitenkarte)</a:t>
           </a:r>
           <a:endParaRPr lang="en-US" sz="2600" kern="1200" dirty="0">
             <a:latin typeface="Avenir Next LT Pro Light" panose="020B0304020202020204" pitchFamily="34" charset="0"/>
@@ -6961,7 +7221,7 @@
       <dsp:spPr>
         <a:xfrm>
           <a:off x="0" y="0"/>
-          <a:ext cx="10515600" cy="2117409"/>
+          <a:ext cx="10515600" cy="1389889"/>
         </a:xfrm>
         <a:prstGeom prst="roundRect">
           <a:avLst>
@@ -7032,12 +7292,12 @@
         </a:fontRef>
       </dsp:style>
       <dsp:txBody>
-        <a:bodyPr spcFirstLastPara="0" vert="horz" wrap="square" lIns="129540" tIns="129540" rIns="129540" bIns="129540" numCol="1" spcCol="1270" anchor="t" anchorCtr="0">
+        <a:bodyPr spcFirstLastPara="0" vert="horz" wrap="square" lIns="83820" tIns="83820" rIns="83820" bIns="83820" numCol="1" spcCol="1270" anchor="t" anchorCtr="0">
           <a:noAutofit/>
         </a:bodyPr>
         <a:lstStyle/>
         <a:p>
-          <a:pPr marL="0" lvl="0" indent="0" algn="l" defTabSz="1511300">
+          <a:pPr marL="0" lvl="0" indent="0" algn="l" defTabSz="977900">
             <a:lnSpc>
               <a:spcPct val="90000"/>
             </a:lnSpc>
@@ -7050,13 +7310,17 @@
             <a:buNone/>
           </a:pPr>
           <a:r>
-            <a:rPr lang="de-DE" sz="3400" kern="1200" dirty="0"/>
-            <a:t>Option 2</a:t>
+            <a:rPr lang="de-DE" sz="2200" kern="1200" dirty="0">
+              <a:latin typeface="Avenir Next LT Pro Light" panose="020B0304020202020204" pitchFamily="34" charset="0"/>
+            </a:rPr>
+            <a:t>Option 1</a:t>
           </a:r>
-          <a:endParaRPr lang="en-US" sz="3400" kern="1200" dirty="0"/>
+          <a:endParaRPr lang="en-US" sz="2200" kern="1200" dirty="0">
+            <a:latin typeface="Avenir Next LT Pro Light" panose="020B0304020202020204" pitchFamily="34" charset="0"/>
+          </a:endParaRPr>
         </a:p>
         <a:p>
-          <a:pPr marL="228600" lvl="1" indent="-228600" algn="l" defTabSz="1200150">
+          <a:pPr marL="171450" lvl="1" indent="-171450" algn="l" defTabSz="755650">
             <a:lnSpc>
               <a:spcPct val="90000"/>
             </a:lnSpc>
@@ -7069,21 +7333,23 @@
             <a:buChar char="•"/>
           </a:pPr>
           <a:r>
-            <a:rPr lang="de-DE" sz="2700" kern="1200" dirty="0">
+            <a:rPr lang="de-DE" sz="1700" kern="1200" dirty="0">
               <a:solidFill>
-                <a:srgbClr val="00B050"/>
+                <a:srgbClr val="FFFF00"/>
               </a:solidFill>
+              <a:latin typeface="Avenir Next LT Pro Light" panose="020B0304020202020204" pitchFamily="34" charset="0"/>
             </a:rPr>
-            <a:t>Empfehlung</a:t>
+            <a:t>Keine Empfehlung (nur wenn eine Domain keinen Sinn ergibt)!</a:t>
           </a:r>
-          <a:endParaRPr lang="en-US" sz="2700" kern="1200" dirty="0">
+          <a:endParaRPr lang="en-US" sz="1700" kern="1200" dirty="0">
             <a:solidFill>
-              <a:srgbClr val="00B050"/>
+              <a:srgbClr val="FFFF00"/>
             </a:solidFill>
+            <a:latin typeface="Avenir Next LT Pro Light" panose="020B0304020202020204" pitchFamily="34" charset="0"/>
           </a:endParaRPr>
         </a:p>
         <a:p>
-          <a:pPr marL="228600" lvl="1" indent="-228600" algn="l" defTabSz="1200150">
+          <a:pPr marL="171450" lvl="1" indent="-171450" algn="l" defTabSz="755650">
             <a:lnSpc>
               <a:spcPct val="90000"/>
             </a:lnSpc>
@@ -7096,13 +7362,14 @@
             <a:buChar char="•"/>
           </a:pPr>
           <a:r>
-            <a:rPr lang="en-US" sz="2700" kern="1200" dirty="0">
+            <a:rPr lang="en-US" sz="1700" kern="1200" dirty="0">
               <a:solidFill>
                 <a:schemeClr val="tx1">
                   <a:lumMod val="85000"/>
                   <a:lumOff val="15000"/>
                 </a:schemeClr>
               </a:solidFill>
+              <a:latin typeface="Avenir Next LT Pro Light" panose="020B0304020202020204" pitchFamily="34" charset="0"/>
               <a:hlinkClick xmlns:r="http://schemas.openxmlformats.org/officeDocument/2006/relationships" r:id="rId1">
                 <a:extLst>
                   <a:ext uri="{A12FA001-AC4F-418D-AE19-62706E023703}">
@@ -7111,21 +7378,22 @@
                 </a:extLst>
               </a:hlinkClick>
             </a:rPr>
-            <a:t>https://github.com/maximotus/skill-saturday-wordpress-portfolio-website/wiki/Option-2</a:t>
+            <a:t>https://github.com/maximotus/skill-saturday-wordpress-portfolio-website/wiki/Option-1</a:t>
           </a:r>
-          <a:endParaRPr lang="en-US" sz="2700" kern="1200" dirty="0">
+          <a:endParaRPr lang="en-US" sz="1700" kern="1200" dirty="0">
             <a:solidFill>
               <a:schemeClr val="tx1">
                 <a:lumMod val="85000"/>
                 <a:lumOff val="15000"/>
               </a:schemeClr>
             </a:solidFill>
+            <a:latin typeface="Avenir Next LT Pro Light" panose="020B0304020202020204" pitchFamily="34" charset="0"/>
           </a:endParaRPr>
         </a:p>
       </dsp:txBody>
       <dsp:txXfrm>
-        <a:off x="2314860" y="0"/>
-        <a:ext cx="8200739" cy="2117409"/>
+        <a:off x="2242108" y="0"/>
+        <a:ext cx="8273491" cy="1389889"/>
       </dsp:txXfrm>
     </dsp:sp>
     <dsp:sp modelId="{3543167E-0B84-4A2E-8412-B8340644D301}">
@@ -7135,8 +7403,8 @@
       </dsp:nvSpPr>
       <dsp:spPr>
         <a:xfrm>
-          <a:off x="211740" y="211740"/>
-          <a:ext cx="2103120" cy="1693927"/>
+          <a:off x="138988" y="138988"/>
+          <a:ext cx="2103120" cy="1111911"/>
         </a:xfrm>
         <a:prstGeom prst="roundRect">
           <a:avLst>
@@ -7177,8 +7445,8 @@
       </dsp:nvSpPr>
       <dsp:spPr>
         <a:xfrm>
-          <a:off x="0" y="2329150"/>
-          <a:ext cx="10515600" cy="2117409"/>
+          <a:off x="0" y="1528877"/>
+          <a:ext cx="10515600" cy="1389889"/>
         </a:xfrm>
         <a:prstGeom prst="roundRect">
           <a:avLst>
@@ -7249,12 +7517,12 @@
         </a:fontRef>
       </dsp:style>
       <dsp:txBody>
-        <a:bodyPr spcFirstLastPara="0" vert="horz" wrap="square" lIns="129540" tIns="129540" rIns="129540" bIns="129540" numCol="1" spcCol="1270" anchor="t" anchorCtr="0">
+        <a:bodyPr spcFirstLastPara="0" vert="horz" wrap="square" lIns="83820" tIns="83820" rIns="83820" bIns="83820" numCol="1" spcCol="1270" anchor="t" anchorCtr="0">
           <a:noAutofit/>
         </a:bodyPr>
         <a:lstStyle/>
         <a:p>
-          <a:pPr marL="0" lvl="0" indent="0" algn="l" defTabSz="1511300">
+          <a:pPr marL="0" lvl="0" indent="0" algn="l" defTabSz="977900">
             <a:lnSpc>
               <a:spcPct val="90000"/>
             </a:lnSpc>
@@ -7267,13 +7535,17 @@
             <a:buNone/>
           </a:pPr>
           <a:r>
-            <a:rPr lang="de-DE" sz="3400" kern="1200" dirty="0"/>
+            <a:rPr lang="de-DE" sz="2200" kern="1200" dirty="0">
+              <a:latin typeface="Avenir Next LT Pro Light" panose="020B0304020202020204" pitchFamily="34" charset="0"/>
+            </a:rPr>
             <a:t>Option 2</a:t>
           </a:r>
-          <a:endParaRPr lang="en-US" sz="3400" kern="1200" dirty="0"/>
+          <a:endParaRPr lang="en-US" sz="2200" kern="1200" dirty="0">
+            <a:latin typeface="Avenir Next LT Pro Light" panose="020B0304020202020204" pitchFamily="34" charset="0"/>
+          </a:endParaRPr>
         </a:p>
         <a:p>
-          <a:pPr marL="228600" lvl="1" indent="-228600" algn="l" defTabSz="1200150">
+          <a:pPr marL="171450" lvl="1" indent="-171450" algn="l" defTabSz="755650">
             <a:lnSpc>
               <a:spcPct val="90000"/>
             </a:lnSpc>
@@ -7286,18 +7558,23 @@
             <a:buChar char="•"/>
           </a:pPr>
           <a:r>
-            <a:rPr lang="de-DE" sz="2700" kern="1200" dirty="0">
+            <a:rPr lang="de-DE" sz="1700" kern="1200" dirty="0">
               <a:solidFill>
-                <a:srgbClr val="FFFF00"/>
+                <a:srgbClr val="00B050"/>
               </a:solidFill>
               <a:latin typeface="Avenir Next LT Pro Light" panose="020B0304020202020204" pitchFamily="34" charset="0"/>
             </a:rPr>
-            <a:t>Keine Empfehlung (es gibt aber eine Anleitung)!</a:t>
+            <a:t>Empfehlung!</a:t>
           </a:r>
-          <a:endParaRPr lang="en-US" sz="2700" kern="1200" dirty="0"/>
+          <a:endParaRPr lang="en-US" sz="1700" kern="1200" dirty="0">
+            <a:solidFill>
+              <a:srgbClr val="00B050"/>
+            </a:solidFill>
+            <a:latin typeface="Avenir Next LT Pro Light" panose="020B0304020202020204" pitchFamily="34" charset="0"/>
+          </a:endParaRPr>
         </a:p>
         <a:p>
-          <a:pPr marL="228600" lvl="1" indent="-228600" algn="l" defTabSz="1200150">
+          <a:pPr marL="171450" lvl="1" indent="-171450" algn="l" defTabSz="755650">
             <a:lnSpc>
               <a:spcPct val="90000"/>
             </a:lnSpc>
@@ -7310,14 +7587,237 @@
             <a:buChar char="•"/>
           </a:pPr>
           <a:r>
-            <a:rPr lang="en-US" sz="2700" kern="1200" dirty="0">
+            <a:rPr lang="en-US" sz="1700" kern="1200" dirty="0">
               <a:solidFill>
                 <a:schemeClr val="tx1">
                   <a:lumMod val="85000"/>
                   <a:lumOff val="15000"/>
                 </a:schemeClr>
               </a:solidFill>
+              <a:latin typeface="Avenir Next LT Pro Light" panose="020B0304020202020204" pitchFamily="34" charset="0"/>
               <a:hlinkClick xmlns:r="http://schemas.openxmlformats.org/officeDocument/2006/relationships" r:id="rId2">
+                <a:extLst>
+                  <a:ext uri="{A12FA001-AC4F-418D-AE19-62706E023703}">
+                    <ahyp:hlinkClr xmlns:ahyp="http://schemas.microsoft.com/office/drawing/2018/hyperlinkcolor" val="tx"/>
+                  </a:ext>
+                </a:extLst>
+              </a:hlinkClick>
+            </a:rPr>
+            <a:t>https://github.com/maximotus/skill-saturday-wordpress-portfolio-website/wiki/Option-2</a:t>
+          </a:r>
+          <a:endParaRPr lang="en-US" sz="1700" kern="1200" dirty="0">
+            <a:solidFill>
+              <a:schemeClr val="tx1">
+                <a:lumMod val="85000"/>
+                <a:lumOff val="15000"/>
+              </a:schemeClr>
+            </a:solidFill>
+            <a:latin typeface="Avenir Next LT Pro Light" panose="020B0304020202020204" pitchFamily="34" charset="0"/>
+          </a:endParaRPr>
+        </a:p>
+      </dsp:txBody>
+      <dsp:txXfrm>
+        <a:off x="2242108" y="1528877"/>
+        <a:ext cx="8273491" cy="1389889"/>
+      </dsp:txXfrm>
+    </dsp:sp>
+    <dsp:sp modelId="{9CFC517E-AB5B-48A5-8D3A-042E49721566}">
+      <dsp:nvSpPr>
+        <dsp:cNvPr id="0" name=""/>
+        <dsp:cNvSpPr/>
+      </dsp:nvSpPr>
+      <dsp:spPr>
+        <a:xfrm>
+          <a:off x="138988" y="1667866"/>
+          <a:ext cx="2103120" cy="1111911"/>
+        </a:xfrm>
+        <a:prstGeom prst="roundRect">
+          <a:avLst>
+            <a:gd name="adj" fmla="val 10000"/>
+          </a:avLst>
+        </a:prstGeom>
+        <a:solidFill>
+          <a:schemeClr val="bg1"/>
+        </a:solidFill>
+        <a:ln>
+          <a:noFill/>
+        </a:ln>
+        <a:effectLst>
+          <a:outerShdw blurRad="57150" dist="19050" dir="5400000" algn="ctr" rotWithShape="0">
+            <a:srgbClr val="000000">
+              <a:alpha val="63000"/>
+            </a:srgbClr>
+          </a:outerShdw>
+        </a:effectLst>
+      </dsp:spPr>
+      <dsp:style>
+        <a:lnRef idx="0">
+          <a:scrgbClr r="0" g="0" b="0"/>
+        </a:lnRef>
+        <a:fillRef idx="1">
+          <a:scrgbClr r="0" g="0" b="0"/>
+        </a:fillRef>
+        <a:effectRef idx="3">
+          <a:scrgbClr r="0" g="0" b="0"/>
+        </a:effectRef>
+        <a:fontRef idx="minor"/>
+      </dsp:style>
+    </dsp:sp>
+    <dsp:sp modelId="{51FDB375-FAAF-4524-95B4-61CE2DBB7DAB}">
+      <dsp:nvSpPr>
+        <dsp:cNvPr id="0" name=""/>
+        <dsp:cNvSpPr/>
+      </dsp:nvSpPr>
+      <dsp:spPr>
+        <a:xfrm>
+          <a:off x="0" y="3057755"/>
+          <a:ext cx="10515600" cy="1389889"/>
+        </a:xfrm>
+        <a:prstGeom prst="roundRect">
+          <a:avLst>
+            <a:gd name="adj" fmla="val 10000"/>
+          </a:avLst>
+        </a:prstGeom>
+        <a:gradFill rotWithShape="0">
+          <a:gsLst>
+            <a:gs pos="0">
+              <a:schemeClr val="accent1">
+                <a:hueOff val="0"/>
+                <a:satOff val="0"/>
+                <a:lumOff val="0"/>
+                <a:alphaOff val="0"/>
+                <a:satMod val="103000"/>
+                <a:lumMod val="102000"/>
+                <a:tint val="94000"/>
+              </a:schemeClr>
+            </a:gs>
+            <a:gs pos="50000">
+              <a:schemeClr val="accent1">
+                <a:hueOff val="0"/>
+                <a:satOff val="0"/>
+                <a:lumOff val="0"/>
+                <a:alphaOff val="0"/>
+                <a:satMod val="110000"/>
+                <a:lumMod val="100000"/>
+                <a:shade val="100000"/>
+              </a:schemeClr>
+            </a:gs>
+            <a:gs pos="100000">
+              <a:schemeClr val="accent1">
+                <a:hueOff val="0"/>
+                <a:satOff val="0"/>
+                <a:lumOff val="0"/>
+                <a:alphaOff val="0"/>
+                <a:lumMod val="99000"/>
+                <a:satMod val="120000"/>
+                <a:shade val="78000"/>
+              </a:schemeClr>
+            </a:gs>
+          </a:gsLst>
+          <a:lin ang="5400000" scaled="0"/>
+        </a:gradFill>
+        <a:ln>
+          <a:noFill/>
+        </a:ln>
+        <a:effectLst>
+          <a:outerShdw blurRad="57150" dist="19050" dir="5400000" algn="ctr" rotWithShape="0">
+            <a:srgbClr val="000000">
+              <a:alpha val="63000"/>
+            </a:srgbClr>
+          </a:outerShdw>
+        </a:effectLst>
+      </dsp:spPr>
+      <dsp:style>
+        <a:lnRef idx="0">
+          <a:scrgbClr r="0" g="0" b="0"/>
+        </a:lnRef>
+        <a:fillRef idx="3">
+          <a:scrgbClr r="0" g="0" b="0"/>
+        </a:fillRef>
+        <a:effectRef idx="3">
+          <a:scrgbClr r="0" g="0" b="0"/>
+        </a:effectRef>
+        <a:fontRef idx="minor">
+          <a:schemeClr val="lt1"/>
+        </a:fontRef>
+      </dsp:style>
+      <dsp:txBody>
+        <a:bodyPr spcFirstLastPara="0" vert="horz" wrap="square" lIns="83820" tIns="83820" rIns="83820" bIns="83820" numCol="1" spcCol="1270" anchor="t" anchorCtr="0">
+          <a:noAutofit/>
+        </a:bodyPr>
+        <a:lstStyle/>
+        <a:p>
+          <a:pPr marL="0" lvl="0" indent="0" algn="l" defTabSz="977900">
+            <a:lnSpc>
+              <a:spcPct val="90000"/>
+            </a:lnSpc>
+            <a:spcBef>
+              <a:spcPct val="0"/>
+            </a:spcBef>
+            <a:spcAft>
+              <a:spcPct val="35000"/>
+            </a:spcAft>
+            <a:buNone/>
+          </a:pPr>
+          <a:r>
+            <a:rPr lang="de-DE" sz="2200" kern="1200" dirty="0">
+              <a:latin typeface="Avenir Next LT Pro Light" panose="020B0304020202020204" pitchFamily="34" charset="0"/>
+            </a:rPr>
+            <a:t>Option 3</a:t>
+          </a:r>
+          <a:endParaRPr lang="en-US" sz="2200" kern="1200" dirty="0">
+            <a:latin typeface="Avenir Next LT Pro Light" panose="020B0304020202020204" pitchFamily="34" charset="0"/>
+          </a:endParaRPr>
+        </a:p>
+        <a:p>
+          <a:pPr marL="171450" lvl="1" indent="-171450" algn="l" defTabSz="755650">
+            <a:lnSpc>
+              <a:spcPct val="90000"/>
+            </a:lnSpc>
+            <a:spcBef>
+              <a:spcPct val="0"/>
+            </a:spcBef>
+            <a:spcAft>
+              <a:spcPct val="15000"/>
+            </a:spcAft>
+            <a:buChar char="•"/>
+          </a:pPr>
+          <a:r>
+            <a:rPr lang="de-DE" sz="1700" kern="1200">
+              <a:solidFill>
+                <a:srgbClr val="FFFF00"/>
+              </a:solidFill>
+              <a:latin typeface="Avenir Next LT Pro Light" panose="020B0304020202020204" pitchFamily="34" charset="0"/>
+            </a:rPr>
+            <a:t>Keine Empfehlung (es gibt aber eine Anleitung)!</a:t>
+          </a:r>
+          <a:endParaRPr lang="en-US" sz="1700" kern="1200" dirty="0">
+            <a:latin typeface="Avenir Next LT Pro Light" panose="020B0304020202020204" pitchFamily="34" charset="0"/>
+          </a:endParaRPr>
+        </a:p>
+        <a:p>
+          <a:pPr marL="171450" lvl="1" indent="-171450" algn="l" defTabSz="755650">
+            <a:lnSpc>
+              <a:spcPct val="90000"/>
+            </a:lnSpc>
+            <a:spcBef>
+              <a:spcPct val="0"/>
+            </a:spcBef>
+            <a:spcAft>
+              <a:spcPct val="15000"/>
+            </a:spcAft>
+            <a:buChar char="•"/>
+          </a:pPr>
+          <a:r>
+            <a:rPr lang="en-US" sz="1700" kern="1200" dirty="0">
+              <a:solidFill>
+                <a:schemeClr val="tx1">
+                  <a:lumMod val="85000"/>
+                  <a:lumOff val="15000"/>
+                </a:schemeClr>
+              </a:solidFill>
+              <a:latin typeface="Avenir Next LT Pro Light" panose="020B0304020202020204" pitchFamily="34" charset="0"/>
+              <a:hlinkClick xmlns:r="http://schemas.openxmlformats.org/officeDocument/2006/relationships" r:id="rId3">
                 <a:extLst>
                   <a:ext uri="{A12FA001-AC4F-418D-AE19-62706E023703}">
                     <ahyp:hlinkClr xmlns:ahyp="http://schemas.microsoft.com/office/drawing/2018/hyperlinkcolor" val="tx"/>
@@ -7327,30 +7827,31 @@
             </a:rPr>
             <a:t>https://github.com/maximotus/skill-saturday-wordpress-portfolio-website/wiki/Option-3</a:t>
           </a:r>
-          <a:endParaRPr lang="en-US" sz="2700" kern="1200" dirty="0">
+          <a:endParaRPr lang="en-US" sz="1700" kern="1200" dirty="0">
             <a:solidFill>
               <a:schemeClr val="tx1">
                 <a:lumMod val="85000"/>
                 <a:lumOff val="15000"/>
               </a:schemeClr>
             </a:solidFill>
+            <a:latin typeface="Avenir Next LT Pro Light" panose="020B0304020202020204" pitchFamily="34" charset="0"/>
           </a:endParaRPr>
         </a:p>
       </dsp:txBody>
       <dsp:txXfrm>
-        <a:off x="2314860" y="2329150"/>
-        <a:ext cx="8200739" cy="2117409"/>
+        <a:off x="2242108" y="3057755"/>
+        <a:ext cx="8273491" cy="1389889"/>
       </dsp:txXfrm>
     </dsp:sp>
-    <dsp:sp modelId="{9CFC517E-AB5B-48A5-8D3A-042E49721566}">
+    <dsp:sp modelId="{51898C19-AC47-487B-87D8-39E177834466}">
       <dsp:nvSpPr>
         <dsp:cNvPr id="0" name=""/>
         <dsp:cNvSpPr/>
       </dsp:nvSpPr>
       <dsp:spPr>
         <a:xfrm>
-          <a:off x="211740" y="2540890"/>
-          <a:ext cx="2103120" cy="1693927"/>
+          <a:off x="138988" y="3196744"/>
+          <a:ext cx="2103120" cy="1111911"/>
         </a:xfrm>
         <a:prstGeom prst="roundRect">
           <a:avLst>
@@ -12234,6 +12735,356 @@
 </dgm:styleDef>
 </file>
 
+<file path=ppt/notesMasters/notesMaster1.xml><?xml version="1.0" encoding="utf-8"?>
+<p:notesMaster xmlns:a="http://schemas.openxmlformats.org/drawingml/2006/main" xmlns:r="http://schemas.openxmlformats.org/officeDocument/2006/relationships" xmlns:p="http://schemas.openxmlformats.org/presentationml/2006/main">
+  <p:cSld>
+    <p:bg>
+      <p:bgRef idx="1001">
+        <a:schemeClr val="bg1"/>
+      </p:bgRef>
+    </p:bg>
+    <p:spTree>
+      <p:nvGrpSpPr>
+        <p:cNvPr id="1" name=""/>
+        <p:cNvGrpSpPr/>
+        <p:nvPr/>
+      </p:nvGrpSpPr>
+      <p:grpSpPr>
+        <a:xfrm>
+          <a:off x="0" y="0"/>
+          <a:ext cx="0" cy="0"/>
+          <a:chOff x="0" y="0"/>
+          <a:chExt cx="0" cy="0"/>
+        </a:xfrm>
+      </p:grpSpPr>
+      <p:sp>
+        <p:nvSpPr>
+          <p:cNvPr id="2" name="Kopfzeilenplatzhalter 1"/>
+          <p:cNvSpPr>
+            <a:spLocks noGrp="1"/>
+          </p:cNvSpPr>
+          <p:nvPr>
+            <p:ph type="hdr" sz="quarter"/>
+          </p:nvPr>
+        </p:nvSpPr>
+        <p:spPr>
+          <a:xfrm>
+            <a:off x="0" y="0"/>
+            <a:ext cx="2971800" cy="458788"/>
+          </a:xfrm>
+          <a:prstGeom prst="rect">
+            <a:avLst/>
+          </a:prstGeom>
+        </p:spPr>
+        <p:txBody>
+          <a:bodyPr vert="horz" lIns="91440" tIns="45720" rIns="91440" bIns="45720" rtlCol="0"/>
+          <a:lstStyle>
+            <a:lvl1pPr algn="l">
+              <a:defRPr sz="1200"/>
+            </a:lvl1pPr>
+          </a:lstStyle>
+          <a:p>
+            <a:endParaRPr lang="en-US"/>
+          </a:p>
+        </p:txBody>
+      </p:sp>
+      <p:sp>
+        <p:nvSpPr>
+          <p:cNvPr id="3" name="Datumsplatzhalter 2"/>
+          <p:cNvSpPr>
+            <a:spLocks noGrp="1"/>
+          </p:cNvSpPr>
+          <p:nvPr>
+            <p:ph type="dt" idx="1"/>
+          </p:nvPr>
+        </p:nvSpPr>
+        <p:spPr>
+          <a:xfrm>
+            <a:off x="3884613" y="0"/>
+            <a:ext cx="2971800" cy="458788"/>
+          </a:xfrm>
+          <a:prstGeom prst="rect">
+            <a:avLst/>
+          </a:prstGeom>
+        </p:spPr>
+        <p:txBody>
+          <a:bodyPr vert="horz" lIns="91440" tIns="45720" rIns="91440" bIns="45720" rtlCol="0"/>
+          <a:lstStyle>
+            <a:lvl1pPr algn="r">
+              <a:defRPr sz="1200"/>
+            </a:lvl1pPr>
+          </a:lstStyle>
+          <a:p>
+            <a:fld id="{6FE1CEF1-211A-4667-8CEB-3F98090BFB89}" type="datetimeFigureOut">
+              <a:rPr lang="en-US" smtClean="0"/>
+              <a:t>10/8/2021</a:t>
+            </a:fld>
+            <a:endParaRPr lang="en-US"/>
+          </a:p>
+        </p:txBody>
+      </p:sp>
+      <p:sp>
+        <p:nvSpPr>
+          <p:cNvPr id="4" name="Folienbildplatzhalter 3"/>
+          <p:cNvSpPr>
+            <a:spLocks noGrp="1" noRot="1" noChangeAspect="1"/>
+          </p:cNvSpPr>
+          <p:nvPr>
+            <p:ph type="sldImg" idx="2"/>
+          </p:nvPr>
+        </p:nvSpPr>
+        <p:spPr>
+          <a:xfrm>
+            <a:off x="685800" y="1143000"/>
+            <a:ext cx="5486400" cy="3086100"/>
+          </a:xfrm>
+          <a:prstGeom prst="rect">
+            <a:avLst/>
+          </a:prstGeom>
+          <a:noFill/>
+          <a:ln w="12700">
+            <a:solidFill>
+              <a:prstClr val="black"/>
+            </a:solidFill>
+          </a:ln>
+        </p:spPr>
+        <p:txBody>
+          <a:bodyPr vert="horz" lIns="91440" tIns="45720" rIns="91440" bIns="45720" rtlCol="0" anchor="ctr"/>
+          <a:lstStyle/>
+          <a:p>
+            <a:endParaRPr lang="en-US"/>
+          </a:p>
+        </p:txBody>
+      </p:sp>
+      <p:sp>
+        <p:nvSpPr>
+          <p:cNvPr id="5" name="Notizenplatzhalter 4"/>
+          <p:cNvSpPr>
+            <a:spLocks noGrp="1"/>
+          </p:cNvSpPr>
+          <p:nvPr>
+            <p:ph type="body" sz="quarter" idx="3"/>
+          </p:nvPr>
+        </p:nvSpPr>
+        <p:spPr>
+          <a:xfrm>
+            <a:off x="685800" y="4400550"/>
+            <a:ext cx="5486400" cy="3600450"/>
+          </a:xfrm>
+          <a:prstGeom prst="rect">
+            <a:avLst/>
+          </a:prstGeom>
+        </p:spPr>
+        <p:txBody>
+          <a:bodyPr vert="horz" lIns="91440" tIns="45720" rIns="91440" bIns="45720" rtlCol="0"/>
+          <a:lstStyle/>
+          <a:p>
+            <a:pPr lvl="0"/>
+            <a:r>
+              <a:rPr lang="de-DE"/>
+              <a:t>Mastertextformat bearbeiten</a:t>
+            </a:r>
+          </a:p>
+          <a:p>
+            <a:pPr lvl="1"/>
+            <a:r>
+              <a:rPr lang="de-DE"/>
+              <a:t>Zweite Ebene</a:t>
+            </a:r>
+          </a:p>
+          <a:p>
+            <a:pPr lvl="2"/>
+            <a:r>
+              <a:rPr lang="de-DE"/>
+              <a:t>Dritte Ebene</a:t>
+            </a:r>
+          </a:p>
+          <a:p>
+            <a:pPr lvl="3"/>
+            <a:r>
+              <a:rPr lang="de-DE"/>
+              <a:t>Vierte Ebene</a:t>
+            </a:r>
+          </a:p>
+          <a:p>
+            <a:pPr lvl="4"/>
+            <a:r>
+              <a:rPr lang="de-DE"/>
+              <a:t>Fünfte Ebene</a:t>
+            </a:r>
+            <a:endParaRPr lang="en-US"/>
+          </a:p>
+        </p:txBody>
+      </p:sp>
+      <p:sp>
+        <p:nvSpPr>
+          <p:cNvPr id="6" name="Fußzeilenplatzhalter 5"/>
+          <p:cNvSpPr>
+            <a:spLocks noGrp="1"/>
+          </p:cNvSpPr>
+          <p:nvPr>
+            <p:ph type="ftr" sz="quarter" idx="4"/>
+          </p:nvPr>
+        </p:nvSpPr>
+        <p:spPr>
+          <a:xfrm>
+            <a:off x="0" y="8685213"/>
+            <a:ext cx="2971800" cy="458787"/>
+          </a:xfrm>
+          <a:prstGeom prst="rect">
+            <a:avLst/>
+          </a:prstGeom>
+        </p:spPr>
+        <p:txBody>
+          <a:bodyPr vert="horz" lIns="91440" tIns="45720" rIns="91440" bIns="45720" rtlCol="0" anchor="b"/>
+          <a:lstStyle>
+            <a:lvl1pPr algn="l">
+              <a:defRPr sz="1200"/>
+            </a:lvl1pPr>
+          </a:lstStyle>
+          <a:p>
+            <a:endParaRPr lang="en-US"/>
+          </a:p>
+        </p:txBody>
+      </p:sp>
+      <p:sp>
+        <p:nvSpPr>
+          <p:cNvPr id="7" name="Foliennummernplatzhalter 6"/>
+          <p:cNvSpPr>
+            <a:spLocks noGrp="1"/>
+          </p:cNvSpPr>
+          <p:nvPr>
+            <p:ph type="sldNum" sz="quarter" idx="5"/>
+          </p:nvPr>
+        </p:nvSpPr>
+        <p:spPr>
+          <a:xfrm>
+            <a:off x="3884613" y="8685213"/>
+            <a:ext cx="2971800" cy="458787"/>
+          </a:xfrm>
+          <a:prstGeom prst="rect">
+            <a:avLst/>
+          </a:prstGeom>
+        </p:spPr>
+        <p:txBody>
+          <a:bodyPr vert="horz" lIns="91440" tIns="45720" rIns="91440" bIns="45720" rtlCol="0" anchor="b"/>
+          <a:lstStyle>
+            <a:lvl1pPr algn="r">
+              <a:defRPr sz="1200"/>
+            </a:lvl1pPr>
+          </a:lstStyle>
+          <a:p>
+            <a:fld id="{F914E8A6-4783-4273-89E8-DFA9EEE457AA}" type="slidenum">
+              <a:rPr lang="en-US" smtClean="0"/>
+              <a:t>‹Nr.›</a:t>
+            </a:fld>
+            <a:endParaRPr lang="en-US"/>
+          </a:p>
+        </p:txBody>
+      </p:sp>
+    </p:spTree>
+    <p:extLst>
+      <p:ext uri="{BB962C8B-B14F-4D97-AF65-F5344CB8AC3E}">
+        <p14:creationId xmlns:p14="http://schemas.microsoft.com/office/powerpoint/2010/main" val="3224557648"/>
+      </p:ext>
+    </p:extLst>
+  </p:cSld>
+  <p:clrMap bg1="lt1" tx1="dk1" bg2="lt2" tx2="dk2" accent1="accent1" accent2="accent2" accent3="accent3" accent4="accent4" accent5="accent5" accent6="accent6" hlink="hlink" folHlink="folHlink"/>
+  <p:notesStyle>
+    <a:lvl1pPr marL="0" algn="l" defTabSz="914400" rtl="0" eaLnBrk="1" latinLnBrk="0" hangingPunct="1">
+      <a:defRPr sz="1200" kern="1200">
+        <a:solidFill>
+          <a:schemeClr val="tx1"/>
+        </a:solidFill>
+        <a:latin typeface="+mn-lt"/>
+        <a:ea typeface="+mn-ea"/>
+        <a:cs typeface="+mn-cs"/>
+      </a:defRPr>
+    </a:lvl1pPr>
+    <a:lvl2pPr marL="457200" algn="l" defTabSz="914400" rtl="0" eaLnBrk="1" latinLnBrk="0" hangingPunct="1">
+      <a:defRPr sz="1200" kern="1200">
+        <a:solidFill>
+          <a:schemeClr val="tx1"/>
+        </a:solidFill>
+        <a:latin typeface="+mn-lt"/>
+        <a:ea typeface="+mn-ea"/>
+        <a:cs typeface="+mn-cs"/>
+      </a:defRPr>
+    </a:lvl2pPr>
+    <a:lvl3pPr marL="914400" algn="l" defTabSz="914400" rtl="0" eaLnBrk="1" latinLnBrk="0" hangingPunct="1">
+      <a:defRPr sz="1200" kern="1200">
+        <a:solidFill>
+          <a:schemeClr val="tx1"/>
+        </a:solidFill>
+        <a:latin typeface="+mn-lt"/>
+        <a:ea typeface="+mn-ea"/>
+        <a:cs typeface="+mn-cs"/>
+      </a:defRPr>
+    </a:lvl3pPr>
+    <a:lvl4pPr marL="1371600" algn="l" defTabSz="914400" rtl="0" eaLnBrk="1" latinLnBrk="0" hangingPunct="1">
+      <a:defRPr sz="1200" kern="1200">
+        <a:solidFill>
+          <a:schemeClr val="tx1"/>
+        </a:solidFill>
+        <a:latin typeface="+mn-lt"/>
+        <a:ea typeface="+mn-ea"/>
+        <a:cs typeface="+mn-cs"/>
+      </a:defRPr>
+    </a:lvl4pPr>
+    <a:lvl5pPr marL="1828800" algn="l" defTabSz="914400" rtl="0" eaLnBrk="1" latinLnBrk="0" hangingPunct="1">
+      <a:defRPr sz="1200" kern="1200">
+        <a:solidFill>
+          <a:schemeClr val="tx1"/>
+        </a:solidFill>
+        <a:latin typeface="+mn-lt"/>
+        <a:ea typeface="+mn-ea"/>
+        <a:cs typeface="+mn-cs"/>
+      </a:defRPr>
+    </a:lvl5pPr>
+    <a:lvl6pPr marL="2286000" algn="l" defTabSz="914400" rtl="0" eaLnBrk="1" latinLnBrk="0" hangingPunct="1">
+      <a:defRPr sz="1200" kern="1200">
+        <a:solidFill>
+          <a:schemeClr val="tx1"/>
+        </a:solidFill>
+        <a:latin typeface="+mn-lt"/>
+        <a:ea typeface="+mn-ea"/>
+        <a:cs typeface="+mn-cs"/>
+      </a:defRPr>
+    </a:lvl6pPr>
+    <a:lvl7pPr marL="2743200" algn="l" defTabSz="914400" rtl="0" eaLnBrk="1" latinLnBrk="0" hangingPunct="1">
+      <a:defRPr sz="1200" kern="1200">
+        <a:solidFill>
+          <a:schemeClr val="tx1"/>
+        </a:solidFill>
+        <a:latin typeface="+mn-lt"/>
+        <a:ea typeface="+mn-ea"/>
+        <a:cs typeface="+mn-cs"/>
+      </a:defRPr>
+    </a:lvl7pPr>
+    <a:lvl8pPr marL="3200400" algn="l" defTabSz="914400" rtl="0" eaLnBrk="1" latinLnBrk="0" hangingPunct="1">
+      <a:defRPr sz="1200" kern="1200">
+        <a:solidFill>
+          <a:schemeClr val="tx1"/>
+        </a:solidFill>
+        <a:latin typeface="+mn-lt"/>
+        <a:ea typeface="+mn-ea"/>
+        <a:cs typeface="+mn-cs"/>
+      </a:defRPr>
+    </a:lvl8pPr>
+    <a:lvl9pPr marL="3657600" algn="l" defTabSz="914400" rtl="0" eaLnBrk="1" latinLnBrk="0" hangingPunct="1">
+      <a:defRPr sz="1200" kern="1200">
+        <a:solidFill>
+          <a:schemeClr val="tx1"/>
+        </a:solidFill>
+        <a:latin typeface="+mn-lt"/>
+        <a:ea typeface="+mn-ea"/>
+        <a:cs typeface="+mn-cs"/>
+      </a:defRPr>
+    </a:lvl9pPr>
+  </p:notesStyle>
+</p:notesMaster>
+</file>
+
 <file path=ppt/slideLayouts/slideLayout1.xml><?xml version="1.0" encoding="utf-8"?>
 <p:sldLayout xmlns:a="http://schemas.openxmlformats.org/drawingml/2006/main" xmlns:r="http://schemas.openxmlformats.org/officeDocument/2006/relationships" xmlns:p="http://schemas.openxmlformats.org/presentationml/2006/main" type="title" preserve="1">
   <p:cSld name="Titelfolie">
@@ -12383,7 +13234,7 @@
           <a:p>
             <a:fld id="{6843026C-6EB5-47EC-8B51-A60EA406D1EB}" type="datetimeFigureOut">
               <a:rPr lang="en-US" smtClean="0"/>
-              <a:t>10/7/2021</a:t>
+              <a:t>10/8/2021</a:t>
             </a:fld>
             <a:endParaRPr lang="en-US"/>
           </a:p>
@@ -12583,7 +13434,7 @@
           <a:p>
             <a:fld id="{6843026C-6EB5-47EC-8B51-A60EA406D1EB}" type="datetimeFigureOut">
               <a:rPr lang="en-US" smtClean="0"/>
-              <a:t>10/7/2021</a:t>
+              <a:t>10/8/2021</a:t>
             </a:fld>
             <a:endParaRPr lang="en-US"/>
           </a:p>
@@ -12793,7 +13644,7 @@
           <a:p>
             <a:fld id="{6843026C-6EB5-47EC-8B51-A60EA406D1EB}" type="datetimeFigureOut">
               <a:rPr lang="en-US" smtClean="0"/>
-              <a:t>10/7/2021</a:t>
+              <a:t>10/8/2021</a:t>
             </a:fld>
             <a:endParaRPr lang="en-US"/>
           </a:p>
@@ -12993,7 +13844,7 @@
           <a:p>
             <a:fld id="{6843026C-6EB5-47EC-8B51-A60EA406D1EB}" type="datetimeFigureOut">
               <a:rPr lang="en-US" smtClean="0"/>
-              <a:t>10/7/2021</a:t>
+              <a:t>10/8/2021</a:t>
             </a:fld>
             <a:endParaRPr lang="en-US"/>
           </a:p>
@@ -13269,7 +14120,7 @@
           <a:p>
             <a:fld id="{6843026C-6EB5-47EC-8B51-A60EA406D1EB}" type="datetimeFigureOut">
               <a:rPr lang="en-US" smtClean="0"/>
-              <a:t>10/7/2021</a:t>
+              <a:t>10/8/2021</a:t>
             </a:fld>
             <a:endParaRPr lang="en-US"/>
           </a:p>
@@ -13537,7 +14388,7 @@
           <a:p>
             <a:fld id="{6843026C-6EB5-47EC-8B51-A60EA406D1EB}" type="datetimeFigureOut">
               <a:rPr lang="en-US" smtClean="0"/>
-              <a:t>10/7/2021</a:t>
+              <a:t>10/8/2021</a:t>
             </a:fld>
             <a:endParaRPr lang="en-US"/>
           </a:p>
@@ -13952,7 +14803,7 @@
           <a:p>
             <a:fld id="{6843026C-6EB5-47EC-8B51-A60EA406D1EB}" type="datetimeFigureOut">
               <a:rPr lang="en-US" smtClean="0"/>
-              <a:t>10/7/2021</a:t>
+              <a:t>10/8/2021</a:t>
             </a:fld>
             <a:endParaRPr lang="en-US"/>
           </a:p>
@@ -14094,7 +14945,7 @@
           <a:p>
             <a:fld id="{6843026C-6EB5-47EC-8B51-A60EA406D1EB}" type="datetimeFigureOut">
               <a:rPr lang="en-US" smtClean="0"/>
-              <a:t>10/7/2021</a:t>
+              <a:t>10/8/2021</a:t>
             </a:fld>
             <a:endParaRPr lang="en-US"/>
           </a:p>
@@ -14207,7 +15058,7 @@
           <a:p>
             <a:fld id="{6843026C-6EB5-47EC-8B51-A60EA406D1EB}" type="datetimeFigureOut">
               <a:rPr lang="en-US" smtClean="0"/>
-              <a:t>10/7/2021</a:t>
+              <a:t>10/8/2021</a:t>
             </a:fld>
             <a:endParaRPr lang="en-US"/>
           </a:p>
@@ -14520,7 +15371,7 @@
           <a:p>
             <a:fld id="{6843026C-6EB5-47EC-8B51-A60EA406D1EB}" type="datetimeFigureOut">
               <a:rPr lang="en-US" smtClean="0"/>
-              <a:t>10/7/2021</a:t>
+              <a:t>10/8/2021</a:t>
             </a:fld>
             <a:endParaRPr lang="en-US"/>
           </a:p>
@@ -14809,7 +15660,7 @@
           <a:p>
             <a:fld id="{6843026C-6EB5-47EC-8B51-A60EA406D1EB}" type="datetimeFigureOut">
               <a:rPr lang="en-US" smtClean="0"/>
-              <a:t>10/7/2021</a:t>
+              <a:t>10/8/2021</a:t>
             </a:fld>
             <a:endParaRPr lang="en-US"/>
           </a:p>
@@ -15052,7 +15903,7 @@
           <a:p>
             <a:fld id="{6843026C-6EB5-47EC-8B51-A60EA406D1EB}" type="datetimeFigureOut">
               <a:rPr lang="en-US" smtClean="0"/>
-              <a:t>10/7/2021</a:t>
+              <a:t>10/8/2021</a:t>
             </a:fld>
             <a:endParaRPr lang="en-US"/>
           </a:p>
@@ -15677,6 +16528,225 @@
           <p:cNvPr id="2" name="Titel 1">
             <a:extLst>
               <a:ext uri="{FF2B5EF4-FFF2-40B4-BE49-F238E27FC236}">
+                <a16:creationId xmlns:a16="http://schemas.microsoft.com/office/drawing/2014/main" id="{2DE3D5A1-87BE-4970-A6BA-E6C1A071C38E}"/>
+              </a:ext>
+            </a:extLst>
+          </p:cNvPr>
+          <p:cNvSpPr>
+            <a:spLocks noGrp="1"/>
+          </p:cNvSpPr>
+          <p:nvPr>
+            <p:ph type="title"/>
+          </p:nvPr>
+        </p:nvSpPr>
+        <p:spPr/>
+        <p:txBody>
+          <a:bodyPr/>
+          <a:lstStyle/>
+          <a:p>
+            <a:r>
+              <a:rPr lang="de-DE" dirty="0">
+                <a:solidFill>
+                  <a:schemeClr val="bg1"/>
+                </a:solidFill>
+                <a:latin typeface="Avenir Next LT Pro Light" panose="020B0304020202020204" pitchFamily="34" charset="0"/>
+              </a:rPr>
+              <a:t>WordPress Installation</a:t>
+            </a:r>
+            <a:endParaRPr lang="en-US" dirty="0">
+              <a:solidFill>
+                <a:schemeClr val="bg1"/>
+              </a:solidFill>
+              <a:latin typeface="Avenir Next LT Pro Light" panose="020B0304020202020204" pitchFamily="34" charset="0"/>
+            </a:endParaRPr>
+          </a:p>
+        </p:txBody>
+      </p:sp>
+      <p:pic>
+        <p:nvPicPr>
+          <p:cNvPr id="9" name="Inhaltsplatzhalter 8" descr="Stoppuhr">
+            <a:extLst>
+              <a:ext uri="{FF2B5EF4-FFF2-40B4-BE49-F238E27FC236}">
+                <a16:creationId xmlns:a16="http://schemas.microsoft.com/office/drawing/2014/main" id="{7A8D0E6D-3D6C-49AD-9331-04BF2478D466}"/>
+              </a:ext>
+            </a:extLst>
+          </p:cNvPr>
+          <p:cNvPicPr>
+            <a:picLocks noGrp="1" noChangeAspect="1"/>
+          </p:cNvPicPr>
+          <p:nvPr>
+            <p:ph idx="1"/>
+          </p:nvPr>
+        </p:nvPicPr>
+        <p:blipFill>
+          <a:blip r:embed="rId2">
+            <a:extLst>
+              <a:ext uri="{28A0092B-C50C-407E-A947-70E740481C1C}">
+                <a14:useLocalDpi xmlns:a14="http://schemas.microsoft.com/office/drawing/2010/main" val="0"/>
+              </a:ext>
+              <a:ext uri="{96DAC541-7B7A-43D3-8B79-37D633B846F1}">
+                <asvg:svgBlip xmlns:asvg="http://schemas.microsoft.com/office/drawing/2016/SVG/main" r:embed="rId3"/>
+              </a:ext>
+            </a:extLst>
+          </a:blip>
+          <a:stretch>
+            <a:fillRect/>
+          </a:stretch>
+        </p:blipFill>
+        <p:spPr>
+          <a:xfrm>
+            <a:off x="838199" y="1690687"/>
+            <a:ext cx="4682067" cy="4682067"/>
+          </a:xfrm>
+        </p:spPr>
+      </p:pic>
+      <p:sp>
+        <p:nvSpPr>
+          <p:cNvPr id="10" name="Textfeld 9">
+            <a:extLst>
+              <a:ext uri="{FF2B5EF4-FFF2-40B4-BE49-F238E27FC236}">
+                <a16:creationId xmlns:a16="http://schemas.microsoft.com/office/drawing/2014/main" id="{0019AF28-98ED-4E61-BCA4-22883C2607D5}"/>
+              </a:ext>
+            </a:extLst>
+          </p:cNvPr>
+          <p:cNvSpPr txBox="1"/>
+          <p:nvPr/>
+        </p:nvSpPr>
+        <p:spPr>
+          <a:xfrm>
+            <a:off x="5520266" y="3381282"/>
+            <a:ext cx="5960533" cy="1323439"/>
+          </a:xfrm>
+          <a:prstGeom prst="rect">
+            <a:avLst/>
+          </a:prstGeom>
+          <a:noFill/>
+        </p:spPr>
+        <p:txBody>
+          <a:bodyPr wrap="square" rtlCol="0">
+            <a:spAutoFit/>
+          </a:bodyPr>
+          <a:lstStyle/>
+          <a:p>
+            <a:pPr algn="ctr"/>
+            <a:r>
+              <a:rPr lang="de-DE" sz="4000" dirty="0">
+                <a:solidFill>
+                  <a:schemeClr val="bg1"/>
+                </a:solidFill>
+                <a:latin typeface="Avenir Next LT Pro Light" panose="020B0304020202020204" pitchFamily="34" charset="0"/>
+              </a:rPr>
+              <a:t>Selbstständiges Arbeiten</a:t>
+            </a:r>
+          </a:p>
+          <a:p>
+            <a:pPr algn="ctr"/>
+            <a:r>
+              <a:rPr lang="de-DE" sz="4000" dirty="0">
+                <a:solidFill>
+                  <a:schemeClr val="bg1"/>
+                </a:solidFill>
+                <a:latin typeface="Avenir Next LT Pro Light" panose="020B0304020202020204" pitchFamily="34" charset="0"/>
+              </a:rPr>
+              <a:t>ca. 15:45 –  16:00</a:t>
+            </a:r>
+            <a:endParaRPr lang="en-US" sz="4000" dirty="0">
+              <a:solidFill>
+                <a:schemeClr val="bg1"/>
+              </a:solidFill>
+              <a:latin typeface="Avenir Next LT Pro Light" panose="020B0304020202020204" pitchFamily="34" charset="0"/>
+            </a:endParaRPr>
+          </a:p>
+        </p:txBody>
+      </p:sp>
+      <p:sp>
+        <p:nvSpPr>
+          <p:cNvPr id="5" name="Fußzeilenplatzhalter 2">
+            <a:extLst>
+              <a:ext uri="{FF2B5EF4-FFF2-40B4-BE49-F238E27FC236}">
+                <a16:creationId xmlns:a16="http://schemas.microsoft.com/office/drawing/2014/main" id="{2C0A2C48-DFBF-4D09-A178-401090FB639F}"/>
+              </a:ext>
+            </a:extLst>
+          </p:cNvPr>
+          <p:cNvSpPr>
+            <a:spLocks noGrp="1"/>
+          </p:cNvSpPr>
+          <p:nvPr>
+            <p:ph type="ftr" sz="quarter" idx="11"/>
+          </p:nvPr>
+        </p:nvSpPr>
+        <p:spPr>
+          <a:xfrm>
+            <a:off x="4038600" y="6356350"/>
+            <a:ext cx="4114800" cy="365125"/>
+          </a:xfrm>
+        </p:spPr>
+        <p:txBody>
+          <a:bodyPr/>
+          <a:lstStyle/>
+          <a:p>
+            <a:r>
+              <a:rPr lang="en-US" dirty="0"/>
+              <a:t>1. </a:t>
+            </a:r>
+            <a:r>
+              <a:rPr lang="en-US" dirty="0" err="1">
+                <a:latin typeface="Avenir Next LT Pro Light" panose="020B0304020202020204" pitchFamily="34" charset="0"/>
+              </a:rPr>
+              <a:t>Lernrunde</a:t>
+            </a:r>
+            <a:endParaRPr lang="en-US" dirty="0">
+              <a:latin typeface="Avenir Next LT Pro Light" panose="020B0304020202020204" pitchFamily="34" charset="0"/>
+            </a:endParaRPr>
+          </a:p>
+        </p:txBody>
+      </p:sp>
+    </p:spTree>
+    <p:extLst>
+      <p:ext uri="{BB962C8B-B14F-4D97-AF65-F5344CB8AC3E}">
+        <p14:creationId xmlns:p14="http://schemas.microsoft.com/office/powerpoint/2010/main" val="3449857767"/>
+      </p:ext>
+    </p:extLst>
+  </p:cSld>
+  <p:clrMapOvr>
+    <a:masterClrMapping/>
+  </p:clrMapOvr>
+</p:sld>
+</file>
+
+<file path=ppt/slides/slide11.xml><?xml version="1.0" encoding="utf-8"?>
+<p:sld xmlns:a="http://schemas.openxmlformats.org/drawingml/2006/main" xmlns:r="http://schemas.openxmlformats.org/officeDocument/2006/relationships" xmlns:p="http://schemas.openxmlformats.org/presentationml/2006/main">
+  <p:cSld>
+    <p:bg>
+      <p:bgPr>
+        <a:solidFill>
+          <a:schemeClr val="tx1">
+            <a:lumMod val="85000"/>
+            <a:lumOff val="15000"/>
+          </a:schemeClr>
+        </a:solidFill>
+        <a:effectLst/>
+      </p:bgPr>
+    </p:bg>
+    <p:spTree>
+      <p:nvGrpSpPr>
+        <p:cNvPr id="1" name=""/>
+        <p:cNvGrpSpPr/>
+        <p:nvPr/>
+      </p:nvGrpSpPr>
+      <p:grpSpPr>
+        <a:xfrm>
+          <a:off x="0" y="0"/>
+          <a:ext cx="0" cy="0"/>
+          <a:chOff x="0" y="0"/>
+          <a:chExt cx="0" cy="0"/>
+        </a:xfrm>
+      </p:grpSpPr>
+      <p:sp>
+        <p:nvSpPr>
+          <p:cNvPr id="2" name="Titel 1">
+            <a:extLst>
+              <a:ext uri="{FF2B5EF4-FFF2-40B4-BE49-F238E27FC236}">
                 <a16:creationId xmlns:a16="http://schemas.microsoft.com/office/drawing/2014/main" id="{747753E9-46C1-43E7-BF55-1C39C3D2263B}"/>
               </a:ext>
             </a:extLst>
@@ -15810,7 +16880,175 @@
 </p:sld>
 </file>
 
-<file path=ppt/slides/slide11.xml><?xml version="1.0" encoding="utf-8"?>
+<file path=ppt/slides/slide12.xml><?xml version="1.0" encoding="utf-8"?>
+<p:sld xmlns:a="http://schemas.openxmlformats.org/drawingml/2006/main" xmlns:r="http://schemas.openxmlformats.org/officeDocument/2006/relationships" xmlns:p="http://schemas.openxmlformats.org/presentationml/2006/main">
+  <p:cSld>
+    <p:bg>
+      <p:bgPr>
+        <a:solidFill>
+          <a:schemeClr val="tx1">
+            <a:lumMod val="85000"/>
+            <a:lumOff val="15000"/>
+          </a:schemeClr>
+        </a:solidFill>
+        <a:effectLst/>
+      </p:bgPr>
+    </p:bg>
+    <p:spTree>
+      <p:nvGrpSpPr>
+        <p:cNvPr id="1" name=""/>
+        <p:cNvGrpSpPr/>
+        <p:nvPr/>
+      </p:nvGrpSpPr>
+      <p:grpSpPr>
+        <a:xfrm>
+          <a:off x="0" y="0"/>
+          <a:ext cx="0" cy="0"/>
+          <a:chOff x="0" y="0"/>
+          <a:chExt cx="0" cy="0"/>
+        </a:xfrm>
+      </p:grpSpPr>
+      <p:sp>
+        <p:nvSpPr>
+          <p:cNvPr id="2" name="Titel 1">
+            <a:extLst>
+              <a:ext uri="{FF2B5EF4-FFF2-40B4-BE49-F238E27FC236}">
+                <a16:creationId xmlns:a16="http://schemas.microsoft.com/office/drawing/2014/main" id="{D946A9FE-1145-4A11-A6CA-06FE01FC4FC4}"/>
+              </a:ext>
+            </a:extLst>
+          </p:cNvPr>
+          <p:cNvSpPr>
+            <a:spLocks noGrp="1"/>
+          </p:cNvSpPr>
+          <p:nvPr>
+            <p:ph type="title"/>
+          </p:nvPr>
+        </p:nvSpPr>
+        <p:spPr/>
+        <p:txBody>
+          <a:bodyPr/>
+          <a:lstStyle/>
+          <a:p>
+            <a:r>
+              <a:rPr lang="de-DE" dirty="0">
+                <a:solidFill>
+                  <a:schemeClr val="bg1"/>
+                </a:solidFill>
+                <a:latin typeface="Avenir Next LT Pro Light" panose="020B0304020202020204" pitchFamily="34" charset="0"/>
+              </a:rPr>
+              <a:t>Inhalt der 2. Lernrunde</a:t>
+            </a:r>
+            <a:endParaRPr lang="en-US" dirty="0">
+              <a:solidFill>
+                <a:schemeClr val="bg1"/>
+              </a:solidFill>
+              <a:latin typeface="Avenir Next LT Pro Light" panose="020B0304020202020204" pitchFamily="34" charset="0"/>
+            </a:endParaRPr>
+          </a:p>
+        </p:txBody>
+      </p:sp>
+      <p:sp>
+        <p:nvSpPr>
+          <p:cNvPr id="3" name="Inhaltsplatzhalter 2">
+            <a:extLst>
+              <a:ext uri="{FF2B5EF4-FFF2-40B4-BE49-F238E27FC236}">
+                <a16:creationId xmlns:a16="http://schemas.microsoft.com/office/drawing/2014/main" id="{F09921A0-2B24-4EB9-A6B8-364BEA71F654}"/>
+              </a:ext>
+            </a:extLst>
+          </p:cNvPr>
+          <p:cNvSpPr>
+            <a:spLocks noGrp="1"/>
+          </p:cNvSpPr>
+          <p:nvPr>
+            <p:ph idx="1"/>
+          </p:nvPr>
+        </p:nvSpPr>
+        <p:spPr/>
+        <p:txBody>
+          <a:bodyPr/>
+          <a:lstStyle/>
+          <a:p>
+            <a:r>
+              <a:rPr lang="de-DE" dirty="0">
+                <a:solidFill>
+                  <a:schemeClr val="bg1"/>
+                </a:solidFill>
+                <a:latin typeface="Avenir Next LT Pro Light" panose="020B0304020202020204" pitchFamily="34" charset="0"/>
+              </a:rPr>
+              <a:t>SSL/TLS Verschlüsselung</a:t>
+            </a:r>
+          </a:p>
+          <a:p>
+            <a:r>
+              <a:rPr lang="de-DE" dirty="0">
+                <a:solidFill>
+                  <a:schemeClr val="bg1"/>
+                </a:solidFill>
+                <a:latin typeface="Avenir Next LT Pro Light" panose="020B0304020202020204" pitchFamily="34" charset="0"/>
+              </a:rPr>
+              <a:t>SSL-Zertifikat / HTTPS – Selbstständiges Arbeiten</a:t>
+            </a:r>
+          </a:p>
+          <a:p>
+            <a:r>
+              <a:rPr lang="de-DE" dirty="0">
+                <a:solidFill>
+                  <a:schemeClr val="bg1"/>
+                </a:solidFill>
+                <a:latin typeface="Avenir Next LT Pro Light" panose="020B0304020202020204" pitchFamily="34" charset="0"/>
+              </a:rPr>
+              <a:t>WordPress – Einführung</a:t>
+            </a:r>
+          </a:p>
+          <a:p>
+            <a:r>
+              <a:rPr lang="de-DE" dirty="0">
+                <a:solidFill>
+                  <a:schemeClr val="bg1"/>
+                </a:solidFill>
+                <a:latin typeface="Avenir Next LT Pro Light" panose="020B0304020202020204" pitchFamily="34" charset="0"/>
+              </a:rPr>
+              <a:t>WordPress – Design</a:t>
+            </a:r>
+            <a:endParaRPr lang="en-US" dirty="0">
+              <a:solidFill>
+                <a:schemeClr val="bg1"/>
+              </a:solidFill>
+              <a:latin typeface="Avenir Next LT Pro Light" panose="020B0304020202020204" pitchFamily="34" charset="0"/>
+            </a:endParaRPr>
+          </a:p>
+          <a:p>
+            <a:endParaRPr lang="en-US" dirty="0">
+              <a:solidFill>
+                <a:schemeClr val="bg1"/>
+              </a:solidFill>
+              <a:latin typeface="Avenir Next LT Pro Light" panose="020B0304020202020204" pitchFamily="34" charset="0"/>
+            </a:endParaRPr>
+          </a:p>
+          <a:p>
+            <a:endParaRPr lang="en-US" dirty="0">
+              <a:solidFill>
+                <a:schemeClr val="bg1"/>
+              </a:solidFill>
+              <a:latin typeface="Avenir Next LT Pro Light" panose="020B0304020202020204" pitchFamily="34" charset="0"/>
+            </a:endParaRPr>
+          </a:p>
+        </p:txBody>
+      </p:sp>
+    </p:spTree>
+    <p:extLst>
+      <p:ext uri="{BB962C8B-B14F-4D97-AF65-F5344CB8AC3E}">
+        <p14:creationId xmlns:p14="http://schemas.microsoft.com/office/powerpoint/2010/main" val="1885622086"/>
+      </p:ext>
+    </p:extLst>
+  </p:cSld>
+  <p:clrMapOvr>
+    <a:masterClrMapping/>
+  </p:clrMapOvr>
+</p:sld>
+</file>
+
+<file path=ppt/slides/slide13.xml><?xml version="1.0" encoding="utf-8"?>
 <p:sld xmlns:a="http://schemas.openxmlformats.org/drawingml/2006/main" xmlns:r="http://schemas.openxmlformats.org/officeDocument/2006/relationships" xmlns:p="http://schemas.openxmlformats.org/presentationml/2006/main">
   <p:cSld>
     <p:bg>
@@ -15910,6 +17148,48 @@
           </a:prstGeom>
         </p:spPr>
       </p:pic>
+      <p:sp>
+        <p:nvSpPr>
+          <p:cNvPr id="4" name="Fußzeilenplatzhalter 2">
+            <a:extLst>
+              <a:ext uri="{FF2B5EF4-FFF2-40B4-BE49-F238E27FC236}">
+                <a16:creationId xmlns:a16="http://schemas.microsoft.com/office/drawing/2014/main" id="{1E4672F7-7C3B-48F6-9750-2AD8052F7A78}"/>
+              </a:ext>
+            </a:extLst>
+          </p:cNvPr>
+          <p:cNvSpPr>
+            <a:spLocks noGrp="1"/>
+          </p:cNvSpPr>
+          <p:nvPr>
+            <p:ph type="ftr" sz="quarter" idx="11"/>
+          </p:nvPr>
+        </p:nvSpPr>
+        <p:spPr>
+          <a:xfrm>
+            <a:off x="4038600" y="6356350"/>
+            <a:ext cx="4114800" cy="365125"/>
+          </a:xfrm>
+        </p:spPr>
+        <p:txBody>
+          <a:bodyPr/>
+          <a:lstStyle/>
+          <a:p>
+            <a:r>
+              <a:rPr lang="en-US" dirty="0"/>
+              <a:t>2. </a:t>
+            </a:r>
+            <a:r>
+              <a:rPr lang="en-US" dirty="0" err="1">
+                <a:latin typeface="Avenir Next LT Pro Light" panose="020B0304020202020204" pitchFamily="34" charset="0"/>
+              </a:rPr>
+              <a:t>Lernrunde</a:t>
+            </a:r>
+            <a:endParaRPr lang="en-US" dirty="0">
+              <a:latin typeface="Avenir Next LT Pro Light" panose="020B0304020202020204" pitchFamily="34" charset="0"/>
+            </a:endParaRPr>
+          </a:p>
+        </p:txBody>
+      </p:sp>
     </p:spTree>
     <p:extLst>
       <p:ext uri="{BB962C8B-B14F-4D97-AF65-F5344CB8AC3E}">
@@ -16058,7 +17338,7 @@
 </p:sld>
 </file>
 
-<file path=ppt/slides/slide12.xml><?xml version="1.0" encoding="utf-8"?>
+<file path=ppt/slides/slide14.xml><?xml version="1.0" encoding="utf-8"?>
 <p:sld xmlns:a="http://schemas.openxmlformats.org/drawingml/2006/main" xmlns:r="http://schemas.openxmlformats.org/officeDocument/2006/relationships" xmlns:p="http://schemas.openxmlformats.org/presentationml/2006/main">
   <p:cSld>
     <p:bg>
@@ -16178,8 +17458,8 @@
         </p:nvSpPr>
         <p:spPr>
           <a:xfrm>
-            <a:off x="5520266" y="3677778"/>
-            <a:ext cx="5960533" cy="707886"/>
+            <a:off x="5520266" y="3370001"/>
+            <a:ext cx="5960533" cy="1323439"/>
           </a:xfrm>
           <a:prstGeom prst="rect">
             <a:avLst/>
@@ -16200,12 +17480,66 @@
                 </a:solidFill>
                 <a:latin typeface="Avenir Next LT Pro Light" panose="020B0304020202020204" pitchFamily="34" charset="0"/>
               </a:rPr>
+              <a:t>Selbstständiges Arbeiten</a:t>
+            </a:r>
+          </a:p>
+          <a:p>
+            <a:pPr algn="ctr"/>
+            <a:r>
+              <a:rPr lang="de-DE" sz="4000" dirty="0">
+                <a:solidFill>
+                  <a:schemeClr val="bg1"/>
+                </a:solidFill>
+                <a:latin typeface="Avenir Next LT Pro Light" panose="020B0304020202020204" pitchFamily="34" charset="0"/>
+              </a:rPr>
               <a:t>ca. 16:30 –  16:45</a:t>
             </a:r>
             <a:endParaRPr lang="en-US" sz="4000" dirty="0">
               <a:solidFill>
                 <a:schemeClr val="bg1"/>
               </a:solidFill>
+              <a:latin typeface="Avenir Next LT Pro Light" panose="020B0304020202020204" pitchFamily="34" charset="0"/>
+            </a:endParaRPr>
+          </a:p>
+        </p:txBody>
+      </p:sp>
+      <p:sp>
+        <p:nvSpPr>
+          <p:cNvPr id="6" name="Fußzeilenplatzhalter 2">
+            <a:extLst>
+              <a:ext uri="{FF2B5EF4-FFF2-40B4-BE49-F238E27FC236}">
+                <a16:creationId xmlns:a16="http://schemas.microsoft.com/office/drawing/2014/main" id="{3E27AA79-CB16-49F4-9F2C-0A547791296C}"/>
+              </a:ext>
+            </a:extLst>
+          </p:cNvPr>
+          <p:cNvSpPr>
+            <a:spLocks noGrp="1"/>
+          </p:cNvSpPr>
+          <p:nvPr>
+            <p:ph type="ftr" sz="quarter" idx="11"/>
+          </p:nvPr>
+        </p:nvSpPr>
+        <p:spPr>
+          <a:xfrm>
+            <a:off x="4038600" y="6356350"/>
+            <a:ext cx="4114800" cy="365125"/>
+          </a:xfrm>
+        </p:spPr>
+        <p:txBody>
+          <a:bodyPr/>
+          <a:lstStyle/>
+          <a:p>
+            <a:r>
+              <a:rPr lang="en-US" dirty="0"/>
+              <a:t>2. </a:t>
+            </a:r>
+            <a:r>
+              <a:rPr lang="en-US" dirty="0" err="1">
+                <a:latin typeface="Avenir Next LT Pro Light" panose="020B0304020202020204" pitchFamily="34" charset="0"/>
+              </a:rPr>
+              <a:t>Lernrunde</a:t>
+            </a:r>
+            <a:endParaRPr lang="en-US" dirty="0">
               <a:latin typeface="Avenir Next LT Pro Light" panose="020B0304020202020204" pitchFamily="34" charset="0"/>
             </a:endParaRPr>
           </a:p>
@@ -16224,7 +17558,7 @@
 </p:sld>
 </file>
 
-<file path=ppt/slides/slide13.xml><?xml version="1.0" encoding="utf-8"?>
+<file path=ppt/slides/slide15.xml><?xml version="1.0" encoding="utf-8"?>
 <p:sld xmlns:a="http://schemas.openxmlformats.org/drawingml/2006/main" xmlns:r="http://schemas.openxmlformats.org/officeDocument/2006/relationships" xmlns:p="http://schemas.openxmlformats.org/presentationml/2006/main">
   <p:cSld>
     <p:bg>
@@ -16377,6 +17711,48 @@
           </a:p>
         </p:txBody>
       </p:sp>
+      <p:sp>
+        <p:nvSpPr>
+          <p:cNvPr id="6" name="Fußzeilenplatzhalter 2">
+            <a:extLst>
+              <a:ext uri="{FF2B5EF4-FFF2-40B4-BE49-F238E27FC236}">
+                <a16:creationId xmlns:a16="http://schemas.microsoft.com/office/drawing/2014/main" id="{91C70F8E-BBD8-4337-B7F7-5A057C7987A9}"/>
+              </a:ext>
+            </a:extLst>
+          </p:cNvPr>
+          <p:cNvSpPr>
+            <a:spLocks noGrp="1"/>
+          </p:cNvSpPr>
+          <p:nvPr>
+            <p:ph type="ftr" sz="quarter" idx="11"/>
+          </p:nvPr>
+        </p:nvSpPr>
+        <p:spPr>
+          <a:xfrm>
+            <a:off x="4038600" y="6356350"/>
+            <a:ext cx="4114800" cy="365125"/>
+          </a:xfrm>
+        </p:spPr>
+        <p:txBody>
+          <a:bodyPr/>
+          <a:lstStyle/>
+          <a:p>
+            <a:r>
+              <a:rPr lang="en-US" dirty="0"/>
+              <a:t>2. </a:t>
+            </a:r>
+            <a:r>
+              <a:rPr lang="en-US" dirty="0" err="1">
+                <a:latin typeface="Avenir Next LT Pro Light" panose="020B0304020202020204" pitchFamily="34" charset="0"/>
+              </a:rPr>
+              <a:t>Lernrunde</a:t>
+            </a:r>
+            <a:endParaRPr lang="en-US" dirty="0">
+              <a:latin typeface="Avenir Next LT Pro Light" panose="020B0304020202020204" pitchFamily="34" charset="0"/>
+            </a:endParaRPr>
+          </a:p>
+        </p:txBody>
+      </p:sp>
     </p:spTree>
     <p:extLst>
       <p:ext uri="{BB962C8B-B14F-4D97-AF65-F5344CB8AC3E}">
@@ -16390,7 +17766,958 @@
 </p:sld>
 </file>
 
+<file path=ppt/slides/slide16.xml><?xml version="1.0" encoding="utf-8"?>
+<p:sld xmlns:a="http://schemas.openxmlformats.org/drawingml/2006/main" xmlns:r="http://schemas.openxmlformats.org/officeDocument/2006/relationships" xmlns:p="http://schemas.openxmlformats.org/presentationml/2006/main">
+  <p:cSld>
+    <p:bg>
+      <p:bgPr>
+        <a:solidFill>
+          <a:schemeClr val="tx1">
+            <a:lumMod val="85000"/>
+            <a:lumOff val="15000"/>
+          </a:schemeClr>
+        </a:solidFill>
+        <a:effectLst/>
+      </p:bgPr>
+    </p:bg>
+    <p:spTree>
+      <p:nvGrpSpPr>
+        <p:cNvPr id="1" name=""/>
+        <p:cNvGrpSpPr/>
+        <p:nvPr/>
+      </p:nvGrpSpPr>
+      <p:grpSpPr>
+        <a:xfrm>
+          <a:off x="0" y="0"/>
+          <a:ext cx="0" cy="0"/>
+          <a:chOff x="0" y="0"/>
+          <a:chExt cx="0" cy="0"/>
+        </a:xfrm>
+      </p:grpSpPr>
+      <p:sp>
+        <p:nvSpPr>
+          <p:cNvPr id="2" name="Titel 1">
+            <a:extLst>
+              <a:ext uri="{FF2B5EF4-FFF2-40B4-BE49-F238E27FC236}">
+                <a16:creationId xmlns:a16="http://schemas.microsoft.com/office/drawing/2014/main" id="{747753E9-46C1-43E7-BF55-1C39C3D2263B}"/>
+              </a:ext>
+            </a:extLst>
+          </p:cNvPr>
+          <p:cNvSpPr>
+            <a:spLocks noGrp="1"/>
+          </p:cNvSpPr>
+          <p:nvPr>
+            <p:ph type="title"/>
+          </p:nvPr>
+        </p:nvSpPr>
+        <p:spPr/>
+        <p:txBody>
+          <a:bodyPr/>
+          <a:lstStyle/>
+          <a:p>
+            <a:r>
+              <a:rPr lang="de-DE" dirty="0">
+                <a:solidFill>
+                  <a:schemeClr val="bg1"/>
+                </a:solidFill>
+                <a:latin typeface="Avenir Next LT Pro Light" panose="020B0304020202020204" pitchFamily="34" charset="0"/>
+              </a:rPr>
+              <a:t>WordPress – Design</a:t>
+            </a:r>
+            <a:endParaRPr lang="en-US" dirty="0">
+              <a:solidFill>
+                <a:schemeClr val="bg1"/>
+              </a:solidFill>
+              <a:latin typeface="Avenir Next LT Pro Light" panose="020B0304020202020204" pitchFamily="34" charset="0"/>
+            </a:endParaRPr>
+          </a:p>
+        </p:txBody>
+      </p:sp>
+      <p:pic>
+        <p:nvPicPr>
+          <p:cNvPr id="4" name="Inhaltsplatzhalter 8" descr="Stoppuhr">
+            <a:extLst>
+              <a:ext uri="{FF2B5EF4-FFF2-40B4-BE49-F238E27FC236}">
+                <a16:creationId xmlns:a16="http://schemas.microsoft.com/office/drawing/2014/main" id="{A7F8691E-369A-483B-9E90-EB30764D8BB1}"/>
+              </a:ext>
+            </a:extLst>
+          </p:cNvPr>
+          <p:cNvPicPr>
+            <a:picLocks noChangeAspect="1"/>
+          </p:cNvPicPr>
+          <p:nvPr/>
+        </p:nvPicPr>
+        <p:blipFill>
+          <a:blip r:embed="rId2">
+            <a:extLst>
+              <a:ext uri="{28A0092B-C50C-407E-A947-70E740481C1C}">
+                <a14:useLocalDpi xmlns:a14="http://schemas.microsoft.com/office/drawing/2010/main" val="0"/>
+              </a:ext>
+              <a:ext uri="{96DAC541-7B7A-43D3-8B79-37D633B846F1}">
+                <asvg:svgBlip xmlns:asvg="http://schemas.microsoft.com/office/drawing/2016/SVG/main" r:embed="rId3"/>
+              </a:ext>
+            </a:extLst>
+          </a:blip>
+          <a:stretch>
+            <a:fillRect/>
+          </a:stretch>
+        </p:blipFill>
+        <p:spPr>
+          <a:xfrm>
+            <a:off x="838199" y="1690687"/>
+            <a:ext cx="4682067" cy="4682067"/>
+          </a:xfrm>
+          <a:prstGeom prst="rect">
+            <a:avLst/>
+          </a:prstGeom>
+        </p:spPr>
+      </p:pic>
+      <p:sp>
+        <p:nvSpPr>
+          <p:cNvPr id="5" name="Textfeld 4">
+            <a:extLst>
+              <a:ext uri="{FF2B5EF4-FFF2-40B4-BE49-F238E27FC236}">
+                <a16:creationId xmlns:a16="http://schemas.microsoft.com/office/drawing/2014/main" id="{0B2772EB-64EC-4DAB-AFEE-457A1C00BCD7}"/>
+              </a:ext>
+            </a:extLst>
+          </p:cNvPr>
+          <p:cNvSpPr txBox="1"/>
+          <p:nvPr/>
+        </p:nvSpPr>
+        <p:spPr>
+          <a:xfrm>
+            <a:off x="5520266" y="3677778"/>
+            <a:ext cx="5960533" cy="707886"/>
+          </a:xfrm>
+          <a:prstGeom prst="rect">
+            <a:avLst/>
+          </a:prstGeom>
+          <a:noFill/>
+        </p:spPr>
+        <p:txBody>
+          <a:bodyPr wrap="square" rtlCol="0">
+            <a:spAutoFit/>
+          </a:bodyPr>
+          <a:lstStyle/>
+          <a:p>
+            <a:pPr algn="ctr"/>
+            <a:r>
+              <a:rPr lang="de-DE" sz="4000" dirty="0">
+                <a:solidFill>
+                  <a:schemeClr val="bg1"/>
+                </a:solidFill>
+                <a:latin typeface="Avenir Next LT Pro Light" panose="020B0304020202020204" pitchFamily="34" charset="0"/>
+              </a:rPr>
+              <a:t>ca. 17:15 –  18:00</a:t>
+            </a:r>
+            <a:endParaRPr lang="en-US" sz="4000" dirty="0">
+              <a:solidFill>
+                <a:schemeClr val="bg1"/>
+              </a:solidFill>
+              <a:latin typeface="Avenir Next LT Pro Light" panose="020B0304020202020204" pitchFamily="34" charset="0"/>
+            </a:endParaRPr>
+          </a:p>
+        </p:txBody>
+      </p:sp>
+      <p:sp>
+        <p:nvSpPr>
+          <p:cNvPr id="6" name="Fußzeilenplatzhalter 2">
+            <a:extLst>
+              <a:ext uri="{FF2B5EF4-FFF2-40B4-BE49-F238E27FC236}">
+                <a16:creationId xmlns:a16="http://schemas.microsoft.com/office/drawing/2014/main" id="{91C70F8E-BBD8-4337-B7F7-5A057C7987A9}"/>
+              </a:ext>
+            </a:extLst>
+          </p:cNvPr>
+          <p:cNvSpPr>
+            <a:spLocks noGrp="1"/>
+          </p:cNvSpPr>
+          <p:nvPr>
+            <p:ph type="ftr" sz="quarter" idx="11"/>
+          </p:nvPr>
+        </p:nvSpPr>
+        <p:spPr>
+          <a:xfrm>
+            <a:off x="4038600" y="6356350"/>
+            <a:ext cx="4114800" cy="365125"/>
+          </a:xfrm>
+        </p:spPr>
+        <p:txBody>
+          <a:bodyPr/>
+          <a:lstStyle/>
+          <a:p>
+            <a:r>
+              <a:rPr lang="en-US" dirty="0"/>
+              <a:t>2. </a:t>
+            </a:r>
+            <a:r>
+              <a:rPr lang="en-US" dirty="0" err="1">
+                <a:latin typeface="Avenir Next LT Pro Light" panose="020B0304020202020204" pitchFamily="34" charset="0"/>
+              </a:rPr>
+              <a:t>Lernrunde</a:t>
+            </a:r>
+            <a:endParaRPr lang="en-US" dirty="0">
+              <a:latin typeface="Avenir Next LT Pro Light" panose="020B0304020202020204" pitchFamily="34" charset="0"/>
+            </a:endParaRPr>
+          </a:p>
+        </p:txBody>
+      </p:sp>
+    </p:spTree>
+    <p:extLst>
+      <p:ext uri="{BB962C8B-B14F-4D97-AF65-F5344CB8AC3E}">
+        <p14:creationId xmlns:p14="http://schemas.microsoft.com/office/powerpoint/2010/main" val="3448865936"/>
+      </p:ext>
+    </p:extLst>
+  </p:cSld>
+  <p:clrMapOvr>
+    <a:masterClrMapping/>
+  </p:clrMapOvr>
+</p:sld>
+</file>
+
+<file path=ppt/slides/slide17.xml><?xml version="1.0" encoding="utf-8"?>
+<p:sld xmlns:a="http://schemas.openxmlformats.org/drawingml/2006/main" xmlns:r="http://schemas.openxmlformats.org/officeDocument/2006/relationships" xmlns:p="http://schemas.openxmlformats.org/presentationml/2006/main">
+  <p:cSld>
+    <p:bg>
+      <p:bgPr>
+        <a:solidFill>
+          <a:schemeClr val="tx1">
+            <a:lumMod val="85000"/>
+            <a:lumOff val="15000"/>
+          </a:schemeClr>
+        </a:solidFill>
+        <a:effectLst/>
+      </p:bgPr>
+    </p:bg>
+    <p:spTree>
+      <p:nvGrpSpPr>
+        <p:cNvPr id="1" name=""/>
+        <p:cNvGrpSpPr/>
+        <p:nvPr/>
+      </p:nvGrpSpPr>
+      <p:grpSpPr>
+        <a:xfrm>
+          <a:off x="0" y="0"/>
+          <a:ext cx="0" cy="0"/>
+          <a:chOff x="0" y="0"/>
+          <a:chExt cx="0" cy="0"/>
+        </a:xfrm>
+      </p:grpSpPr>
+      <p:sp>
+        <p:nvSpPr>
+          <p:cNvPr id="2" name="Titel 1">
+            <a:extLst>
+              <a:ext uri="{FF2B5EF4-FFF2-40B4-BE49-F238E27FC236}">
+                <a16:creationId xmlns:a16="http://schemas.microsoft.com/office/drawing/2014/main" id="{747753E9-46C1-43E7-BF55-1C39C3D2263B}"/>
+              </a:ext>
+            </a:extLst>
+          </p:cNvPr>
+          <p:cNvSpPr>
+            <a:spLocks noGrp="1"/>
+          </p:cNvSpPr>
+          <p:nvPr>
+            <p:ph type="title"/>
+          </p:nvPr>
+        </p:nvSpPr>
+        <p:spPr/>
+        <p:txBody>
+          <a:bodyPr/>
+          <a:lstStyle/>
+          <a:p>
+            <a:r>
+              <a:rPr lang="de-DE" dirty="0">
+                <a:solidFill>
+                  <a:schemeClr val="bg1"/>
+                </a:solidFill>
+                <a:latin typeface="Avenir Next LT Pro Light" panose="020B0304020202020204" pitchFamily="34" charset="0"/>
+              </a:rPr>
+              <a:t>Pause – Pizza!</a:t>
+            </a:r>
+            <a:endParaRPr lang="en-US" dirty="0">
+              <a:solidFill>
+                <a:schemeClr val="bg1"/>
+              </a:solidFill>
+              <a:latin typeface="Avenir Next LT Pro Light" panose="020B0304020202020204" pitchFamily="34" charset="0"/>
+            </a:endParaRPr>
+          </a:p>
+        </p:txBody>
+      </p:sp>
+      <p:pic>
+        <p:nvPicPr>
+          <p:cNvPr id="4" name="Inhaltsplatzhalter 8" descr="Stoppuhr">
+            <a:extLst>
+              <a:ext uri="{FF2B5EF4-FFF2-40B4-BE49-F238E27FC236}">
+                <a16:creationId xmlns:a16="http://schemas.microsoft.com/office/drawing/2014/main" id="{A7F8691E-369A-483B-9E90-EB30764D8BB1}"/>
+              </a:ext>
+            </a:extLst>
+          </p:cNvPr>
+          <p:cNvPicPr>
+            <a:picLocks noChangeAspect="1"/>
+          </p:cNvPicPr>
+          <p:nvPr/>
+        </p:nvPicPr>
+        <p:blipFill>
+          <a:blip r:embed="rId2">
+            <a:extLst>
+              <a:ext uri="{28A0092B-C50C-407E-A947-70E740481C1C}">
+                <a14:useLocalDpi xmlns:a14="http://schemas.microsoft.com/office/drawing/2010/main" val="0"/>
+              </a:ext>
+              <a:ext uri="{96DAC541-7B7A-43D3-8B79-37D633B846F1}">
+                <asvg:svgBlip xmlns:asvg="http://schemas.microsoft.com/office/drawing/2016/SVG/main" r:embed="rId3"/>
+              </a:ext>
+            </a:extLst>
+          </a:blip>
+          <a:stretch>
+            <a:fillRect/>
+          </a:stretch>
+        </p:blipFill>
+        <p:spPr>
+          <a:xfrm>
+            <a:off x="838199" y="1690687"/>
+            <a:ext cx="4682067" cy="4682067"/>
+          </a:xfrm>
+          <a:prstGeom prst="rect">
+            <a:avLst/>
+          </a:prstGeom>
+        </p:spPr>
+      </p:pic>
+      <p:sp>
+        <p:nvSpPr>
+          <p:cNvPr id="5" name="Textfeld 4">
+            <a:extLst>
+              <a:ext uri="{FF2B5EF4-FFF2-40B4-BE49-F238E27FC236}">
+                <a16:creationId xmlns:a16="http://schemas.microsoft.com/office/drawing/2014/main" id="{0B2772EB-64EC-4DAB-AFEE-457A1C00BCD7}"/>
+              </a:ext>
+            </a:extLst>
+          </p:cNvPr>
+          <p:cNvSpPr txBox="1"/>
+          <p:nvPr/>
+        </p:nvSpPr>
+        <p:spPr>
+          <a:xfrm>
+            <a:off x="5520266" y="3677778"/>
+            <a:ext cx="5960533" cy="707886"/>
+          </a:xfrm>
+          <a:prstGeom prst="rect">
+            <a:avLst/>
+          </a:prstGeom>
+          <a:noFill/>
+        </p:spPr>
+        <p:txBody>
+          <a:bodyPr wrap="square" rtlCol="0">
+            <a:spAutoFit/>
+          </a:bodyPr>
+          <a:lstStyle/>
+          <a:p>
+            <a:pPr algn="ctr"/>
+            <a:r>
+              <a:rPr lang="de-DE" sz="4000" dirty="0">
+                <a:solidFill>
+                  <a:schemeClr val="bg1"/>
+                </a:solidFill>
+                <a:latin typeface="Avenir Next LT Pro Light" panose="020B0304020202020204" pitchFamily="34" charset="0"/>
+              </a:rPr>
+              <a:t>ca. 18:00 –  19:00</a:t>
+            </a:r>
+            <a:endParaRPr lang="en-US" sz="4000" dirty="0">
+              <a:solidFill>
+                <a:schemeClr val="bg1"/>
+              </a:solidFill>
+              <a:latin typeface="Avenir Next LT Pro Light" panose="020B0304020202020204" pitchFamily="34" charset="0"/>
+            </a:endParaRPr>
+          </a:p>
+        </p:txBody>
+      </p:sp>
+    </p:spTree>
+    <p:extLst>
+      <p:ext uri="{BB962C8B-B14F-4D97-AF65-F5344CB8AC3E}">
+        <p14:creationId xmlns:p14="http://schemas.microsoft.com/office/powerpoint/2010/main" val="3863676374"/>
+      </p:ext>
+    </p:extLst>
+  </p:cSld>
+  <p:clrMapOvr>
+    <a:masterClrMapping/>
+  </p:clrMapOvr>
+</p:sld>
+</file>
+
+<file path=ppt/slides/slide18.xml><?xml version="1.0" encoding="utf-8"?>
+<p:sld xmlns:a="http://schemas.openxmlformats.org/drawingml/2006/main" xmlns:r="http://schemas.openxmlformats.org/officeDocument/2006/relationships" xmlns:p="http://schemas.openxmlformats.org/presentationml/2006/main">
+  <p:cSld>
+    <p:bg>
+      <p:bgPr>
+        <a:solidFill>
+          <a:schemeClr val="tx1">
+            <a:lumMod val="85000"/>
+            <a:lumOff val="15000"/>
+          </a:schemeClr>
+        </a:solidFill>
+        <a:effectLst/>
+      </p:bgPr>
+    </p:bg>
+    <p:spTree>
+      <p:nvGrpSpPr>
+        <p:cNvPr id="1" name=""/>
+        <p:cNvGrpSpPr/>
+        <p:nvPr/>
+      </p:nvGrpSpPr>
+      <p:grpSpPr>
+        <a:xfrm>
+          <a:off x="0" y="0"/>
+          <a:ext cx="0" cy="0"/>
+          <a:chOff x="0" y="0"/>
+          <a:chExt cx="0" cy="0"/>
+        </a:xfrm>
+      </p:grpSpPr>
+      <p:sp>
+        <p:nvSpPr>
+          <p:cNvPr id="2" name="Titel 1">
+            <a:extLst>
+              <a:ext uri="{FF2B5EF4-FFF2-40B4-BE49-F238E27FC236}">
+                <a16:creationId xmlns:a16="http://schemas.microsoft.com/office/drawing/2014/main" id="{D946A9FE-1145-4A11-A6CA-06FE01FC4FC4}"/>
+              </a:ext>
+            </a:extLst>
+          </p:cNvPr>
+          <p:cNvSpPr>
+            <a:spLocks noGrp="1"/>
+          </p:cNvSpPr>
+          <p:nvPr>
+            <p:ph type="title"/>
+          </p:nvPr>
+        </p:nvSpPr>
+        <p:spPr/>
+        <p:txBody>
+          <a:bodyPr/>
+          <a:lstStyle/>
+          <a:p>
+            <a:r>
+              <a:rPr lang="de-DE" dirty="0">
+                <a:solidFill>
+                  <a:schemeClr val="bg1"/>
+                </a:solidFill>
+                <a:latin typeface="Avenir Next LT Pro Light" panose="020B0304020202020204" pitchFamily="34" charset="0"/>
+              </a:rPr>
+              <a:t>Inhalt der 3. Lernrunde</a:t>
+            </a:r>
+            <a:endParaRPr lang="en-US" dirty="0">
+              <a:solidFill>
+                <a:schemeClr val="bg1"/>
+              </a:solidFill>
+              <a:latin typeface="Avenir Next LT Pro Light" panose="020B0304020202020204" pitchFamily="34" charset="0"/>
+            </a:endParaRPr>
+          </a:p>
+        </p:txBody>
+      </p:sp>
+      <p:sp>
+        <p:nvSpPr>
+          <p:cNvPr id="3" name="Inhaltsplatzhalter 2">
+            <a:extLst>
+              <a:ext uri="{FF2B5EF4-FFF2-40B4-BE49-F238E27FC236}">
+                <a16:creationId xmlns:a16="http://schemas.microsoft.com/office/drawing/2014/main" id="{F09921A0-2B24-4EB9-A6B8-364BEA71F654}"/>
+              </a:ext>
+            </a:extLst>
+          </p:cNvPr>
+          <p:cNvSpPr>
+            <a:spLocks noGrp="1"/>
+          </p:cNvSpPr>
+          <p:nvPr>
+            <p:ph idx="1"/>
+          </p:nvPr>
+        </p:nvSpPr>
+        <p:spPr/>
+        <p:txBody>
+          <a:bodyPr/>
+          <a:lstStyle/>
+          <a:p>
+            <a:r>
+              <a:rPr lang="en-US" dirty="0" err="1">
+                <a:solidFill>
+                  <a:schemeClr val="bg1"/>
+                </a:solidFill>
+                <a:latin typeface="Avenir Next LT Pro Light" panose="020B0304020202020204" pitchFamily="34" charset="0"/>
+              </a:rPr>
+              <a:t>Selbstständiges</a:t>
+            </a:r>
+            <a:r>
+              <a:rPr lang="en-US" dirty="0">
+                <a:solidFill>
+                  <a:schemeClr val="bg1"/>
+                </a:solidFill>
+                <a:latin typeface="Avenir Next LT Pro Light" panose="020B0304020202020204" pitchFamily="34" charset="0"/>
+              </a:rPr>
+              <a:t> </a:t>
+            </a:r>
+            <a:r>
+              <a:rPr lang="en-US" dirty="0" err="1">
+                <a:solidFill>
+                  <a:schemeClr val="bg1"/>
+                </a:solidFill>
+                <a:latin typeface="Avenir Next LT Pro Light" panose="020B0304020202020204" pitchFamily="34" charset="0"/>
+              </a:rPr>
+              <a:t>Erstellen</a:t>
+            </a:r>
+            <a:r>
+              <a:rPr lang="en-US" dirty="0">
+                <a:solidFill>
+                  <a:schemeClr val="bg1"/>
+                </a:solidFill>
+                <a:latin typeface="Avenir Next LT Pro Light" panose="020B0304020202020204" pitchFamily="34" charset="0"/>
+              </a:rPr>
+              <a:t> der Website</a:t>
+            </a:r>
+          </a:p>
+          <a:p>
+            <a:r>
+              <a:rPr lang="en-US" dirty="0">
+                <a:solidFill>
+                  <a:schemeClr val="bg1"/>
+                </a:solidFill>
+                <a:latin typeface="Avenir Next LT Pro Light" panose="020B0304020202020204" pitchFamily="34" charset="0"/>
+              </a:rPr>
+              <a:t>Bei </a:t>
+            </a:r>
+            <a:r>
+              <a:rPr lang="en-US" dirty="0" err="1">
+                <a:solidFill>
+                  <a:schemeClr val="bg1"/>
+                </a:solidFill>
+                <a:latin typeface="Avenir Next LT Pro Light" panose="020B0304020202020204" pitchFamily="34" charset="0"/>
+              </a:rPr>
+              <a:t>Fragen</a:t>
+            </a:r>
+            <a:r>
+              <a:rPr lang="en-US" dirty="0">
+                <a:solidFill>
+                  <a:schemeClr val="bg1"/>
+                </a:solidFill>
+                <a:latin typeface="Avenir Next LT Pro Light" panose="020B0304020202020204" pitchFamily="34" charset="0"/>
+              </a:rPr>
+              <a:t> </a:t>
+            </a:r>
+            <a:r>
+              <a:rPr lang="en-US" dirty="0" err="1">
+                <a:solidFill>
+                  <a:schemeClr val="bg1"/>
+                </a:solidFill>
+                <a:latin typeface="Avenir Next LT Pro Light" panose="020B0304020202020204" pitchFamily="34" charset="0"/>
+              </a:rPr>
+              <a:t>gegenseitig</a:t>
+            </a:r>
+            <a:r>
+              <a:rPr lang="en-US" dirty="0">
+                <a:solidFill>
+                  <a:schemeClr val="bg1"/>
+                </a:solidFill>
+                <a:latin typeface="Avenir Next LT Pro Light" panose="020B0304020202020204" pitchFamily="34" charset="0"/>
+              </a:rPr>
+              <a:t> </a:t>
+            </a:r>
+            <a:r>
+              <a:rPr lang="en-US" dirty="0" err="1">
+                <a:solidFill>
+                  <a:schemeClr val="bg1"/>
+                </a:solidFill>
+                <a:latin typeface="Avenir Next LT Pro Light" panose="020B0304020202020204" pitchFamily="34" charset="0"/>
+              </a:rPr>
+              <a:t>helfen</a:t>
+            </a:r>
+            <a:r>
+              <a:rPr lang="en-US" dirty="0">
+                <a:solidFill>
+                  <a:schemeClr val="bg1"/>
+                </a:solidFill>
+                <a:latin typeface="Avenir Next LT Pro Light" panose="020B0304020202020204" pitchFamily="34" charset="0"/>
+              </a:rPr>
+              <a:t> (und </a:t>
+            </a:r>
+            <a:r>
+              <a:rPr lang="en-US" dirty="0" err="1">
+                <a:solidFill>
+                  <a:schemeClr val="bg1"/>
+                </a:solidFill>
+                <a:latin typeface="Avenir Next LT Pro Light" panose="020B0304020202020204" pitchFamily="34" charset="0"/>
+              </a:rPr>
+              <a:t>gern</a:t>
+            </a:r>
+            <a:r>
+              <a:rPr lang="en-US" dirty="0">
+                <a:solidFill>
+                  <a:schemeClr val="bg1"/>
+                </a:solidFill>
+                <a:latin typeface="Avenir Next LT Pro Light" panose="020B0304020202020204" pitchFamily="34" charset="0"/>
+              </a:rPr>
+              <a:t> auf </a:t>
+            </a:r>
+            <a:r>
+              <a:rPr lang="en-US" dirty="0" err="1">
+                <a:solidFill>
+                  <a:schemeClr val="bg1"/>
+                </a:solidFill>
+                <a:latin typeface="Avenir Next LT Pro Light" panose="020B0304020202020204" pitchFamily="34" charset="0"/>
+              </a:rPr>
+              <a:t>mich</a:t>
+            </a:r>
+            <a:r>
+              <a:rPr lang="en-US" dirty="0">
+                <a:solidFill>
+                  <a:schemeClr val="bg1"/>
+                </a:solidFill>
+                <a:latin typeface="Avenir Next LT Pro Light" panose="020B0304020202020204" pitchFamily="34" charset="0"/>
+              </a:rPr>
+              <a:t> </a:t>
+            </a:r>
+            <a:r>
+              <a:rPr lang="en-US" dirty="0" err="1">
+                <a:solidFill>
+                  <a:schemeClr val="bg1"/>
+                </a:solidFill>
+                <a:latin typeface="Avenir Next LT Pro Light" panose="020B0304020202020204" pitchFamily="34" charset="0"/>
+              </a:rPr>
+              <a:t>zukommen</a:t>
+            </a:r>
+            <a:r>
+              <a:rPr lang="en-US" dirty="0">
+                <a:solidFill>
+                  <a:schemeClr val="bg1"/>
+                </a:solidFill>
+                <a:latin typeface="Avenir Next LT Pro Light" panose="020B0304020202020204" pitchFamily="34" charset="0"/>
+              </a:rPr>
+              <a:t>!)</a:t>
+            </a:r>
+          </a:p>
+          <a:p>
+            <a:endParaRPr lang="en-US" dirty="0">
+              <a:solidFill>
+                <a:schemeClr val="bg1"/>
+              </a:solidFill>
+              <a:latin typeface="Avenir Next LT Pro Light" panose="020B0304020202020204" pitchFamily="34" charset="0"/>
+            </a:endParaRPr>
+          </a:p>
+          <a:p>
+            <a:endParaRPr lang="en-US" dirty="0">
+              <a:solidFill>
+                <a:schemeClr val="bg1"/>
+              </a:solidFill>
+              <a:latin typeface="Avenir Next LT Pro Light" panose="020B0304020202020204" pitchFamily="34" charset="0"/>
+            </a:endParaRPr>
+          </a:p>
+        </p:txBody>
+      </p:sp>
+    </p:spTree>
+    <p:extLst>
+      <p:ext uri="{BB962C8B-B14F-4D97-AF65-F5344CB8AC3E}">
+        <p14:creationId xmlns:p14="http://schemas.microsoft.com/office/powerpoint/2010/main" val="1364027989"/>
+      </p:ext>
+    </p:extLst>
+  </p:cSld>
+  <p:clrMapOvr>
+    <a:masterClrMapping/>
+  </p:clrMapOvr>
+</p:sld>
+</file>
+
 <file path=ppt/slides/slide2.xml><?xml version="1.0" encoding="utf-8"?>
+<p:sld xmlns:a="http://schemas.openxmlformats.org/drawingml/2006/main" xmlns:r="http://schemas.openxmlformats.org/officeDocument/2006/relationships" xmlns:p="http://schemas.openxmlformats.org/presentationml/2006/main">
+  <p:cSld>
+    <p:bg>
+      <p:bgPr>
+        <a:solidFill>
+          <a:schemeClr val="tx1">
+            <a:lumMod val="85000"/>
+            <a:lumOff val="15000"/>
+          </a:schemeClr>
+        </a:solidFill>
+        <a:effectLst/>
+      </p:bgPr>
+    </p:bg>
+    <p:spTree>
+      <p:nvGrpSpPr>
+        <p:cNvPr id="1" name=""/>
+        <p:cNvGrpSpPr/>
+        <p:nvPr/>
+      </p:nvGrpSpPr>
+      <p:grpSpPr>
+        <a:xfrm>
+          <a:off x="0" y="0"/>
+          <a:ext cx="0" cy="0"/>
+          <a:chOff x="0" y="0"/>
+          <a:chExt cx="0" cy="0"/>
+        </a:xfrm>
+      </p:grpSpPr>
+      <p:sp>
+        <p:nvSpPr>
+          <p:cNvPr id="2" name="Titel 1">
+            <a:extLst>
+              <a:ext uri="{FF2B5EF4-FFF2-40B4-BE49-F238E27FC236}">
+                <a16:creationId xmlns:a16="http://schemas.microsoft.com/office/drawing/2014/main" id="{D946A9FE-1145-4A11-A6CA-06FE01FC4FC4}"/>
+              </a:ext>
+            </a:extLst>
+          </p:cNvPr>
+          <p:cNvSpPr>
+            <a:spLocks noGrp="1"/>
+          </p:cNvSpPr>
+          <p:nvPr>
+            <p:ph type="title"/>
+          </p:nvPr>
+        </p:nvSpPr>
+        <p:spPr/>
+        <p:txBody>
+          <a:bodyPr/>
+          <a:lstStyle/>
+          <a:p>
+            <a:r>
+              <a:rPr lang="de-DE" dirty="0">
+                <a:solidFill>
+                  <a:schemeClr val="bg1"/>
+                </a:solidFill>
+                <a:latin typeface="Avenir Next LT Pro Light" panose="020B0304020202020204" pitchFamily="34" charset="0"/>
+              </a:rPr>
+              <a:t>Inhalt der 1. Lernrunde</a:t>
+            </a:r>
+            <a:endParaRPr lang="en-US" dirty="0">
+              <a:solidFill>
+                <a:schemeClr val="bg1"/>
+              </a:solidFill>
+              <a:latin typeface="Avenir Next LT Pro Light" panose="020B0304020202020204" pitchFamily="34" charset="0"/>
+            </a:endParaRPr>
+          </a:p>
+        </p:txBody>
+      </p:sp>
+      <p:sp>
+        <p:nvSpPr>
+          <p:cNvPr id="3" name="Inhaltsplatzhalter 2">
+            <a:extLst>
+              <a:ext uri="{FF2B5EF4-FFF2-40B4-BE49-F238E27FC236}">
+                <a16:creationId xmlns:a16="http://schemas.microsoft.com/office/drawing/2014/main" id="{F09921A0-2B24-4EB9-A6B8-364BEA71F654}"/>
+              </a:ext>
+            </a:extLst>
+          </p:cNvPr>
+          <p:cNvSpPr>
+            <a:spLocks noGrp="1"/>
+          </p:cNvSpPr>
+          <p:nvPr>
+            <p:ph idx="1"/>
+          </p:nvPr>
+        </p:nvSpPr>
+        <p:spPr/>
+        <p:txBody>
+          <a:bodyPr/>
+          <a:lstStyle/>
+          <a:p>
+            <a:r>
+              <a:rPr lang="de-DE" dirty="0">
+                <a:solidFill>
+                  <a:schemeClr val="bg1"/>
+                </a:solidFill>
+                <a:latin typeface="Avenir Next LT Pro Light" panose="020B0304020202020204" pitchFamily="34" charset="0"/>
+              </a:rPr>
+              <a:t>Warum eine Portfolio Website?</a:t>
+            </a:r>
+          </a:p>
+          <a:p>
+            <a:r>
+              <a:rPr lang="de-DE" dirty="0">
+                <a:solidFill>
+                  <a:schemeClr val="bg1"/>
+                </a:solidFill>
+                <a:latin typeface="Avenir Next LT Pro Light" panose="020B0304020202020204" pitchFamily="34" charset="0"/>
+              </a:rPr>
+              <a:t>Inhalte einer Portfolio Website</a:t>
+            </a:r>
+          </a:p>
+          <a:p>
+            <a:r>
+              <a:rPr lang="de-DE" dirty="0">
+                <a:solidFill>
+                  <a:schemeClr val="bg1"/>
+                </a:solidFill>
+                <a:latin typeface="Avenir Next LT Pro Light" panose="020B0304020202020204" pitchFamily="34" charset="0"/>
+              </a:rPr>
+              <a:t>Wie funktioniert eine Website</a:t>
+            </a:r>
+          </a:p>
+          <a:p>
+            <a:r>
+              <a:rPr lang="de-DE" dirty="0">
+                <a:solidFill>
+                  <a:schemeClr val="bg1"/>
+                </a:solidFill>
+                <a:latin typeface="Avenir Next LT Pro Light" panose="020B0304020202020204" pitchFamily="34" charset="0"/>
+              </a:rPr>
+              <a:t>Was wir benötigen</a:t>
+            </a:r>
+          </a:p>
+          <a:p>
+            <a:r>
+              <a:rPr lang="en-US" dirty="0">
+                <a:solidFill>
+                  <a:schemeClr val="bg1"/>
+                </a:solidFill>
+                <a:latin typeface="Avenir Next LT Pro Light" panose="020B0304020202020204" pitchFamily="34" charset="0"/>
+              </a:rPr>
+              <a:t>Domain &amp; Webhosting – </a:t>
+            </a:r>
+            <a:r>
+              <a:rPr lang="en-US" dirty="0" err="1">
+                <a:solidFill>
+                  <a:schemeClr val="bg1"/>
+                </a:solidFill>
+                <a:latin typeface="Avenir Next LT Pro Light" panose="020B0304020202020204" pitchFamily="34" charset="0"/>
+              </a:rPr>
+              <a:t>Optionen</a:t>
+            </a:r>
+            <a:endParaRPr lang="en-US" dirty="0">
+              <a:solidFill>
+                <a:schemeClr val="bg1"/>
+              </a:solidFill>
+              <a:latin typeface="Avenir Next LT Pro Light" panose="020B0304020202020204" pitchFamily="34" charset="0"/>
+            </a:endParaRPr>
+          </a:p>
+          <a:p>
+            <a:r>
+              <a:rPr lang="en-US" dirty="0">
+                <a:solidFill>
+                  <a:schemeClr val="bg1"/>
+                </a:solidFill>
+                <a:latin typeface="Avenir Next LT Pro Light" panose="020B0304020202020204" pitchFamily="34" charset="0"/>
+              </a:rPr>
+              <a:t>Domain &amp; Webhosting – </a:t>
+            </a:r>
+            <a:r>
+              <a:rPr lang="en-US" dirty="0" err="1">
+                <a:solidFill>
+                  <a:schemeClr val="bg1"/>
+                </a:solidFill>
+                <a:latin typeface="Avenir Next LT Pro Light" panose="020B0304020202020204" pitchFamily="34" charset="0"/>
+              </a:rPr>
+              <a:t>Anleitungen</a:t>
+            </a:r>
+            <a:endParaRPr lang="en-US" dirty="0">
+              <a:solidFill>
+                <a:schemeClr val="bg1"/>
+              </a:solidFill>
+              <a:latin typeface="Avenir Next LT Pro Light" panose="020B0304020202020204" pitchFamily="34" charset="0"/>
+            </a:endParaRPr>
+          </a:p>
+          <a:p>
+            <a:r>
+              <a:rPr lang="en-US" dirty="0">
+                <a:solidFill>
+                  <a:schemeClr val="bg1"/>
+                </a:solidFill>
+                <a:latin typeface="Avenir Next LT Pro Light" panose="020B0304020202020204" pitchFamily="34" charset="0"/>
+              </a:rPr>
+              <a:t>Domain &amp; Webhosting – </a:t>
+            </a:r>
+            <a:r>
+              <a:rPr lang="en-US" dirty="0" err="1">
+                <a:solidFill>
+                  <a:schemeClr val="bg1"/>
+                </a:solidFill>
+                <a:latin typeface="Avenir Next LT Pro Light" panose="020B0304020202020204" pitchFamily="34" charset="0"/>
+              </a:rPr>
+              <a:t>Selbsständiges</a:t>
+            </a:r>
+            <a:r>
+              <a:rPr lang="en-US" dirty="0">
+                <a:solidFill>
+                  <a:schemeClr val="bg1"/>
+                </a:solidFill>
+                <a:latin typeface="Avenir Next LT Pro Light" panose="020B0304020202020204" pitchFamily="34" charset="0"/>
+              </a:rPr>
+              <a:t> </a:t>
+            </a:r>
+            <a:r>
+              <a:rPr lang="en-US" dirty="0" err="1">
+                <a:solidFill>
+                  <a:schemeClr val="bg1"/>
+                </a:solidFill>
+                <a:latin typeface="Avenir Next LT Pro Light" panose="020B0304020202020204" pitchFamily="34" charset="0"/>
+              </a:rPr>
+              <a:t>Arbeiten</a:t>
+            </a:r>
+            <a:endParaRPr lang="en-US" dirty="0">
+              <a:solidFill>
+                <a:schemeClr val="bg1"/>
+              </a:solidFill>
+              <a:latin typeface="Avenir Next LT Pro Light" panose="020B0304020202020204" pitchFamily="34" charset="0"/>
+            </a:endParaRPr>
+          </a:p>
+          <a:p>
+            <a:r>
+              <a:rPr lang="en-US" dirty="0">
+                <a:solidFill>
+                  <a:schemeClr val="bg1"/>
+                </a:solidFill>
+                <a:latin typeface="Avenir Next LT Pro Light" panose="020B0304020202020204" pitchFamily="34" charset="0"/>
+              </a:rPr>
+              <a:t>WordPress Installation – </a:t>
+            </a:r>
+            <a:r>
+              <a:rPr lang="en-US" dirty="0" err="1">
+                <a:solidFill>
+                  <a:schemeClr val="bg1"/>
+                </a:solidFill>
+                <a:latin typeface="Avenir Next LT Pro Light" panose="020B0304020202020204" pitchFamily="34" charset="0"/>
+              </a:rPr>
+              <a:t>Selbstständiges</a:t>
+            </a:r>
+            <a:r>
+              <a:rPr lang="en-US" dirty="0">
+                <a:solidFill>
+                  <a:schemeClr val="bg1"/>
+                </a:solidFill>
+                <a:latin typeface="Avenir Next LT Pro Light" panose="020B0304020202020204" pitchFamily="34" charset="0"/>
+              </a:rPr>
+              <a:t> </a:t>
+            </a:r>
+            <a:r>
+              <a:rPr lang="en-US" dirty="0" err="1">
+                <a:solidFill>
+                  <a:schemeClr val="bg1"/>
+                </a:solidFill>
+                <a:latin typeface="Avenir Next LT Pro Light" panose="020B0304020202020204" pitchFamily="34" charset="0"/>
+              </a:rPr>
+              <a:t>Arbeiten</a:t>
+            </a:r>
+            <a:endParaRPr lang="en-US" dirty="0">
+              <a:solidFill>
+                <a:schemeClr val="bg1"/>
+              </a:solidFill>
+              <a:latin typeface="Avenir Next LT Pro Light" panose="020B0304020202020204" pitchFamily="34" charset="0"/>
+            </a:endParaRPr>
+          </a:p>
+          <a:p>
+            <a:endParaRPr lang="en-US" dirty="0">
+              <a:solidFill>
+                <a:schemeClr val="bg1"/>
+              </a:solidFill>
+              <a:latin typeface="Avenir Next LT Pro Light" panose="020B0304020202020204" pitchFamily="34" charset="0"/>
+            </a:endParaRPr>
+          </a:p>
+          <a:p>
+            <a:endParaRPr lang="en-US" dirty="0">
+              <a:solidFill>
+                <a:schemeClr val="bg1"/>
+              </a:solidFill>
+              <a:latin typeface="Avenir Next LT Pro Light" panose="020B0304020202020204" pitchFamily="34" charset="0"/>
+            </a:endParaRPr>
+          </a:p>
+        </p:txBody>
+      </p:sp>
+    </p:spTree>
+    <p:extLst>
+      <p:ext uri="{BB962C8B-B14F-4D97-AF65-F5344CB8AC3E}">
+        <p14:creationId xmlns:p14="http://schemas.microsoft.com/office/powerpoint/2010/main" val="3100281767"/>
+      </p:ext>
+    </p:extLst>
+  </p:cSld>
+  <p:clrMapOvr>
+    <a:masterClrMapping/>
+  </p:clrMapOvr>
+</p:sld>
+</file>
+
+<file path=ppt/slides/slide3.xml><?xml version="1.0" encoding="utf-8"?>
 <p:sld xmlns:a="http://schemas.openxmlformats.org/drawingml/2006/main" xmlns:r="http://schemas.openxmlformats.org/officeDocument/2006/relationships" xmlns:p="http://schemas.openxmlformats.org/presentationml/2006/main">
   <p:cSld>
     <p:bg>
@@ -16473,7 +18800,7 @@
             <p:ph idx="1"/>
             <p:extLst>
               <p:ext uri="{D42A27DB-BD31-4B8C-83A1-F6EECF244321}">
-                <p14:modId xmlns:p14="http://schemas.microsoft.com/office/powerpoint/2010/main" val="1059249603"/>
+                <p14:modId xmlns:p14="http://schemas.microsoft.com/office/powerpoint/2010/main" val="2442810419"/>
               </p:ext>
             </p:extLst>
           </p:nvPr>
@@ -16488,6 +18815,45 @@
           </a:graphicData>
         </a:graphic>
       </p:graphicFrame>
+      <p:sp>
+        <p:nvSpPr>
+          <p:cNvPr id="3" name="Fußzeilenplatzhalter 2">
+            <a:extLst>
+              <a:ext uri="{FF2B5EF4-FFF2-40B4-BE49-F238E27FC236}">
+                <a16:creationId xmlns:a16="http://schemas.microsoft.com/office/drawing/2014/main" id="{4CBEDA6A-7B17-4DF3-B548-096CFBE541CD}"/>
+              </a:ext>
+            </a:extLst>
+          </p:cNvPr>
+          <p:cNvSpPr>
+            <a:spLocks noGrp="1"/>
+          </p:cNvSpPr>
+          <p:nvPr>
+            <p:ph type="ftr" sz="quarter" idx="11"/>
+          </p:nvPr>
+        </p:nvSpPr>
+        <p:spPr/>
+        <p:txBody>
+          <a:bodyPr/>
+          <a:lstStyle/>
+          <a:p>
+            <a:r>
+              <a:rPr lang="en-US" dirty="0">
+                <a:latin typeface="Avenir Next LT Pro Light" panose="020B0304020202020204" pitchFamily="34" charset="0"/>
+              </a:rPr>
+              <a:t>1. </a:t>
+            </a:r>
+            <a:r>
+              <a:rPr lang="en-US" dirty="0" err="1">
+                <a:latin typeface="Avenir Next LT Pro Light" panose="020B0304020202020204" pitchFamily="34" charset="0"/>
+              </a:rPr>
+              <a:t>Lernrunde</a:t>
+            </a:r>
+            <a:endParaRPr lang="en-US" dirty="0">
+              <a:latin typeface="Avenir Next LT Pro Light" panose="020B0304020202020204" pitchFamily="34" charset="0"/>
+            </a:endParaRPr>
+          </a:p>
+        </p:txBody>
+      </p:sp>
     </p:spTree>
     <p:extLst>
       <p:ext uri="{BB962C8B-B14F-4D97-AF65-F5344CB8AC3E}">
@@ -16501,7 +18867,7 @@
 </p:sld>
 </file>
 
-<file path=ppt/slides/slide3.xml><?xml version="1.0" encoding="utf-8"?>
+<file path=ppt/slides/slide4.xml><?xml version="1.0" encoding="utf-8"?>
 <p:sld xmlns:a="http://schemas.openxmlformats.org/drawingml/2006/main" xmlns:r="http://schemas.openxmlformats.org/officeDocument/2006/relationships" xmlns:p="http://schemas.openxmlformats.org/presentationml/2006/main">
   <p:cSld>
     <p:bg>
@@ -16599,6 +18965,48 @@
           </a:graphicData>
         </a:graphic>
       </p:graphicFrame>
+      <p:sp>
+        <p:nvSpPr>
+          <p:cNvPr id="4" name="Fußzeilenplatzhalter 2">
+            <a:extLst>
+              <a:ext uri="{FF2B5EF4-FFF2-40B4-BE49-F238E27FC236}">
+                <a16:creationId xmlns:a16="http://schemas.microsoft.com/office/drawing/2014/main" id="{D2FFF515-5D81-4DAA-B2A5-0EA16D7E6FDC}"/>
+              </a:ext>
+            </a:extLst>
+          </p:cNvPr>
+          <p:cNvSpPr>
+            <a:spLocks noGrp="1"/>
+          </p:cNvSpPr>
+          <p:nvPr>
+            <p:ph type="ftr" sz="quarter" idx="11"/>
+          </p:nvPr>
+        </p:nvSpPr>
+        <p:spPr>
+          <a:xfrm>
+            <a:off x="4038600" y="6356350"/>
+            <a:ext cx="4114800" cy="365125"/>
+          </a:xfrm>
+        </p:spPr>
+        <p:txBody>
+          <a:bodyPr/>
+          <a:lstStyle/>
+          <a:p>
+            <a:r>
+              <a:rPr lang="en-US" dirty="0"/>
+              <a:t>1. </a:t>
+            </a:r>
+            <a:r>
+              <a:rPr lang="en-US" dirty="0" err="1">
+                <a:latin typeface="Avenir Next LT Pro Light" panose="020B0304020202020204" pitchFamily="34" charset="0"/>
+              </a:rPr>
+              <a:t>Lernrunde</a:t>
+            </a:r>
+            <a:endParaRPr lang="en-US" dirty="0">
+              <a:latin typeface="Avenir Next LT Pro Light" panose="020B0304020202020204" pitchFamily="34" charset="0"/>
+            </a:endParaRPr>
+          </a:p>
+        </p:txBody>
+      </p:sp>
     </p:spTree>
     <p:extLst>
       <p:ext uri="{BB962C8B-B14F-4D97-AF65-F5344CB8AC3E}">
@@ -16612,7 +19020,7 @@
 </p:sld>
 </file>
 
-<file path=ppt/slides/slide4.xml><?xml version="1.0" encoding="utf-8"?>
+<file path=ppt/slides/slide5.xml><?xml version="1.0" encoding="utf-8"?>
 <p:sld xmlns:a="http://schemas.openxmlformats.org/drawingml/2006/main" xmlns:r="http://schemas.openxmlformats.org/officeDocument/2006/relationships" xmlns:p="http://schemas.openxmlformats.org/presentationml/2006/main">
   <p:cSld>
     <p:bg>
@@ -16711,6 +19119,48 @@
           </a:prstGeom>
         </p:spPr>
       </p:pic>
+      <p:sp>
+        <p:nvSpPr>
+          <p:cNvPr id="5" name="Fußzeilenplatzhalter 2">
+            <a:extLst>
+              <a:ext uri="{FF2B5EF4-FFF2-40B4-BE49-F238E27FC236}">
+                <a16:creationId xmlns:a16="http://schemas.microsoft.com/office/drawing/2014/main" id="{66C5AF25-D887-4956-845C-7F5B55A1BE57}"/>
+              </a:ext>
+            </a:extLst>
+          </p:cNvPr>
+          <p:cNvSpPr>
+            <a:spLocks noGrp="1"/>
+          </p:cNvSpPr>
+          <p:nvPr>
+            <p:ph type="ftr" sz="quarter" idx="11"/>
+          </p:nvPr>
+        </p:nvSpPr>
+        <p:spPr>
+          <a:xfrm>
+            <a:off x="4038600" y="6356350"/>
+            <a:ext cx="4114800" cy="365125"/>
+          </a:xfrm>
+        </p:spPr>
+        <p:txBody>
+          <a:bodyPr/>
+          <a:lstStyle/>
+          <a:p>
+            <a:r>
+              <a:rPr lang="en-US" dirty="0"/>
+              <a:t>1. </a:t>
+            </a:r>
+            <a:r>
+              <a:rPr lang="en-US" dirty="0" err="1">
+                <a:latin typeface="Avenir Next LT Pro Light" panose="020B0304020202020204" pitchFamily="34" charset="0"/>
+              </a:rPr>
+              <a:t>Lernrunde</a:t>
+            </a:r>
+            <a:endParaRPr lang="en-US" dirty="0">
+              <a:latin typeface="Avenir Next LT Pro Light" panose="020B0304020202020204" pitchFamily="34" charset="0"/>
+            </a:endParaRPr>
+          </a:p>
+        </p:txBody>
+      </p:sp>
     </p:spTree>
     <p:extLst>
       <p:ext uri="{BB962C8B-B14F-4D97-AF65-F5344CB8AC3E}">
@@ -16859,7 +19309,7 @@
 </p:sld>
 </file>
 
-<file path=ppt/slides/slide5.xml><?xml version="1.0" encoding="utf-8"?>
+<file path=ppt/slides/slide6.xml><?xml version="1.0" encoding="utf-8"?>
 <p:sld xmlns:a="http://schemas.openxmlformats.org/drawingml/2006/main" xmlns:r="http://schemas.openxmlformats.org/officeDocument/2006/relationships" xmlns:p="http://schemas.openxmlformats.org/presentationml/2006/main">
   <p:cSld>
     <p:bg>
@@ -16999,6 +19449,48 @@
           </a:p>
         </p:txBody>
       </p:sp>
+      <p:sp>
+        <p:nvSpPr>
+          <p:cNvPr id="6" name="Fußzeilenplatzhalter 2">
+            <a:extLst>
+              <a:ext uri="{FF2B5EF4-FFF2-40B4-BE49-F238E27FC236}">
+                <a16:creationId xmlns:a16="http://schemas.microsoft.com/office/drawing/2014/main" id="{9767B125-3A31-49E3-BEC3-F7FC8BE34BD2}"/>
+              </a:ext>
+            </a:extLst>
+          </p:cNvPr>
+          <p:cNvSpPr>
+            <a:spLocks noGrp="1"/>
+          </p:cNvSpPr>
+          <p:nvPr>
+            <p:ph type="ftr" sz="quarter" idx="11"/>
+          </p:nvPr>
+        </p:nvSpPr>
+        <p:spPr>
+          <a:xfrm>
+            <a:off x="4038600" y="6356350"/>
+            <a:ext cx="4114800" cy="365125"/>
+          </a:xfrm>
+        </p:spPr>
+        <p:txBody>
+          <a:bodyPr/>
+          <a:lstStyle/>
+          <a:p>
+            <a:r>
+              <a:rPr lang="en-US" dirty="0"/>
+              <a:t>1. </a:t>
+            </a:r>
+            <a:r>
+              <a:rPr lang="en-US" dirty="0" err="1">
+                <a:latin typeface="Avenir Next LT Pro Light" panose="020B0304020202020204" pitchFamily="34" charset="0"/>
+              </a:rPr>
+              <a:t>Lernrunde</a:t>
+            </a:r>
+            <a:endParaRPr lang="en-US" dirty="0">
+              <a:latin typeface="Avenir Next LT Pro Light" panose="020B0304020202020204" pitchFamily="34" charset="0"/>
+            </a:endParaRPr>
+          </a:p>
+        </p:txBody>
+      </p:sp>
     </p:spTree>
     <p:extLst>
       <p:ext uri="{BB962C8B-B14F-4D97-AF65-F5344CB8AC3E}">
@@ -17012,7 +19504,7 @@
 </p:sld>
 </file>
 
-<file path=ppt/slides/slide6.xml><?xml version="1.0" encoding="utf-8"?>
+<file path=ppt/slides/slide7.xml><?xml version="1.0" encoding="utf-8"?>
 <p:sld xmlns:a="http://schemas.openxmlformats.org/drawingml/2006/main" xmlns:r="http://schemas.openxmlformats.org/officeDocument/2006/relationships" xmlns:p="http://schemas.openxmlformats.org/presentationml/2006/main">
   <p:cSld>
     <p:bg>
@@ -17096,14 +19588,14 @@
           <p:nvPr>
             <p:extLst>
               <p:ext uri="{D42A27DB-BD31-4B8C-83A1-F6EECF244321}">
-                <p14:modId xmlns:p14="http://schemas.microsoft.com/office/powerpoint/2010/main" val="2531025584"/>
+                <p14:modId xmlns:p14="http://schemas.microsoft.com/office/powerpoint/2010/main" val="3667025719"/>
               </p:ext>
             </p:extLst>
           </p:nvPr>
         </p:nvGraphicFramePr>
         <p:xfrm>
           <a:off x="838200" y="1898861"/>
-          <a:ext cx="10515600" cy="4516120"/>
+          <a:ext cx="10515600" cy="4307840"/>
         </p:xfrm>
         <a:graphic>
           <a:graphicData uri="http://schemas.openxmlformats.org/drawingml/2006/table">
@@ -17222,72 +19714,39 @@
                         <a:defRPr/>
                       </a:pPr>
                       <a:r>
-                        <a:rPr lang="de-DE" sz="1400" dirty="0">
-                          <a:latin typeface="Avenir Next LT Pro Light" panose="020B0304020202020204" pitchFamily="34" charset="0"/>
-                        </a:rPr>
-                        <a:t>1 Vertrag für </a:t>
-                      </a:r>
-                      <a:r>
                         <a:rPr lang="de-DE" sz="1400" b="1" dirty="0">
                           <a:latin typeface="Avenir Next LT Pro Light" panose="020B0304020202020204" pitchFamily="34" charset="0"/>
                         </a:rPr>
-                        <a:t>Domain</a:t>
+                        <a:t>Kein Vertrag – Raspberry Pi</a:t>
                       </a:r>
-                      <a:br>
-                        <a:rPr lang="en-US" sz="1400" dirty="0">
+                    </a:p>
+                    <a:p>
+                      <a:pPr marL="0" marR="0" lvl="0" indent="0" algn="ctr" defTabSz="914400" rtl="0" eaLnBrk="1" fontAlgn="auto" latinLnBrk="0" hangingPunct="1">
+                        <a:lnSpc>
+                          <a:spcPct val="100000"/>
+                        </a:lnSpc>
+                        <a:spcBef>
+                          <a:spcPts val="0"/>
+                        </a:spcBef>
+                        <a:spcAft>
+                          <a:spcPts val="0"/>
+                        </a:spcAft>
+                        <a:buClrTx/>
+                        <a:buSzTx/>
+                        <a:buFontTx/>
+                        <a:buNone/>
+                        <a:tabLst/>
+                        <a:defRPr/>
+                      </a:pPr>
+                      <a:r>
+                        <a:rPr lang="de-DE" sz="1200" b="0" dirty="0">
+                          <a:solidFill>
+                            <a:srgbClr val="FF0000"/>
+                          </a:solidFill>
                           <a:latin typeface="Avenir Next LT Pro Light" panose="020B0304020202020204" pitchFamily="34" charset="0"/>
                         </a:rPr>
-                      </a:br>
-                      <a:r>
-                        <a:rPr lang="en-US" sz="1400" dirty="0">
-                          <a:latin typeface="Avenir Next LT Pro Light" panose="020B0304020202020204" pitchFamily="34" charset="0"/>
-                        </a:rPr>
-                        <a:t>&amp;</a:t>
+                        <a:t>(Website wird nicht im Internet erreichbar sein! Du kannst sie später nicht mehr bearbeiten!)</a:t>
                       </a:r>
-                      <a:br>
-                        <a:rPr lang="en-US" sz="1400" dirty="0">
-                          <a:latin typeface="Avenir Next LT Pro Light" panose="020B0304020202020204" pitchFamily="34" charset="0"/>
-                        </a:rPr>
-                      </a:br>
-                      <a:r>
-                        <a:rPr lang="en-US" sz="1400" dirty="0">
-                          <a:latin typeface="Avenir Next LT Pro Light" panose="020B0304020202020204" pitchFamily="34" charset="0"/>
-                        </a:rPr>
-                        <a:t>1 </a:t>
-                      </a:r>
-                      <a:r>
-                        <a:rPr lang="en-US" sz="1400" dirty="0" err="1">
-                          <a:latin typeface="Avenir Next LT Pro Light" panose="020B0304020202020204" pitchFamily="34" charset="0"/>
-                        </a:rPr>
-                        <a:t>Vertrag</a:t>
-                      </a:r>
-                      <a:r>
-                        <a:rPr lang="en-US" sz="1400" dirty="0">
-                          <a:latin typeface="Avenir Next LT Pro Light" panose="020B0304020202020204" pitchFamily="34" charset="0"/>
-                        </a:rPr>
-                        <a:t> </a:t>
-                      </a:r>
-                      <a:r>
-                        <a:rPr lang="en-US" sz="1400" dirty="0" err="1">
-                          <a:latin typeface="Avenir Next LT Pro Light" panose="020B0304020202020204" pitchFamily="34" charset="0"/>
-                        </a:rPr>
-                        <a:t>für</a:t>
-                      </a:r>
-                      <a:r>
-                        <a:rPr lang="en-US" sz="1400" dirty="0">
-                          <a:latin typeface="Avenir Next LT Pro Light" panose="020B0304020202020204" pitchFamily="34" charset="0"/>
-                        </a:rPr>
-                        <a:t> </a:t>
-                      </a:r>
-                      <a:r>
-                        <a:rPr lang="en-US" sz="1400" b="1" dirty="0">
-                          <a:latin typeface="Avenir Next LT Pro Light" panose="020B0304020202020204" pitchFamily="34" charset="0"/>
-                        </a:rPr>
-                        <a:t>Cloud Server</a:t>
-                      </a:r>
-                      <a:endParaRPr lang="de-DE" sz="1400" b="1" dirty="0">
-                        <a:latin typeface="Avenir Next LT Pro Light" panose="020B0304020202020204" pitchFamily="34" charset="0"/>
-                      </a:endParaRPr>
                     </a:p>
                   </a:txBody>
                   <a:tcPr/>
@@ -17357,10 +19816,10 @@
                     <a:p>
                       <a:pPr algn="ctr"/>
                       <a:r>
-                        <a:rPr lang="de-DE" sz="1400" dirty="0">
+                        <a:rPr lang="de-DE" sz="1400" b="1" dirty="0">
                           <a:latin typeface="Avenir Next LT Pro Light" panose="020B0304020202020204" pitchFamily="34" charset="0"/>
                         </a:rPr>
-                        <a:t>Kein Vertrag</a:t>
+                        <a:t>Kein Vertrag – Lokaler Server</a:t>
                       </a:r>
                       <a:br>
                         <a:rPr lang="de-DE" sz="1400" dirty="0">
@@ -17368,30 +19827,13 @@
                         </a:rPr>
                       </a:br>
                       <a:r>
-                        <a:rPr lang="de-DE" sz="1400" dirty="0">
+                        <a:rPr lang="de-DE" sz="1200" dirty="0">
                           <a:solidFill>
                             <a:srgbClr val="FF0000"/>
                           </a:solidFill>
                           <a:latin typeface="Avenir Next LT Pro Light" panose="020B0304020202020204" pitchFamily="34" charset="0"/>
                         </a:rPr>
-                        <a:t>(Website wird nicht im</a:t>
-                      </a:r>
-                      <a:br>
-                        <a:rPr lang="de-DE" sz="1400" dirty="0">
-                          <a:solidFill>
-                            <a:srgbClr val="FF0000"/>
-                          </a:solidFill>
-                          <a:latin typeface="Avenir Next LT Pro Light" panose="020B0304020202020204" pitchFamily="34" charset="0"/>
-                        </a:rPr>
-                      </a:br>
-                      <a:r>
-                        <a:rPr lang="de-DE" sz="1400" dirty="0">
-                          <a:solidFill>
-                            <a:srgbClr val="FF0000"/>
-                          </a:solidFill>
-                          <a:latin typeface="Avenir Next LT Pro Light" panose="020B0304020202020204" pitchFamily="34" charset="0"/>
-                        </a:rPr>
-                        <a:t>Internet erreichbar sein!)</a:t>
+                        <a:t>(Website wird nicht im Internet erreichbar sein! Allerdings kannst du sie später bearbeiten.)</a:t>
                       </a:r>
                       <a:endParaRPr lang="en-US" sz="1400" dirty="0">
                         <a:solidFill>
@@ -17420,7 +19862,7 @@
                         <a:rPr lang="de-DE" sz="1400" b="1" dirty="0">
                           <a:latin typeface="Avenir Next LT Pro Light" panose="020B0304020202020204" pitchFamily="34" charset="0"/>
                         </a:rPr>
-                        <a:t>2 Verträge</a:t>
+                        <a:t>Kein Vertrag</a:t>
                       </a:r>
                       <a:endParaRPr lang="en-US" sz="1400" b="1" dirty="0">
                         <a:latin typeface="Avenir Next LT Pro Light" panose="020B0304020202020204" pitchFamily="34" charset="0"/>
@@ -17500,7 +19942,7 @@
                         <a:rPr lang="de-DE" sz="1400" b="1" dirty="0">
                           <a:latin typeface="Avenir Next LT Pro Light" panose="020B0304020202020204" pitchFamily="34" charset="0"/>
                         </a:rPr>
-                        <a:t>Domain &amp; Cloud Server</a:t>
+                        <a:t>Lokal auf meinem Raspberry Pi</a:t>
                       </a:r>
                       <a:endParaRPr lang="en-US" sz="1400" b="1" dirty="0">
                         <a:latin typeface="Avenir Next LT Pro Light" panose="020B0304020202020204" pitchFamily="34" charset="0"/>
@@ -17575,18 +20017,7 @@
                         <a:rPr lang="de-DE" sz="1400" dirty="0">
                           <a:latin typeface="Avenir Next LT Pro Light" panose="020B0304020202020204" pitchFamily="34" charset="0"/>
                         </a:rPr>
-                        <a:t>0,42€ / Monat (Domain)</a:t>
-                      </a:r>
-                      <a:br>
-                        <a:rPr lang="de-DE" sz="1400" dirty="0">
-                          <a:latin typeface="Avenir Next LT Pro Light" panose="020B0304020202020204" pitchFamily="34" charset="0"/>
-                        </a:rPr>
-                      </a:br>
-                      <a:r>
-                        <a:rPr lang="de-DE" sz="1400" dirty="0">
-                          <a:latin typeface="Avenir Next LT Pro Light" panose="020B0304020202020204" pitchFamily="34" charset="0"/>
-                        </a:rPr>
-                        <a:t>+ 2,69€ / Monat (Server)</a:t>
+                        <a:t>0€</a:t>
                       </a:r>
                       <a:endParaRPr lang="en-US" sz="1400" dirty="0">
                         <a:latin typeface="Avenir Next LT Pro Light" panose="020B0304020202020204" pitchFamily="34" charset="0"/>
@@ -17605,7 +20036,19 @@
                         <a:rPr lang="de-DE" sz="1400" dirty="0">
                           <a:latin typeface="Avenir Next LT Pro Light" panose="020B0304020202020204" pitchFamily="34" charset="0"/>
                         </a:rPr>
-                        <a:t>1,99€ / Monat</a:t>
+                        <a:t>1,99€ / Monat (</a:t>
+                      </a:r>
+                      <a:r>
+                        <a:rPr lang="de-DE" sz="1400" dirty="0" err="1">
+                          <a:latin typeface="Avenir Next LT Pro Light" panose="020B0304020202020204" pitchFamily="34" charset="0"/>
+                        </a:rPr>
+                        <a:t>Netcup</a:t>
+                      </a:r>
+                      <a:r>
+                        <a:rPr lang="de-DE" sz="1400" dirty="0">
+                          <a:latin typeface="Avenir Next LT Pro Light" panose="020B0304020202020204" pitchFamily="34" charset="0"/>
+                        </a:rPr>
+                        <a:t>)</a:t>
                       </a:r>
                       <a:endParaRPr lang="en-US" sz="1400" dirty="0">
                         <a:latin typeface="Avenir Next LT Pro Light" panose="020B0304020202020204" pitchFamily="34" charset="0"/>
@@ -17668,31 +20111,7 @@
                           <a:ea typeface="+mn-ea"/>
                           <a:cs typeface="+mn-cs"/>
                         </a:rPr>
-                        <a:t>Volle</a:t>
-                      </a:r>
-                      <a:r>
-                        <a:rPr lang="en-US" sz="1400" b="0" i="0" kern="1200" dirty="0">
-                          <a:solidFill>
-                            <a:schemeClr val="dk1"/>
-                          </a:solidFill>
-                          <a:effectLst/>
-                          <a:latin typeface="Avenir Next LT Pro Light" panose="020B0304020202020204" pitchFamily="34" charset="0"/>
-                          <a:ea typeface="+mn-ea"/>
-                          <a:cs typeface="+mn-cs"/>
-                        </a:rPr>
-                        <a:t> </a:t>
-                      </a:r>
-                      <a:r>
-                        <a:rPr lang="en-US" sz="1400" b="0" i="0" kern="1200" dirty="0" err="1">
-                          <a:solidFill>
-                            <a:schemeClr val="dk1"/>
-                          </a:solidFill>
-                          <a:effectLst/>
-                          <a:latin typeface="Avenir Next LT Pro Light" panose="020B0304020202020204" pitchFamily="34" charset="0"/>
-                          <a:ea typeface="+mn-ea"/>
-                          <a:cs typeface="+mn-cs"/>
-                        </a:rPr>
-                        <a:t>Kontrolle</a:t>
+                        <a:t>Kostenlos</a:t>
                       </a:r>
                       <a:endParaRPr lang="en-US" sz="1400" b="0" i="0" kern="1200" dirty="0">
                         <a:solidFill>
@@ -17735,6 +20154,18 @@
                         <a:t>👍 </a:t>
                       </a:r>
                       <a:r>
+                        <a:rPr lang="en-US" sz="1400" b="0" i="0" kern="1200" dirty="0">
+                          <a:solidFill>
+                            <a:schemeClr val="dk1"/>
+                          </a:solidFill>
+                          <a:effectLst/>
+                          <a:latin typeface="Avenir Next LT Pro Light" panose="020B0304020202020204" pitchFamily="34" charset="0"/>
+                          <a:ea typeface="+mn-ea"/>
+                          <a:cs typeface="+mn-cs"/>
+                        </a:rPr>
+                        <a:t>Auch </a:t>
+                      </a:r>
+                      <a:r>
                         <a:rPr lang="en-US" sz="1400" b="0" i="0" kern="1200" dirty="0" err="1">
                           <a:solidFill>
                             <a:schemeClr val="dk1"/>
@@ -17744,7 +20175,7 @@
                           <a:ea typeface="+mn-ea"/>
                           <a:cs typeface="+mn-cs"/>
                         </a:rPr>
-                        <a:t>Vielseitig</a:t>
+                        <a:t>mit</a:t>
                       </a:r>
                       <a:r>
                         <a:rPr lang="en-US" sz="1400" b="0" i="0" kern="1200" dirty="0">
@@ -17768,7 +20199,119 @@
                           <a:ea typeface="+mn-ea"/>
                           <a:cs typeface="+mn-cs"/>
                         </a:rPr>
-                        <a:t>nutzbar</a:t>
+                        <a:t>wenig</a:t>
+                      </a:r>
+                      <a:r>
+                        <a:rPr lang="en-US" sz="1400" b="0" i="0" kern="1200" dirty="0">
+                          <a:solidFill>
+                            <a:schemeClr val="dk1"/>
+                          </a:solidFill>
+                          <a:effectLst/>
+                          <a:latin typeface="Avenir Next LT Pro Light" panose="020B0304020202020204" pitchFamily="34" charset="0"/>
+                          <a:ea typeface="+mn-ea"/>
+                          <a:cs typeface="+mn-cs"/>
+                        </a:rPr>
+                        <a:t> RAM </a:t>
+                      </a:r>
+                      <a:r>
+                        <a:rPr lang="en-US" sz="1400" b="0" i="0" kern="1200" dirty="0" err="1">
+                          <a:solidFill>
+                            <a:schemeClr val="dk1"/>
+                          </a:solidFill>
+                          <a:effectLst/>
+                          <a:latin typeface="Avenir Next LT Pro Light" panose="020B0304020202020204" pitchFamily="34" charset="0"/>
+                          <a:ea typeface="+mn-ea"/>
+                          <a:cs typeface="+mn-cs"/>
+                        </a:rPr>
+                        <a:t>möglich</a:t>
+                      </a:r>
+                      <a:endParaRPr lang="en-US" sz="1400" b="0" i="0" kern="1200" dirty="0">
+                        <a:solidFill>
+                          <a:schemeClr val="dk1"/>
+                        </a:solidFill>
+                        <a:effectLst/>
+                        <a:latin typeface="Avenir Next LT Pro Light" panose="020B0304020202020204" pitchFamily="34" charset="0"/>
+                        <a:ea typeface="+mn-ea"/>
+                        <a:cs typeface="+mn-cs"/>
+                      </a:endParaRPr>
+                    </a:p>
+                    <a:p>
+                      <a:pPr marL="0" marR="0" lvl="0" indent="0" algn="ctr" defTabSz="914400" rtl="0" eaLnBrk="1" fontAlgn="auto" latinLnBrk="0" hangingPunct="1">
+                        <a:lnSpc>
+                          <a:spcPct val="100000"/>
+                        </a:lnSpc>
+                        <a:spcBef>
+                          <a:spcPts val="0"/>
+                        </a:spcBef>
+                        <a:spcAft>
+                          <a:spcPts val="0"/>
+                        </a:spcAft>
+                        <a:buClrTx/>
+                        <a:buSzTx/>
+                        <a:buFontTx/>
+                        <a:buNone/>
+                        <a:tabLst/>
+                        <a:defRPr/>
+                      </a:pPr>
+                      <a:r>
+                        <a:rPr lang="en-US" sz="1400" b="0" i="0" kern="1200" dirty="0">
+                          <a:solidFill>
+                            <a:schemeClr val="dk1"/>
+                          </a:solidFill>
+                          <a:effectLst/>
+                          <a:latin typeface="+mn-lt"/>
+                          <a:ea typeface="+mn-ea"/>
+                          <a:cs typeface="+mn-cs"/>
+                        </a:rPr>
+                        <a:t>👍 </a:t>
+                      </a:r>
+                      <a:r>
+                        <a:rPr lang="en-US" sz="1400" b="0" i="0" kern="1200" dirty="0">
+                          <a:solidFill>
+                            <a:schemeClr val="dk1"/>
+                          </a:solidFill>
+                          <a:effectLst/>
+                          <a:latin typeface="Avenir Next LT Pro Light" panose="020B0304020202020204" pitchFamily="34" charset="0"/>
+                          <a:ea typeface="+mn-ea"/>
+                          <a:cs typeface="+mn-cs"/>
+                        </a:rPr>
+                        <a:t>Start </a:t>
+                      </a:r>
+                      <a:r>
+                        <a:rPr lang="en-US" sz="1400" b="0" i="0" kern="1200" dirty="0" err="1">
+                          <a:solidFill>
+                            <a:schemeClr val="dk1"/>
+                          </a:solidFill>
+                          <a:effectLst/>
+                          <a:latin typeface="Avenir Next LT Pro Light" panose="020B0304020202020204" pitchFamily="34" charset="0"/>
+                          <a:ea typeface="+mn-ea"/>
+                          <a:cs typeface="+mn-cs"/>
+                        </a:rPr>
+                        <a:t>mit</a:t>
+                      </a:r>
+                      <a:r>
+                        <a:rPr lang="en-US" sz="1400" b="0" i="0" kern="1200" dirty="0">
+                          <a:solidFill>
+                            <a:schemeClr val="dk1"/>
+                          </a:solidFill>
+                          <a:effectLst/>
+                          <a:latin typeface="Avenir Next LT Pro Light" panose="020B0304020202020204" pitchFamily="34" charset="0"/>
+                          <a:ea typeface="+mn-ea"/>
+                          <a:cs typeface="+mn-cs"/>
+                        </a:rPr>
+                        <a:t> </a:t>
+                      </a:r>
+                      <a:r>
+                        <a:rPr lang="en-US" sz="1400" b="0" i="0" kern="1200" dirty="0" err="1">
+                          <a:solidFill>
+                            <a:schemeClr val="dk1"/>
+                          </a:solidFill>
+                          <a:effectLst/>
+                          <a:latin typeface="Avenir Next LT Pro Light" panose="020B0304020202020204" pitchFamily="34" charset="0"/>
+                          <a:ea typeface="+mn-ea"/>
+                          <a:cs typeface="+mn-cs"/>
+                        </a:rPr>
+                        <a:t>Webdesign</a:t>
                       </a:r>
                       <a:endParaRPr lang="en-US" sz="1400" b="0" i="0" kern="1200" dirty="0">
                         <a:solidFill>
@@ -17811,7 +20354,7 @@
                           <a:ea typeface="+mn-ea"/>
                           <a:cs typeface="+mn-cs"/>
                         </a:rPr>
-                        <a:t>Viel</a:t>
+                        <a:t>Neues</a:t>
                       </a:r>
                       <a:r>
                         <a:rPr lang="en-US" sz="1400" b="0" i="0" kern="1200" dirty="0">
@@ -17823,7 +20366,7 @@
                           <a:ea typeface="+mn-ea"/>
                           <a:cs typeface="+mn-cs"/>
                         </a:rPr>
-                        <a:t> </a:t>
+                        <a:t> Wissen </a:t>
                       </a:r>
                       <a:r>
                         <a:rPr lang="en-US" sz="1400" b="0" i="0" kern="1200" dirty="0" err="1">
@@ -17835,7 +20378,19 @@
                           <a:ea typeface="+mn-ea"/>
                           <a:cs typeface="+mn-cs"/>
                         </a:rPr>
-                        <a:t>Kontrolle</a:t>
+                        <a:t>über</a:t>
+                      </a:r>
+                      <a:r>
+                        <a:rPr lang="en-US" sz="1400" b="0" i="0" kern="1200" dirty="0">
+                          <a:solidFill>
+                            <a:schemeClr val="dk1"/>
+                          </a:solidFill>
+                          <a:effectLst/>
+                          <a:latin typeface="Avenir Next LT Pro Light" panose="020B0304020202020204" pitchFamily="34" charset="0"/>
+                          <a:ea typeface="+mn-ea"/>
+                          <a:cs typeface="+mn-cs"/>
+                        </a:rPr>
+                        <a:t> Webhosting</a:t>
                       </a:r>
                       <a:endParaRPr lang="en-US" sz="1400" b="0" i="0" kern="1200" dirty="0">
                         <a:solidFill>
@@ -18058,7 +20613,7 @@
                           <a:ea typeface="+mn-ea"/>
                           <a:cs typeface="+mn-cs"/>
                         </a:rPr>
-                        <a:t>kostenlos</a:t>
+                        <a:t>Kostenlos</a:t>
                       </a:r>
                       <a:endParaRPr lang="en-US" sz="1400" b="0" i="0" kern="1200" dirty="0">
                         <a:solidFill>
@@ -18072,6 +20627,30 @@
                     </a:p>
                     <a:p>
                       <a:pPr algn="ctr"/>
+                      <a:r>
+                        <a:rPr lang="en-US" sz="1400" b="0" i="0" kern="1200" dirty="0">
+                          <a:solidFill>
+                            <a:schemeClr val="dk1"/>
+                          </a:solidFill>
+                          <a:effectLst/>
+                          <a:latin typeface="+mn-lt"/>
+                          <a:ea typeface="+mn-ea"/>
+                          <a:cs typeface="+mn-cs"/>
+                        </a:rPr>
+                        <a:t>👍 </a:t>
+                      </a:r>
+                      <a:r>
+                        <a:rPr lang="en-US" sz="1400" b="0" i="0" kern="1200" dirty="0" err="1">
+                          <a:solidFill>
+                            <a:schemeClr val="dk1"/>
+                          </a:solidFill>
+                          <a:effectLst/>
+                          <a:latin typeface="Avenir Next LT Pro Light" panose="020B0304020202020204" pitchFamily="34" charset="0"/>
+                          <a:ea typeface="+mn-ea"/>
+                          <a:cs typeface="+mn-cs"/>
+                        </a:rPr>
+                        <a:t>achhaltig</a:t>
+                      </a:r>
                       <a:endParaRPr lang="en-US" sz="1400" dirty="0">
                         <a:latin typeface="Avenir Next LT Pro Light" panose="020B0304020202020204" pitchFamily="34" charset="0"/>
                       </a:endParaRPr>
@@ -18105,6 +20684,18 @@
                         <a:t>👎 </a:t>
                       </a:r>
                       <a:r>
+                        <a:rPr lang="en-US" sz="1400" b="0" i="0" kern="1200" dirty="0">
+                          <a:solidFill>
+                            <a:schemeClr val="dk1"/>
+                          </a:solidFill>
+                          <a:effectLst/>
+                          <a:latin typeface="Avenir Next LT Pro Light" panose="020B0304020202020204" pitchFamily="34" charset="0"/>
+                          <a:ea typeface="+mn-ea"/>
+                          <a:cs typeface="+mn-cs"/>
+                        </a:rPr>
+                        <a:t>Offline (</a:t>
+                      </a:r>
+                      <a:r>
                         <a:rPr lang="en-US" sz="1400" b="0" i="0" kern="1200" dirty="0" err="1">
                           <a:solidFill>
                             <a:schemeClr val="dk1"/>
@@ -18114,7 +20705,7 @@
                           <a:ea typeface="+mn-ea"/>
                           <a:cs typeface="+mn-cs"/>
                         </a:rPr>
-                        <a:t>Unnötig</a:t>
+                        <a:t>nur</a:t>
                       </a:r>
                       <a:r>
                         <a:rPr lang="en-US" sz="1400" b="0" i="0" kern="1200" dirty="0">
@@ -18138,7 +20729,7 @@
                           <a:ea typeface="+mn-ea"/>
                           <a:cs typeface="+mn-cs"/>
                         </a:rPr>
-                        <a:t>viel</a:t>
+                        <a:t>lokal</a:t>
                       </a:r>
                       <a:r>
                         <a:rPr lang="en-US" sz="1400" b="0" i="0" kern="1200" dirty="0">
@@ -18150,29 +20741,8 @@
                           <a:ea typeface="+mn-ea"/>
                           <a:cs typeface="+mn-cs"/>
                         </a:rPr>
-                        <a:t> </a:t>
+                        <a:t>)</a:t>
                       </a:r>
-                      <a:r>
-                        <a:rPr lang="en-US" sz="1400" b="0" i="0" kern="1200" dirty="0" err="1">
-                          <a:solidFill>
-                            <a:schemeClr val="dk1"/>
-                          </a:solidFill>
-                          <a:effectLst/>
-                          <a:latin typeface="Avenir Next LT Pro Light" panose="020B0304020202020204" pitchFamily="34" charset="0"/>
-                          <a:ea typeface="+mn-ea"/>
-                          <a:cs typeface="+mn-cs"/>
-                        </a:rPr>
-                        <a:t>Kontrolle</a:t>
-                      </a:r>
-                      <a:endParaRPr lang="en-US" sz="1400" b="0" i="0" kern="1200" dirty="0">
-                        <a:solidFill>
-                          <a:schemeClr val="dk1"/>
-                        </a:solidFill>
-                        <a:effectLst/>
-                        <a:latin typeface="Avenir Next LT Pro Light" panose="020B0304020202020204" pitchFamily="34" charset="0"/>
-                        <a:ea typeface="+mn-ea"/>
-                        <a:cs typeface="+mn-cs"/>
-                      </a:endParaRPr>
                     </a:p>
                     <a:p>
                       <a:pPr marL="0" marR="0" lvl="0" indent="0" algn="ctr" defTabSz="914400" rtl="0" eaLnBrk="1" fontAlgn="auto" latinLnBrk="0" hangingPunct="1">
@@ -18214,7 +20784,7 @@
                           <a:ea typeface="+mn-ea"/>
                           <a:cs typeface="+mn-cs"/>
                         </a:rPr>
-                        <a:t>Relativ</a:t>
+                        <a:t>Kein</a:t>
                       </a:r>
                       <a:r>
                         <a:rPr lang="en-US" sz="1400" b="0" i="0" kern="1200" dirty="0">
@@ -18238,17 +20808,44 @@
                           <a:ea typeface="+mn-ea"/>
                           <a:cs typeface="+mn-cs"/>
                         </a:rPr>
-                        <a:t>teuer</a:t>
+                        <a:t>neues</a:t>
                       </a:r>
-                      <a:endParaRPr lang="en-US" sz="1400" b="0" i="0" kern="1200" dirty="0">
-                        <a:solidFill>
-                          <a:schemeClr val="dk1"/>
-                        </a:solidFill>
-                        <a:effectLst/>
-                        <a:latin typeface="Avenir Next LT Pro Light" panose="020B0304020202020204" pitchFamily="34" charset="0"/>
-                        <a:ea typeface="+mn-ea"/>
-                        <a:cs typeface="+mn-cs"/>
-                      </a:endParaRPr>
+                      <a:r>
+                        <a:rPr lang="en-US" sz="1400" b="0" i="0" kern="1200" dirty="0">
+                          <a:solidFill>
+                            <a:schemeClr val="dk1"/>
+                          </a:solidFill>
+                          <a:effectLst/>
+                          <a:latin typeface="Avenir Next LT Pro Light" panose="020B0304020202020204" pitchFamily="34" charset="0"/>
+                          <a:ea typeface="+mn-ea"/>
+                          <a:cs typeface="+mn-cs"/>
+                        </a:rPr>
+                        <a:t> Wissen </a:t>
+                      </a:r>
+                      <a:r>
+                        <a:rPr lang="en-US" sz="1400" b="0" i="0" kern="1200" dirty="0" err="1">
+                          <a:solidFill>
+                            <a:schemeClr val="dk1"/>
+                          </a:solidFill>
+                          <a:effectLst/>
+                          <a:latin typeface="Avenir Next LT Pro Light" panose="020B0304020202020204" pitchFamily="34" charset="0"/>
+                          <a:ea typeface="+mn-ea"/>
+                          <a:cs typeface="+mn-cs"/>
+                        </a:rPr>
+                        <a:t>über</a:t>
+                      </a:r>
+                      <a:r>
+                        <a:rPr lang="en-US" sz="1400" b="0" i="0" kern="1200" dirty="0">
+                          <a:solidFill>
+                            <a:schemeClr val="dk1"/>
+                          </a:solidFill>
+                          <a:effectLst/>
+                          <a:latin typeface="Avenir Next LT Pro Light" panose="020B0304020202020204" pitchFamily="34" charset="0"/>
+                          <a:ea typeface="+mn-ea"/>
+                          <a:cs typeface="+mn-cs"/>
+                        </a:rPr>
+                        <a:t> Webhosting</a:t>
+                      </a:r>
                     </a:p>
                     <a:p>
                       <a:pPr marL="0" marR="0" lvl="0" indent="0" algn="ctr" defTabSz="914400" rtl="0" eaLnBrk="1" fontAlgn="auto" latinLnBrk="0" hangingPunct="1">
@@ -18290,7 +20887,7 @@
                           <a:ea typeface="+mn-ea"/>
                           <a:cs typeface="+mn-cs"/>
                         </a:rPr>
-                        <a:t>Viel</a:t>
+                        <a:t>nicht</a:t>
                       </a:r>
                       <a:r>
                         <a:rPr lang="en-US" sz="1400" b="0" i="0" kern="1200" dirty="0">
@@ -18314,7 +20911,7 @@
                           <a:ea typeface="+mn-ea"/>
                           <a:cs typeface="+mn-cs"/>
                         </a:rPr>
-                        <a:t>manuelle</a:t>
+                        <a:t>nachhaltig</a:t>
                       </a:r>
                       <a:r>
                         <a:rPr lang="en-US" sz="1400" b="0" i="0" kern="1200" dirty="0">
@@ -18326,17 +20923,32 @@
                           <a:ea typeface="+mn-ea"/>
                           <a:cs typeface="+mn-cs"/>
                         </a:rPr>
-                        <a:t> Arbeit</a:t>
+                        <a:t> (Backup </a:t>
                       </a:r>
-                      <a:endParaRPr lang="en-US" sz="1400" b="0" i="0" kern="1200" dirty="0">
-                        <a:solidFill>
-                          <a:schemeClr val="dk1"/>
-                        </a:solidFill>
-                        <a:effectLst/>
-                        <a:latin typeface="+mn-lt"/>
-                        <a:ea typeface="+mn-ea"/>
-                        <a:cs typeface="+mn-cs"/>
-                      </a:endParaRPr>
+                      <a:r>
+                        <a:rPr lang="en-US" sz="1400" b="0" i="0" kern="1200" dirty="0" err="1">
+                          <a:solidFill>
+                            <a:schemeClr val="dk1"/>
+                          </a:solidFill>
+                          <a:effectLst/>
+                          <a:latin typeface="Avenir Next LT Pro Light" panose="020B0304020202020204" pitchFamily="34" charset="0"/>
+                          <a:ea typeface="+mn-ea"/>
+                          <a:cs typeface="+mn-cs"/>
+                        </a:rPr>
+                        <a:t>möglich</a:t>
+                      </a:r>
+                      <a:r>
+                        <a:rPr lang="en-US" sz="1400" b="0" i="0" kern="1200" dirty="0">
+                          <a:solidFill>
+                            <a:schemeClr val="dk1"/>
+                          </a:solidFill>
+                          <a:effectLst/>
+                          <a:latin typeface="Avenir Next LT Pro Light" panose="020B0304020202020204" pitchFamily="34" charset="0"/>
+                          <a:ea typeface="+mn-ea"/>
+                          <a:cs typeface="+mn-cs"/>
+                        </a:rPr>
+                        <a:t>)</a:t>
+                      </a:r>
                     </a:p>
                   </a:txBody>
                   <a:tcPr/>
@@ -18385,7 +20997,55 @@
                           <a:ea typeface="+mn-ea"/>
                           <a:cs typeface="+mn-cs"/>
                         </a:rPr>
-                        <a:t>Keine</a:t>
+                        <a:t>kostenpflichtig</a:t>
+                      </a:r>
+                      <a:r>
+                        <a:rPr lang="en-US" sz="1400" b="0" i="0" kern="1200" dirty="0">
+                          <a:solidFill>
+                            <a:schemeClr val="dk1"/>
+                          </a:solidFill>
+                          <a:effectLst/>
+                          <a:latin typeface="Avenir Next LT Pro Light" panose="020B0304020202020204" pitchFamily="34" charset="0"/>
+                          <a:ea typeface="+mn-ea"/>
+                          <a:cs typeface="+mn-cs"/>
+                        </a:rPr>
+                        <a:t> (</a:t>
+                      </a:r>
+                      <a:r>
+                        <a:rPr lang="en-US" sz="1400" b="0" i="0" kern="1200" dirty="0" err="1">
+                          <a:solidFill>
+                            <a:schemeClr val="dk1"/>
+                          </a:solidFill>
+                          <a:effectLst/>
+                          <a:latin typeface="Avenir Next LT Pro Light" panose="020B0304020202020204" pitchFamily="34" charset="0"/>
+                          <a:ea typeface="+mn-ea"/>
+                          <a:cs typeface="+mn-cs"/>
+                        </a:rPr>
+                        <a:t>aber</a:t>
+                      </a:r>
+                      <a:r>
+                        <a:rPr lang="en-US" sz="1400" b="0" i="0" kern="1200" dirty="0">
+                          <a:solidFill>
+                            <a:schemeClr val="dk1"/>
+                          </a:solidFill>
+                          <a:effectLst/>
+                          <a:latin typeface="Avenir Next LT Pro Light" panose="020B0304020202020204" pitchFamily="34" charset="0"/>
+                          <a:ea typeface="+mn-ea"/>
+                          <a:cs typeface="+mn-cs"/>
+                        </a:rPr>
+                        <a:t> es </a:t>
+                      </a:r>
+                      <a:r>
+                        <a:rPr lang="en-US" sz="1400" b="0" i="0" kern="1200" dirty="0" err="1">
+                          <a:solidFill>
+                            <a:schemeClr val="dk1"/>
+                          </a:solidFill>
+                          <a:effectLst/>
+                          <a:latin typeface="Avenir Next LT Pro Light" panose="020B0304020202020204" pitchFamily="34" charset="0"/>
+                          <a:ea typeface="+mn-ea"/>
+                          <a:cs typeface="+mn-cs"/>
+                        </a:rPr>
+                        <a:t>lohnt</a:t>
                       </a:r>
                       <a:r>
                         <a:rPr lang="en-US" sz="1400" b="0" i="0" kern="1200" dirty="0">
@@ -18409,7 +21069,7 @@
                           <a:ea typeface="+mn-ea"/>
                           <a:cs typeface="+mn-cs"/>
                         </a:rPr>
-                        <a:t>volle</a:t>
+                        <a:t>sich</a:t>
                       </a:r>
                       <a:r>
                         <a:rPr lang="en-US" sz="1400" b="0" i="0" kern="1200" dirty="0">
@@ -18421,29 +21081,8 @@
                           <a:ea typeface="+mn-ea"/>
                           <a:cs typeface="+mn-cs"/>
                         </a:rPr>
-                        <a:t> </a:t>
+                        <a:t>!)</a:t>
                       </a:r>
-                      <a:r>
-                        <a:rPr lang="en-US" sz="1400" b="0" i="0" kern="1200" dirty="0" err="1">
-                          <a:solidFill>
-                            <a:schemeClr val="dk1"/>
-                          </a:solidFill>
-                          <a:effectLst/>
-                          <a:latin typeface="Avenir Next LT Pro Light" panose="020B0304020202020204" pitchFamily="34" charset="0"/>
-                          <a:ea typeface="+mn-ea"/>
-                          <a:cs typeface="+mn-cs"/>
-                        </a:rPr>
-                        <a:t>Kontrolle</a:t>
-                      </a:r>
-                      <a:endParaRPr lang="en-US" sz="1400" b="0" i="0" kern="1200" dirty="0">
-                        <a:solidFill>
-                          <a:schemeClr val="dk1"/>
-                        </a:solidFill>
-                        <a:effectLst/>
-                        <a:latin typeface="Avenir Next LT Pro Light" panose="020B0304020202020204" pitchFamily="34" charset="0"/>
-                        <a:ea typeface="+mn-ea"/>
-                        <a:cs typeface="+mn-cs"/>
-                      </a:endParaRPr>
                     </a:p>
                   </a:txBody>
                   <a:tcPr/>
@@ -18583,7 +21222,7 @@
                           <a:ea typeface="+mn-ea"/>
                           <a:cs typeface="+mn-cs"/>
                         </a:rPr>
-                        <a:t>Aufwendige</a:t>
+                        <a:t>Kein</a:t>
                       </a:r>
                       <a:r>
                         <a:rPr lang="en-US" sz="1400" b="0" i="0" kern="1200" dirty="0">
@@ -18595,7 +21234,55 @@
                           <a:ea typeface="+mn-ea"/>
                           <a:cs typeface="+mn-cs"/>
                         </a:rPr>
-                        <a:t> Installation</a:t>
+                        <a:t> </a:t>
+                      </a:r>
+                      <a:r>
+                        <a:rPr lang="en-US" sz="1400" b="0" i="0" kern="1200" dirty="0" err="1">
+                          <a:solidFill>
+                            <a:schemeClr val="dk1"/>
+                          </a:solidFill>
+                          <a:effectLst/>
+                          <a:latin typeface="Avenir Next LT Pro Light" panose="020B0304020202020204" pitchFamily="34" charset="0"/>
+                          <a:ea typeface="+mn-ea"/>
+                          <a:cs typeface="+mn-cs"/>
+                        </a:rPr>
+                        <a:t>neues</a:t>
+                      </a:r>
+                      <a:r>
+                        <a:rPr lang="en-US" sz="1400" b="0" i="0" kern="1200" dirty="0">
+                          <a:solidFill>
+                            <a:schemeClr val="dk1"/>
+                          </a:solidFill>
+                          <a:effectLst/>
+                          <a:latin typeface="Avenir Next LT Pro Light" panose="020B0304020202020204" pitchFamily="34" charset="0"/>
+                          <a:ea typeface="+mn-ea"/>
+                          <a:cs typeface="+mn-cs"/>
+                        </a:rPr>
+                        <a:t> Wissen </a:t>
+                      </a:r>
+                      <a:r>
+                        <a:rPr lang="en-US" sz="1400" b="0" i="0" kern="1200" dirty="0" err="1">
+                          <a:solidFill>
+                            <a:schemeClr val="dk1"/>
+                          </a:solidFill>
+                          <a:effectLst/>
+                          <a:latin typeface="Avenir Next LT Pro Light" panose="020B0304020202020204" pitchFamily="34" charset="0"/>
+                          <a:ea typeface="+mn-ea"/>
+                          <a:cs typeface="+mn-cs"/>
+                        </a:rPr>
+                        <a:t>über</a:t>
+                      </a:r>
+                      <a:r>
+                        <a:rPr lang="en-US" sz="1400" b="0" i="0" kern="1200" dirty="0">
+                          <a:solidFill>
+                            <a:schemeClr val="dk1"/>
+                          </a:solidFill>
+                          <a:effectLst/>
+                          <a:latin typeface="Avenir Next LT Pro Light" panose="020B0304020202020204" pitchFamily="34" charset="0"/>
+                          <a:ea typeface="+mn-ea"/>
+                          <a:cs typeface="+mn-cs"/>
+                        </a:rPr>
+                        <a:t> Webhosting</a:t>
                       </a:r>
                     </a:p>
                     <a:p>
@@ -18638,17 +21325,20 @@
                           <a:ea typeface="+mn-ea"/>
                           <a:cs typeface="+mn-cs"/>
                         </a:rPr>
-                        <a:t>Fehleranfällig</a:t>
+                        <a:t>Fehleranfällige</a:t>
                       </a:r>
-                      <a:endParaRPr lang="en-US" sz="1400" b="0" i="0" kern="1200" dirty="0">
-                        <a:solidFill>
-                          <a:schemeClr val="dk1"/>
-                        </a:solidFill>
-                        <a:effectLst/>
-                        <a:latin typeface="Avenir Next LT Pro Light" panose="020B0304020202020204" pitchFamily="34" charset="0"/>
-                        <a:ea typeface="+mn-ea"/>
-                        <a:cs typeface="+mn-cs"/>
-                      </a:endParaRPr>
+                      <a:r>
+                        <a:rPr lang="en-US" sz="1400" b="0" i="0" kern="1200" dirty="0">
+                          <a:solidFill>
+                            <a:schemeClr val="dk1"/>
+                          </a:solidFill>
+                          <a:effectLst/>
+                          <a:latin typeface="Avenir Next LT Pro Light" panose="020B0304020202020204" pitchFamily="34" charset="0"/>
+                          <a:ea typeface="+mn-ea"/>
+                          <a:cs typeface="+mn-cs"/>
+                        </a:rPr>
+                        <a:t> Installation</a:t>
+                      </a:r>
                     </a:p>
                   </a:txBody>
                   <a:tcPr/>
@@ -18715,7 +21405,7 @@
                           <a:ea typeface="+mn-ea"/>
                           <a:cs typeface="+mn-cs"/>
                         </a:rPr>
-                        <a:t>(wird hier nicht behandelt)!</a:t>
+                        <a:t>(wird aber lokal simuliert)!</a:t>
                       </a:r>
                       <a:endParaRPr lang="en-US" sz="1400" b="0" i="0" kern="1200" dirty="0">
                         <a:solidFill>
@@ -18786,7 +21476,7 @@
                       <a:r>
                         <a:rPr lang="de-DE" sz="1400" dirty="0">
                           <a:solidFill>
-                            <a:srgbClr val="FFFF00"/>
+                            <a:srgbClr val="FF0000"/>
                           </a:solidFill>
                           <a:latin typeface="Avenir Next LT Pro Light" panose="020B0304020202020204" pitchFamily="34" charset="0"/>
                         </a:rPr>
@@ -18795,7 +21485,7 @@
                       <a:br>
                         <a:rPr lang="de-DE" sz="1400" dirty="0">
                           <a:solidFill>
-                            <a:srgbClr val="FFFF00"/>
+                            <a:srgbClr val="FF0000"/>
                           </a:solidFill>
                           <a:latin typeface="Avenir Next LT Pro Light" panose="020B0304020202020204" pitchFamily="34" charset="0"/>
                         </a:rPr>
@@ -18803,7 +21493,7 @@
                       <a:r>
                         <a:rPr lang="de-DE" sz="1400" dirty="0">
                           <a:solidFill>
-                            <a:srgbClr val="FFFF00"/>
+                            <a:srgbClr val="FF0000"/>
                           </a:solidFill>
                           <a:latin typeface="Avenir Next LT Pro Light" panose="020B0304020202020204" pitchFamily="34" charset="0"/>
                         </a:rPr>
@@ -18811,7 +21501,7 @@
                       </a:r>
                       <a:endParaRPr lang="en-US" sz="1400" dirty="0">
                         <a:solidFill>
-                          <a:srgbClr val="FFFF00"/>
+                          <a:srgbClr val="FF0000"/>
                         </a:solidFill>
                         <a:latin typeface="Avenir Next LT Pro Light" panose="020B0304020202020204" pitchFamily="34" charset="0"/>
                       </a:endParaRPr>
@@ -18829,6 +21519,48 @@
           </a:graphicData>
         </a:graphic>
       </p:graphicFrame>
+      <p:sp>
+        <p:nvSpPr>
+          <p:cNvPr id="4" name="Fußzeilenplatzhalter 2">
+            <a:extLst>
+              <a:ext uri="{FF2B5EF4-FFF2-40B4-BE49-F238E27FC236}">
+                <a16:creationId xmlns:a16="http://schemas.microsoft.com/office/drawing/2014/main" id="{6B8FE236-1696-4DE7-9C5D-D7653ED91418}"/>
+              </a:ext>
+            </a:extLst>
+          </p:cNvPr>
+          <p:cNvSpPr>
+            <a:spLocks noGrp="1"/>
+          </p:cNvSpPr>
+          <p:nvPr>
+            <p:ph type="ftr" sz="quarter" idx="11"/>
+          </p:nvPr>
+        </p:nvSpPr>
+        <p:spPr>
+          <a:xfrm>
+            <a:off x="4038600" y="6356350"/>
+            <a:ext cx="4114800" cy="365125"/>
+          </a:xfrm>
+        </p:spPr>
+        <p:txBody>
+          <a:bodyPr/>
+          <a:lstStyle/>
+          <a:p>
+            <a:r>
+              <a:rPr lang="en-US" dirty="0"/>
+              <a:t>1. </a:t>
+            </a:r>
+            <a:r>
+              <a:rPr lang="en-US" dirty="0" err="1">
+                <a:latin typeface="Avenir Next LT Pro Light" panose="020B0304020202020204" pitchFamily="34" charset="0"/>
+              </a:rPr>
+              <a:t>Lernrunde</a:t>
+            </a:r>
+            <a:endParaRPr lang="en-US" dirty="0">
+              <a:latin typeface="Avenir Next LT Pro Light" panose="020B0304020202020204" pitchFamily="34" charset="0"/>
+            </a:endParaRPr>
+          </a:p>
+        </p:txBody>
+      </p:sp>
     </p:spTree>
     <p:extLst>
       <p:ext uri="{BB962C8B-B14F-4D97-AF65-F5344CB8AC3E}">
@@ -18842,7 +21574,7 @@
 </p:sld>
 </file>
 
-<file path=ppt/slides/slide7.xml><?xml version="1.0" encoding="utf-8"?>
+<file path=ppt/slides/slide8.xml><?xml version="1.0" encoding="utf-8"?>
 <p:sld xmlns:a="http://schemas.openxmlformats.org/drawingml/2006/main" xmlns:r="http://schemas.openxmlformats.org/officeDocument/2006/relationships" xmlns:p="http://schemas.openxmlformats.org/presentationml/2006/main">
   <p:cSld>
     <p:bg>
@@ -18924,7 +21656,7 @@
           <p:nvPr>
             <p:extLst>
               <p:ext uri="{D42A27DB-BD31-4B8C-83A1-F6EECF244321}">
-                <p14:modId xmlns:p14="http://schemas.microsoft.com/office/powerpoint/2010/main" val="2114431789"/>
+                <p14:modId xmlns:p14="http://schemas.microsoft.com/office/powerpoint/2010/main" val="3700645758"/>
               </p:ext>
             </p:extLst>
           </p:nvPr>
@@ -18967,20 +21699,62 @@
         </p:blipFill>
         <p:spPr>
           <a:xfrm>
-            <a:off x="1334348" y="1957494"/>
-            <a:ext cx="1578185" cy="1578185"/>
+            <a:off x="1463077" y="3382920"/>
+            <a:ext cx="1053920" cy="1053920"/>
           </a:xfrm>
           <a:prstGeom prst="rect">
             <a:avLst/>
           </a:prstGeom>
         </p:spPr>
       </p:pic>
+      <p:sp>
+        <p:nvSpPr>
+          <p:cNvPr id="6" name="Fußzeilenplatzhalter 2">
+            <a:extLst>
+              <a:ext uri="{FF2B5EF4-FFF2-40B4-BE49-F238E27FC236}">
+                <a16:creationId xmlns:a16="http://schemas.microsoft.com/office/drawing/2014/main" id="{4F9D422D-9936-4491-8186-D703E58BF9F4}"/>
+              </a:ext>
+            </a:extLst>
+          </p:cNvPr>
+          <p:cNvSpPr>
+            <a:spLocks noGrp="1"/>
+          </p:cNvSpPr>
+          <p:nvPr>
+            <p:ph type="ftr" sz="quarter" idx="11"/>
+          </p:nvPr>
+        </p:nvSpPr>
+        <p:spPr>
+          <a:xfrm>
+            <a:off x="4038600" y="6356350"/>
+            <a:ext cx="4114800" cy="365125"/>
+          </a:xfrm>
+        </p:spPr>
+        <p:txBody>
+          <a:bodyPr/>
+          <a:lstStyle/>
+          <a:p>
+            <a:r>
+              <a:rPr lang="en-US" dirty="0"/>
+              <a:t>1. </a:t>
+            </a:r>
+            <a:r>
+              <a:rPr lang="en-US" dirty="0" err="1">
+                <a:latin typeface="Avenir Next LT Pro Light" panose="020B0304020202020204" pitchFamily="34" charset="0"/>
+              </a:rPr>
+              <a:t>Lernrunde</a:t>
+            </a:r>
+            <a:endParaRPr lang="en-US" dirty="0">
+              <a:latin typeface="Avenir Next LT Pro Light" panose="020B0304020202020204" pitchFamily="34" charset="0"/>
+            </a:endParaRPr>
+          </a:p>
+        </p:txBody>
+      </p:sp>
       <p:pic>
         <p:nvPicPr>
-          <p:cNvPr id="16" name="Grafik 15">
+          <p:cNvPr id="4" name="Grafik 3">
             <a:extLst>
               <a:ext uri="{FF2B5EF4-FFF2-40B4-BE49-F238E27FC236}">
-                <a16:creationId xmlns:a16="http://schemas.microsoft.com/office/drawing/2014/main" id="{8B244281-5A99-448C-9BD7-C65765B2DA3B}"/>
+                <a16:creationId xmlns:a16="http://schemas.microsoft.com/office/drawing/2014/main" id="{40186700-C045-483E-81D4-F711B87A6F38}"/>
               </a:ext>
             </a:extLst>
           </p:cNvPr>
@@ -19003,8 +21777,44 @@
         </p:blipFill>
         <p:spPr>
           <a:xfrm>
-            <a:off x="1334347" y="4287520"/>
-            <a:ext cx="1578185" cy="1578185"/>
+            <a:off x="1490759" y="1852202"/>
+            <a:ext cx="1053920" cy="1053920"/>
+          </a:xfrm>
+          <a:prstGeom prst="rect">
+            <a:avLst/>
+          </a:prstGeom>
+        </p:spPr>
+      </p:pic>
+      <p:pic>
+        <p:nvPicPr>
+          <p:cNvPr id="7" name="Grafik 6">
+            <a:extLst>
+              <a:ext uri="{FF2B5EF4-FFF2-40B4-BE49-F238E27FC236}">
+                <a16:creationId xmlns:a16="http://schemas.microsoft.com/office/drawing/2014/main" id="{060C7C6A-5E82-4FC7-9291-B3D5B6F523E1}"/>
+              </a:ext>
+            </a:extLst>
+          </p:cNvPr>
+          <p:cNvPicPr>
+            <a:picLocks noChangeAspect="1"/>
+          </p:cNvPicPr>
+          <p:nvPr/>
+        </p:nvPicPr>
+        <p:blipFill>
+          <a:blip r:embed="rId9">
+            <a:extLst>
+              <a:ext uri="{28A0092B-C50C-407E-A947-70E740481C1C}">
+                <a14:useLocalDpi xmlns:a14="http://schemas.microsoft.com/office/drawing/2010/main" val="0"/>
+              </a:ext>
+            </a:extLst>
+          </a:blip>
+          <a:stretch>
+            <a:fillRect/>
+          </a:stretch>
+        </p:blipFill>
+        <p:spPr>
+          <a:xfrm>
+            <a:off x="1490759" y="4919654"/>
+            <a:ext cx="1053920" cy="1053920"/>
           </a:xfrm>
           <a:prstGeom prst="rect">
             <a:avLst/>
@@ -19024,7 +21834,7 @@
 </p:sld>
 </file>
 
-<file path=ppt/slides/slide8.xml><?xml version="1.0" encoding="utf-8"?>
+<file path=ppt/slides/slide9.xml><?xml version="1.0" encoding="utf-8"?>
 <p:sld xmlns:a="http://schemas.openxmlformats.org/drawingml/2006/main" xmlns:r="http://schemas.openxmlformats.org/officeDocument/2006/relationships" xmlns:p="http://schemas.openxmlformats.org/presentationml/2006/main">
   <p:cSld>
     <p:bg>
@@ -19188,53 +21998,12 @@
           </a:p>
         </p:txBody>
       </p:sp>
-    </p:spTree>
-    <p:extLst>
-      <p:ext uri="{BB962C8B-B14F-4D97-AF65-F5344CB8AC3E}">
-        <p14:creationId xmlns:p14="http://schemas.microsoft.com/office/powerpoint/2010/main" val="2710880683"/>
-      </p:ext>
-    </p:extLst>
-  </p:cSld>
-  <p:clrMapOvr>
-    <a:masterClrMapping/>
-  </p:clrMapOvr>
-</p:sld>
-</file>
-
-<file path=ppt/slides/slide9.xml><?xml version="1.0" encoding="utf-8"?>
-<p:sld xmlns:a="http://schemas.openxmlformats.org/drawingml/2006/main" xmlns:r="http://schemas.openxmlformats.org/officeDocument/2006/relationships" xmlns:p="http://schemas.openxmlformats.org/presentationml/2006/main">
-  <p:cSld>
-    <p:bg>
-      <p:bgPr>
-        <a:solidFill>
-          <a:schemeClr val="tx1">
-            <a:lumMod val="85000"/>
-            <a:lumOff val="15000"/>
-          </a:schemeClr>
-        </a:solidFill>
-        <a:effectLst/>
-      </p:bgPr>
-    </p:bg>
-    <p:spTree>
-      <p:nvGrpSpPr>
-        <p:cNvPr id="1" name=""/>
-        <p:cNvGrpSpPr/>
-        <p:nvPr/>
-      </p:nvGrpSpPr>
-      <p:grpSpPr>
-        <a:xfrm>
-          <a:off x="0" y="0"/>
-          <a:ext cx="0" cy="0"/>
-          <a:chOff x="0" y="0"/>
-          <a:chExt cx="0" cy="0"/>
-        </a:xfrm>
-      </p:grpSpPr>
       <p:sp>
         <p:nvSpPr>
-          <p:cNvPr id="2" name="Titel 1">
+          <p:cNvPr id="5" name="Fußzeilenplatzhalter 2">
             <a:extLst>
               <a:ext uri="{FF2B5EF4-FFF2-40B4-BE49-F238E27FC236}">
-                <a16:creationId xmlns:a16="http://schemas.microsoft.com/office/drawing/2014/main" id="{2DE3D5A1-87BE-4970-A6BA-E6C1A071C38E}"/>
+                <a16:creationId xmlns:a16="http://schemas.microsoft.com/office/drawing/2014/main" id="{1E30C9DB-038E-4186-A121-EDB4F26B4C4A}"/>
               </a:ext>
             </a:extLst>
           </p:cNvPr>
@@ -19242,124 +22011,30 @@
             <a:spLocks noGrp="1"/>
           </p:cNvSpPr>
           <p:nvPr>
-            <p:ph type="title"/>
+            <p:ph type="ftr" sz="quarter" idx="11"/>
           </p:nvPr>
         </p:nvSpPr>
-        <p:spPr/>
+        <p:spPr>
+          <a:xfrm>
+            <a:off x="4038600" y="6356350"/>
+            <a:ext cx="4114800" cy="365125"/>
+          </a:xfrm>
+        </p:spPr>
         <p:txBody>
           <a:bodyPr/>
           <a:lstStyle/>
           <a:p>
             <a:r>
-              <a:rPr lang="de-DE" dirty="0">
-                <a:solidFill>
-                  <a:schemeClr val="bg1"/>
-                </a:solidFill>
+              <a:rPr lang="en-US" dirty="0"/>
+              <a:t>1. </a:t>
+            </a:r>
+            <a:r>
+              <a:rPr lang="en-US" dirty="0" err="1">
                 <a:latin typeface="Avenir Next LT Pro Light" panose="020B0304020202020204" pitchFamily="34" charset="0"/>
               </a:rPr>
-              <a:t>WordPress Installation</a:t>
+              <a:t>Lernrunde</a:t>
             </a:r>
             <a:endParaRPr lang="en-US" dirty="0">
-              <a:solidFill>
-                <a:schemeClr val="bg1"/>
-              </a:solidFill>
-              <a:latin typeface="Avenir Next LT Pro Light" panose="020B0304020202020204" pitchFamily="34" charset="0"/>
-            </a:endParaRPr>
-          </a:p>
-        </p:txBody>
-      </p:sp>
-      <p:pic>
-        <p:nvPicPr>
-          <p:cNvPr id="9" name="Inhaltsplatzhalter 8" descr="Stoppuhr">
-            <a:extLst>
-              <a:ext uri="{FF2B5EF4-FFF2-40B4-BE49-F238E27FC236}">
-                <a16:creationId xmlns:a16="http://schemas.microsoft.com/office/drawing/2014/main" id="{7A8D0E6D-3D6C-49AD-9331-04BF2478D466}"/>
-              </a:ext>
-            </a:extLst>
-          </p:cNvPr>
-          <p:cNvPicPr>
-            <a:picLocks noGrp="1" noChangeAspect="1"/>
-          </p:cNvPicPr>
-          <p:nvPr>
-            <p:ph idx="1"/>
-          </p:nvPr>
-        </p:nvPicPr>
-        <p:blipFill>
-          <a:blip r:embed="rId2">
-            <a:extLst>
-              <a:ext uri="{28A0092B-C50C-407E-A947-70E740481C1C}">
-                <a14:useLocalDpi xmlns:a14="http://schemas.microsoft.com/office/drawing/2010/main" val="0"/>
-              </a:ext>
-              <a:ext uri="{96DAC541-7B7A-43D3-8B79-37D633B846F1}">
-                <asvg:svgBlip xmlns:asvg="http://schemas.microsoft.com/office/drawing/2016/SVG/main" r:embed="rId3"/>
-              </a:ext>
-            </a:extLst>
-          </a:blip>
-          <a:stretch>
-            <a:fillRect/>
-          </a:stretch>
-        </p:blipFill>
-        <p:spPr>
-          <a:xfrm>
-            <a:off x="838199" y="1690687"/>
-            <a:ext cx="4682067" cy="4682067"/>
-          </a:xfrm>
-        </p:spPr>
-      </p:pic>
-      <p:sp>
-        <p:nvSpPr>
-          <p:cNvPr id="10" name="Textfeld 9">
-            <a:extLst>
-              <a:ext uri="{FF2B5EF4-FFF2-40B4-BE49-F238E27FC236}">
-                <a16:creationId xmlns:a16="http://schemas.microsoft.com/office/drawing/2014/main" id="{0019AF28-98ED-4E61-BCA4-22883C2607D5}"/>
-              </a:ext>
-            </a:extLst>
-          </p:cNvPr>
-          <p:cNvSpPr txBox="1"/>
-          <p:nvPr/>
-        </p:nvSpPr>
-        <p:spPr>
-          <a:xfrm>
-            <a:off x="5520266" y="3381282"/>
-            <a:ext cx="5960533" cy="1323439"/>
-          </a:xfrm>
-          <a:prstGeom prst="rect">
-            <a:avLst/>
-          </a:prstGeom>
-          <a:noFill/>
-        </p:spPr>
-        <p:txBody>
-          <a:bodyPr wrap="square" rtlCol="0">
-            <a:spAutoFit/>
-          </a:bodyPr>
-          <a:lstStyle/>
-          <a:p>
-            <a:pPr algn="ctr"/>
-            <a:r>
-              <a:rPr lang="de-DE" sz="4000" dirty="0">
-                <a:solidFill>
-                  <a:schemeClr val="bg1"/>
-                </a:solidFill>
-                <a:latin typeface="Avenir Next LT Pro Light" panose="020B0304020202020204" pitchFamily="34" charset="0"/>
-              </a:rPr>
-              <a:t>Selbstständiges Arbeiten</a:t>
-            </a:r>
-          </a:p>
-          <a:p>
-            <a:pPr algn="ctr"/>
-            <a:r>
-              <a:rPr lang="de-DE" sz="4000" dirty="0">
-                <a:solidFill>
-                  <a:schemeClr val="bg1"/>
-                </a:solidFill>
-                <a:latin typeface="Avenir Next LT Pro Light" panose="020B0304020202020204" pitchFamily="34" charset="0"/>
-              </a:rPr>
-              <a:t>ca. 15:45 –  16:00</a:t>
-            </a:r>
-            <a:endParaRPr lang="en-US" sz="4000" dirty="0">
-              <a:solidFill>
-                <a:schemeClr val="bg1"/>
-              </a:solidFill>
               <a:latin typeface="Avenir Next LT Pro Light" panose="020B0304020202020204" pitchFamily="34" charset="0"/>
             </a:endParaRPr>
           </a:p>
@@ -19368,7 +22043,7 @@
     </p:spTree>
     <p:extLst>
       <p:ext uri="{BB962C8B-B14F-4D97-AF65-F5344CB8AC3E}">
-        <p14:creationId xmlns:p14="http://schemas.microsoft.com/office/powerpoint/2010/main" val="3449857767"/>
+        <p14:creationId xmlns:p14="http://schemas.microsoft.com/office/powerpoint/2010/main" val="2710880683"/>
       </p:ext>
     </p:extLst>
   </p:cSld>
@@ -19671,4 +22346,299 @@
     </a:ext>
   </a:extLst>
 </a:theme>
+</file>
+
+<file path=ppt/theme/theme2.xml><?xml version="1.0" encoding="utf-8"?>
+<a:theme xmlns:a="http://schemas.openxmlformats.org/drawingml/2006/main" name="Office">
+  <a:themeElements>
+    <a:clrScheme name="Office">
+      <a:dk1>
+        <a:sysClr val="windowText" lastClr="000000"/>
+      </a:dk1>
+      <a:lt1>
+        <a:sysClr val="window" lastClr="FFFFFF"/>
+      </a:lt1>
+      <a:dk2>
+        <a:srgbClr val="44546A"/>
+      </a:dk2>
+      <a:lt2>
+        <a:srgbClr val="E7E6E6"/>
+      </a:lt2>
+      <a:accent1>
+        <a:srgbClr val="4472C4"/>
+      </a:accent1>
+      <a:accent2>
+        <a:srgbClr val="ED7D31"/>
+      </a:accent2>
+      <a:accent3>
+        <a:srgbClr val="A5A5A5"/>
+      </a:accent3>
+      <a:accent4>
+        <a:srgbClr val="FFC000"/>
+      </a:accent4>
+      <a:accent5>
+        <a:srgbClr val="5B9BD5"/>
+      </a:accent5>
+      <a:accent6>
+        <a:srgbClr val="70AD47"/>
+      </a:accent6>
+      <a:hlink>
+        <a:srgbClr val="0563C1"/>
+      </a:hlink>
+      <a:folHlink>
+        <a:srgbClr val="954F72"/>
+      </a:folHlink>
+    </a:clrScheme>
+    <a:fontScheme name="Office">
+      <a:majorFont>
+        <a:latin typeface="Calibri Light" panose="020F0302020204030204"/>
+        <a:ea typeface=""/>
+        <a:cs typeface=""/>
+        <a:font script="Jpan" typeface="游ゴシック Light"/>
+        <a:font script="Hang" typeface="맑은 고딕"/>
+        <a:font script="Hans" typeface="等线 Light"/>
+        <a:font script="Hant" typeface="新細明體"/>
+        <a:font script="Arab" typeface="Times New Roman"/>
+        <a:font script="Hebr" typeface="Times New Roman"/>
+        <a:font script="Thai" typeface="Angsana New"/>
+        <a:font script="Ethi" typeface="Nyala"/>
+        <a:font script="Beng" typeface="Vrinda"/>
+        <a:font script="Gujr" typeface="Shruti"/>
+        <a:font script="Khmr" typeface="MoolBoran"/>
+        <a:font script="Knda" typeface="Tunga"/>
+        <a:font script="Guru" typeface="Raavi"/>
+        <a:font script="Cans" typeface="Euphemia"/>
+        <a:font script="Cher" typeface="Plantagenet Cherokee"/>
+        <a:font script="Yiii" typeface="Microsoft Yi Baiti"/>
+        <a:font script="Tibt" typeface="Microsoft Himalaya"/>
+        <a:font script="Thaa" typeface="MV Boli"/>
+        <a:font script="Deva" typeface="Mangal"/>
+        <a:font script="Telu" typeface="Gautami"/>
+        <a:font script="Taml" typeface="Latha"/>
+        <a:font script="Syrc" typeface="Estrangelo Edessa"/>
+        <a:font script="Orya" typeface="Kalinga"/>
+        <a:font script="Mlym" typeface="Kartika"/>
+        <a:font script="Laoo" typeface="DokChampa"/>
+        <a:font script="Sinh" typeface="Iskoola Pota"/>
+        <a:font script="Mong" typeface="Mongolian Baiti"/>
+        <a:font script="Viet" typeface="Times New Roman"/>
+        <a:font script="Uigh" typeface="Microsoft Uighur"/>
+        <a:font script="Geor" typeface="Sylfaen"/>
+        <a:font script="Armn" typeface="Arial"/>
+        <a:font script="Bugi" typeface="Leelawadee UI"/>
+        <a:font script="Bopo" typeface="Microsoft JhengHei"/>
+        <a:font script="Java" typeface="Javanese Text"/>
+        <a:font script="Lisu" typeface="Segoe UI"/>
+        <a:font script="Mymr" typeface="Myanmar Text"/>
+        <a:font script="Nkoo" typeface="Ebrima"/>
+        <a:font script="Olck" typeface="Nirmala UI"/>
+        <a:font script="Osma" typeface="Ebrima"/>
+        <a:font script="Phag" typeface="Phagspa"/>
+        <a:font script="Syrn" typeface="Estrangelo Edessa"/>
+        <a:font script="Syrj" typeface="Estrangelo Edessa"/>
+        <a:font script="Syre" typeface="Estrangelo Edessa"/>
+        <a:font script="Sora" typeface="Nirmala UI"/>
+        <a:font script="Tale" typeface="Microsoft Tai Le"/>
+        <a:font script="Talu" typeface="Microsoft New Tai Lue"/>
+        <a:font script="Tfng" typeface="Ebrima"/>
+      </a:majorFont>
+      <a:minorFont>
+        <a:latin typeface="Calibri" panose="020F0502020204030204"/>
+        <a:ea typeface=""/>
+        <a:cs typeface=""/>
+        <a:font script="Jpan" typeface="游ゴシック"/>
+        <a:font script="Hang" typeface="맑은 고딕"/>
+        <a:font script="Hans" typeface="等线"/>
+        <a:font script="Hant" typeface="新細明體"/>
+        <a:font script="Arab" typeface="Arial"/>
+        <a:font script="Hebr" typeface="Arial"/>
+        <a:font script="Thai" typeface="Cordia New"/>
+        <a:font script="Ethi" typeface="Nyala"/>
+        <a:font script="Beng" typeface="Vrinda"/>
+        <a:font script="Gujr" typeface="Shruti"/>
+        <a:font script="Khmr" typeface="DaunPenh"/>
+        <a:font script="Knda" typeface="Tunga"/>
+        <a:font script="Guru" typeface="Raavi"/>
+        <a:font script="Cans" typeface="Euphemia"/>
+        <a:font script="Cher" typeface="Plantagenet Cherokee"/>
+        <a:font script="Yiii" typeface="Microsoft Yi Baiti"/>
+        <a:font script="Tibt" typeface="Microsoft Himalaya"/>
+        <a:font script="Thaa" typeface="MV Boli"/>
+        <a:font script="Deva" typeface="Mangal"/>
+        <a:font script="Telu" typeface="Gautami"/>
+        <a:font script="Taml" typeface="Latha"/>
+        <a:font script="Syrc" typeface="Estrangelo Edessa"/>
+        <a:font script="Orya" typeface="Kalinga"/>
+        <a:font script="Mlym" typeface="Kartika"/>
+        <a:font script="Laoo" typeface="DokChampa"/>
+        <a:font script="Sinh" typeface="Iskoola Pota"/>
+        <a:font script="Mong" typeface="Mongolian Baiti"/>
+        <a:font script="Viet" typeface="Arial"/>
+        <a:font script="Uigh" typeface="Microsoft Uighur"/>
+        <a:font script="Geor" typeface="Sylfaen"/>
+        <a:font script="Armn" typeface="Arial"/>
+        <a:font script="Bugi" typeface="Leelawadee UI"/>
+        <a:font script="Bopo" typeface="Microsoft JhengHei"/>
+        <a:font script="Java" typeface="Javanese Text"/>
+        <a:font script="Lisu" typeface="Segoe UI"/>
+        <a:font script="Mymr" typeface="Myanmar Text"/>
+        <a:font script="Nkoo" typeface="Ebrima"/>
+        <a:font script="Olck" typeface="Nirmala UI"/>
+        <a:font script="Osma" typeface="Ebrima"/>
+        <a:font script="Phag" typeface="Phagspa"/>
+        <a:font script="Syrn" typeface="Estrangelo Edessa"/>
+        <a:font script="Syrj" typeface="Estrangelo Edessa"/>
+        <a:font script="Syre" typeface="Estrangelo Edessa"/>
+        <a:font script="Sora" typeface="Nirmala UI"/>
+        <a:font script="Tale" typeface="Microsoft Tai Le"/>
+        <a:font script="Talu" typeface="Microsoft New Tai Lue"/>
+        <a:font script="Tfng" typeface="Ebrima"/>
+      </a:minorFont>
+    </a:fontScheme>
+    <a:fmtScheme name="Office">
+      <a:fillStyleLst>
+        <a:solidFill>
+          <a:schemeClr val="phClr"/>
+        </a:solidFill>
+        <a:gradFill rotWithShape="1">
+          <a:gsLst>
+            <a:gs pos="0">
+              <a:schemeClr val="phClr">
+                <a:lumMod val="110000"/>
+                <a:satMod val="105000"/>
+                <a:tint val="67000"/>
+              </a:schemeClr>
+            </a:gs>
+            <a:gs pos="50000">
+              <a:schemeClr val="phClr">
+                <a:lumMod val="105000"/>
+                <a:satMod val="103000"/>
+                <a:tint val="73000"/>
+              </a:schemeClr>
+            </a:gs>
+            <a:gs pos="100000">
+              <a:schemeClr val="phClr">
+                <a:lumMod val="105000"/>
+                <a:satMod val="109000"/>
+                <a:tint val="81000"/>
+              </a:schemeClr>
+            </a:gs>
+          </a:gsLst>
+          <a:lin ang="5400000" scaled="0"/>
+        </a:gradFill>
+        <a:gradFill rotWithShape="1">
+          <a:gsLst>
+            <a:gs pos="0">
+              <a:schemeClr val="phClr">
+                <a:satMod val="103000"/>
+                <a:lumMod val="102000"/>
+                <a:tint val="94000"/>
+              </a:schemeClr>
+            </a:gs>
+            <a:gs pos="50000">
+              <a:schemeClr val="phClr">
+                <a:satMod val="110000"/>
+                <a:lumMod val="100000"/>
+                <a:shade val="100000"/>
+              </a:schemeClr>
+            </a:gs>
+            <a:gs pos="100000">
+              <a:schemeClr val="phClr">
+                <a:lumMod val="99000"/>
+                <a:satMod val="120000"/>
+                <a:shade val="78000"/>
+              </a:schemeClr>
+            </a:gs>
+          </a:gsLst>
+          <a:lin ang="5400000" scaled="0"/>
+        </a:gradFill>
+      </a:fillStyleLst>
+      <a:lnStyleLst>
+        <a:ln w="6350" cap="flat" cmpd="sng" algn="ctr">
+          <a:solidFill>
+            <a:schemeClr val="phClr"/>
+          </a:solidFill>
+          <a:prstDash val="solid"/>
+          <a:miter lim="800000"/>
+        </a:ln>
+        <a:ln w="12700" cap="flat" cmpd="sng" algn="ctr">
+          <a:solidFill>
+            <a:schemeClr val="phClr"/>
+          </a:solidFill>
+          <a:prstDash val="solid"/>
+          <a:miter lim="800000"/>
+        </a:ln>
+        <a:ln w="19050" cap="flat" cmpd="sng" algn="ctr">
+          <a:solidFill>
+            <a:schemeClr val="phClr"/>
+          </a:solidFill>
+          <a:prstDash val="solid"/>
+          <a:miter lim="800000"/>
+        </a:ln>
+      </a:lnStyleLst>
+      <a:effectStyleLst>
+        <a:effectStyle>
+          <a:effectLst/>
+        </a:effectStyle>
+        <a:effectStyle>
+          <a:effectLst/>
+        </a:effectStyle>
+        <a:effectStyle>
+          <a:effectLst>
+            <a:outerShdw blurRad="57150" dist="19050" dir="5400000" algn="ctr" rotWithShape="0">
+              <a:srgbClr val="000000">
+                <a:alpha val="63000"/>
+              </a:srgbClr>
+            </a:outerShdw>
+          </a:effectLst>
+        </a:effectStyle>
+      </a:effectStyleLst>
+      <a:bgFillStyleLst>
+        <a:solidFill>
+          <a:schemeClr val="phClr"/>
+        </a:solidFill>
+        <a:solidFill>
+          <a:schemeClr val="phClr">
+            <a:tint val="95000"/>
+            <a:satMod val="170000"/>
+          </a:schemeClr>
+        </a:solidFill>
+        <a:gradFill rotWithShape="1">
+          <a:gsLst>
+            <a:gs pos="0">
+              <a:schemeClr val="phClr">
+                <a:tint val="93000"/>
+                <a:satMod val="150000"/>
+                <a:shade val="98000"/>
+                <a:lumMod val="102000"/>
+              </a:schemeClr>
+            </a:gs>
+            <a:gs pos="50000">
+              <a:schemeClr val="phClr">
+                <a:tint val="98000"/>
+                <a:satMod val="130000"/>
+                <a:shade val="90000"/>
+                <a:lumMod val="103000"/>
+              </a:schemeClr>
+            </a:gs>
+            <a:gs pos="100000">
+              <a:schemeClr val="phClr">
+                <a:shade val="63000"/>
+                <a:satMod val="120000"/>
+              </a:schemeClr>
+            </a:gs>
+          </a:gsLst>
+          <a:lin ang="5400000" scaled="0"/>
+        </a:gradFill>
+      </a:bgFillStyleLst>
+    </a:fmtScheme>
+  </a:themeElements>
+  <a:objectDefaults/>
+  <a:extraClrSchemeLst/>
+  <a:extLst>
+    <a:ext uri="{05A4C25C-085E-4340-85A3-A5531E510DB2}">
+      <thm15:themeFamily xmlns:thm15="http://schemas.microsoft.com/office/thememl/2012/main" name="Office Theme" id="{62F939B6-93AF-4DB8-9C6B-D6C7DFDC589F}" vid="{4A3C46E8-61CC-4603-A589-7422A47A8E4A}"/>
+    </a:ext>
+  </a:extLst>
+</a:theme>
 </file>
</xml_diff>

<commit_message>
added qr code for feedback mentimeter and finished presentation
</commit_message>
<xml_diff>
--- a/wordpress-portfolio-website-presentation.pptx
+++ b/wordpress-portfolio-website-presentation.pptx
@@ -5,7 +5,7 @@
     <p:sldMasterId id="2147483648" r:id="rId1"/>
   </p:sldMasterIdLst>
   <p:notesMasterIdLst>
-    <p:notesMasterId r:id="rId20"/>
+    <p:notesMasterId r:id="rId24"/>
   </p:notesMasterIdLst>
   <p:sldIdLst>
     <p:sldId id="256" r:id="rId2"/>
@@ -26,6 +26,10 @@
     <p:sldId id="270" r:id="rId17"/>
     <p:sldId id="271" r:id="rId18"/>
     <p:sldId id="274" r:id="rId19"/>
+    <p:sldId id="275" r:id="rId20"/>
+    <p:sldId id="276" r:id="rId21"/>
+    <p:sldId id="277" r:id="rId22"/>
+    <p:sldId id="278" r:id="rId23"/>
   </p:sldIdLst>
   <p:sldSz cx="12192000" cy="6858000"/>
   <p:notesSz cx="6858000" cy="9144000"/>
@@ -17886,8 +17890,8 @@
         </p:nvSpPr>
         <p:spPr>
           <a:xfrm>
-            <a:off x="5520266" y="3677778"/>
-            <a:ext cx="5960533" cy="707886"/>
+            <a:off x="5520266" y="3361799"/>
+            <a:ext cx="5960533" cy="1323439"/>
           </a:xfrm>
           <a:prstGeom prst="rect">
             <a:avLst/>
@@ -17899,6 +17903,18 @@
             <a:spAutoFit/>
           </a:bodyPr>
           <a:lstStyle/>
+          <a:p>
+            <a:pPr algn="ctr"/>
+            <a:r>
+              <a:rPr lang="de-DE" sz="4000" dirty="0">
+                <a:solidFill>
+                  <a:schemeClr val="bg1"/>
+                </a:solidFill>
+                <a:latin typeface="Avenir Next LT Pro Light" panose="020B0304020202020204" pitchFamily="34" charset="0"/>
+              </a:rPr>
+              <a:t>Selbstständiges Arbeiten</a:t>
+            </a:r>
+          </a:p>
           <a:p>
             <a:pPr algn="ctr"/>
             <a:r>
@@ -18402,10 +18418,276 @@
           </a:p>
         </p:txBody>
       </p:sp>
+      <p:sp>
+        <p:nvSpPr>
+          <p:cNvPr id="4" name="Fußzeilenplatzhalter 2">
+            <a:extLst>
+              <a:ext uri="{FF2B5EF4-FFF2-40B4-BE49-F238E27FC236}">
+                <a16:creationId xmlns:a16="http://schemas.microsoft.com/office/drawing/2014/main" id="{CAD0DE26-B128-443D-AAC7-8403BFDBDB73}"/>
+              </a:ext>
+            </a:extLst>
+          </p:cNvPr>
+          <p:cNvSpPr>
+            <a:spLocks noGrp="1"/>
+          </p:cNvSpPr>
+          <p:nvPr>
+            <p:ph type="ftr" sz="quarter" idx="11"/>
+          </p:nvPr>
+        </p:nvSpPr>
+        <p:spPr>
+          <a:xfrm>
+            <a:off x="4038600" y="6356350"/>
+            <a:ext cx="4114800" cy="365125"/>
+          </a:xfrm>
+        </p:spPr>
+        <p:txBody>
+          <a:bodyPr/>
+          <a:lstStyle/>
+          <a:p>
+            <a:r>
+              <a:rPr lang="en-US" dirty="0">
+                <a:latin typeface="Avenir Next LT Pro Light" panose="020B0304020202020204" pitchFamily="34" charset="0"/>
+              </a:rPr>
+              <a:t>3. </a:t>
+            </a:r>
+            <a:r>
+              <a:rPr lang="en-US" dirty="0" err="1">
+                <a:latin typeface="Avenir Next LT Pro Light" panose="020B0304020202020204" pitchFamily="34" charset="0"/>
+              </a:rPr>
+              <a:t>Lernrunde</a:t>
+            </a:r>
+            <a:endParaRPr lang="en-US" dirty="0">
+              <a:latin typeface="Avenir Next LT Pro Light" panose="020B0304020202020204" pitchFamily="34" charset="0"/>
+            </a:endParaRPr>
+          </a:p>
+        </p:txBody>
+      </p:sp>
     </p:spTree>
     <p:extLst>
       <p:ext uri="{BB962C8B-B14F-4D97-AF65-F5344CB8AC3E}">
         <p14:creationId xmlns:p14="http://schemas.microsoft.com/office/powerpoint/2010/main" val="1364027989"/>
+      </p:ext>
+    </p:extLst>
+  </p:cSld>
+  <p:clrMapOvr>
+    <a:masterClrMapping/>
+  </p:clrMapOvr>
+</p:sld>
+</file>
+
+<file path=ppt/slides/slide19.xml><?xml version="1.0" encoding="utf-8"?>
+<p:sld xmlns:a="http://schemas.openxmlformats.org/drawingml/2006/main" xmlns:r="http://schemas.openxmlformats.org/officeDocument/2006/relationships" xmlns:p="http://schemas.openxmlformats.org/presentationml/2006/main">
+  <p:cSld>
+    <p:bg>
+      <p:bgPr>
+        <a:solidFill>
+          <a:schemeClr val="tx1">
+            <a:lumMod val="85000"/>
+            <a:lumOff val="15000"/>
+          </a:schemeClr>
+        </a:solidFill>
+        <a:effectLst/>
+      </p:bgPr>
+    </p:bg>
+    <p:spTree>
+      <p:nvGrpSpPr>
+        <p:cNvPr id="1" name=""/>
+        <p:cNvGrpSpPr/>
+        <p:nvPr/>
+      </p:nvGrpSpPr>
+      <p:grpSpPr>
+        <a:xfrm>
+          <a:off x="0" y="0"/>
+          <a:ext cx="0" cy="0"/>
+          <a:chOff x="0" y="0"/>
+          <a:chExt cx="0" cy="0"/>
+        </a:xfrm>
+      </p:grpSpPr>
+      <p:sp>
+        <p:nvSpPr>
+          <p:cNvPr id="2" name="Titel 1">
+            <a:extLst>
+              <a:ext uri="{FF2B5EF4-FFF2-40B4-BE49-F238E27FC236}">
+                <a16:creationId xmlns:a16="http://schemas.microsoft.com/office/drawing/2014/main" id="{747753E9-46C1-43E7-BF55-1C39C3D2263B}"/>
+              </a:ext>
+            </a:extLst>
+          </p:cNvPr>
+          <p:cNvSpPr>
+            <a:spLocks noGrp="1"/>
+          </p:cNvSpPr>
+          <p:nvPr>
+            <p:ph type="title"/>
+          </p:nvPr>
+        </p:nvSpPr>
+        <p:spPr/>
+        <p:txBody>
+          <a:bodyPr/>
+          <a:lstStyle/>
+          <a:p>
+            <a:r>
+              <a:rPr lang="de-DE" dirty="0">
+                <a:solidFill>
+                  <a:schemeClr val="bg1"/>
+                </a:solidFill>
+                <a:latin typeface="Avenir Next LT Pro Light" panose="020B0304020202020204" pitchFamily="34" charset="0"/>
+              </a:rPr>
+              <a:t>WordPress – Design &amp; Inhalt</a:t>
+            </a:r>
+            <a:endParaRPr lang="en-US" dirty="0">
+              <a:solidFill>
+                <a:schemeClr val="bg1"/>
+              </a:solidFill>
+              <a:latin typeface="Avenir Next LT Pro Light" panose="020B0304020202020204" pitchFamily="34" charset="0"/>
+            </a:endParaRPr>
+          </a:p>
+        </p:txBody>
+      </p:sp>
+      <p:pic>
+        <p:nvPicPr>
+          <p:cNvPr id="4" name="Inhaltsplatzhalter 8" descr="Stoppuhr">
+            <a:extLst>
+              <a:ext uri="{FF2B5EF4-FFF2-40B4-BE49-F238E27FC236}">
+                <a16:creationId xmlns:a16="http://schemas.microsoft.com/office/drawing/2014/main" id="{A7F8691E-369A-483B-9E90-EB30764D8BB1}"/>
+              </a:ext>
+            </a:extLst>
+          </p:cNvPr>
+          <p:cNvPicPr>
+            <a:picLocks noChangeAspect="1"/>
+          </p:cNvPicPr>
+          <p:nvPr/>
+        </p:nvPicPr>
+        <p:blipFill>
+          <a:blip r:embed="rId2">
+            <a:extLst>
+              <a:ext uri="{28A0092B-C50C-407E-A947-70E740481C1C}">
+                <a14:useLocalDpi xmlns:a14="http://schemas.microsoft.com/office/drawing/2010/main" val="0"/>
+              </a:ext>
+              <a:ext uri="{96DAC541-7B7A-43D3-8B79-37D633B846F1}">
+                <asvg:svgBlip xmlns:asvg="http://schemas.microsoft.com/office/drawing/2016/SVG/main" r:embed="rId3"/>
+              </a:ext>
+            </a:extLst>
+          </a:blip>
+          <a:stretch>
+            <a:fillRect/>
+          </a:stretch>
+        </p:blipFill>
+        <p:spPr>
+          <a:xfrm>
+            <a:off x="838199" y="1690687"/>
+            <a:ext cx="4682067" cy="4682067"/>
+          </a:xfrm>
+          <a:prstGeom prst="rect">
+            <a:avLst/>
+          </a:prstGeom>
+        </p:spPr>
+      </p:pic>
+      <p:sp>
+        <p:nvSpPr>
+          <p:cNvPr id="5" name="Textfeld 4">
+            <a:extLst>
+              <a:ext uri="{FF2B5EF4-FFF2-40B4-BE49-F238E27FC236}">
+                <a16:creationId xmlns:a16="http://schemas.microsoft.com/office/drawing/2014/main" id="{0B2772EB-64EC-4DAB-AFEE-457A1C00BCD7}"/>
+              </a:ext>
+            </a:extLst>
+          </p:cNvPr>
+          <p:cNvSpPr txBox="1"/>
+          <p:nvPr/>
+        </p:nvSpPr>
+        <p:spPr>
+          <a:xfrm>
+            <a:off x="5520266" y="3370000"/>
+            <a:ext cx="5960533" cy="1323439"/>
+          </a:xfrm>
+          <a:prstGeom prst="rect">
+            <a:avLst/>
+          </a:prstGeom>
+          <a:noFill/>
+        </p:spPr>
+        <p:txBody>
+          <a:bodyPr wrap="square" rtlCol="0">
+            <a:spAutoFit/>
+          </a:bodyPr>
+          <a:lstStyle/>
+          <a:p>
+            <a:pPr algn="ctr"/>
+            <a:r>
+              <a:rPr lang="de-DE" sz="4000" dirty="0">
+                <a:solidFill>
+                  <a:schemeClr val="bg1"/>
+                </a:solidFill>
+                <a:latin typeface="Avenir Next LT Pro Light" panose="020B0304020202020204" pitchFamily="34" charset="0"/>
+              </a:rPr>
+              <a:t>Selbstständiges Arbeiten</a:t>
+            </a:r>
+          </a:p>
+          <a:p>
+            <a:pPr algn="ctr"/>
+            <a:r>
+              <a:rPr lang="de-DE" sz="4000" dirty="0">
+                <a:solidFill>
+                  <a:schemeClr val="bg1"/>
+                </a:solidFill>
+                <a:latin typeface="Avenir Next LT Pro Light" panose="020B0304020202020204" pitchFamily="34" charset="0"/>
+              </a:rPr>
+              <a:t>ca. 19:00 – 20:30</a:t>
+            </a:r>
+            <a:endParaRPr lang="en-US" sz="4000" dirty="0">
+              <a:solidFill>
+                <a:schemeClr val="bg1"/>
+              </a:solidFill>
+              <a:latin typeface="Avenir Next LT Pro Light" panose="020B0304020202020204" pitchFamily="34" charset="0"/>
+            </a:endParaRPr>
+          </a:p>
+        </p:txBody>
+      </p:sp>
+      <p:sp>
+        <p:nvSpPr>
+          <p:cNvPr id="6" name="Fußzeilenplatzhalter 2">
+            <a:extLst>
+              <a:ext uri="{FF2B5EF4-FFF2-40B4-BE49-F238E27FC236}">
+                <a16:creationId xmlns:a16="http://schemas.microsoft.com/office/drawing/2014/main" id="{AA9316B9-8141-4A01-B907-E5103695CF03}"/>
+              </a:ext>
+            </a:extLst>
+          </p:cNvPr>
+          <p:cNvSpPr>
+            <a:spLocks noGrp="1"/>
+          </p:cNvSpPr>
+          <p:nvPr>
+            <p:ph type="ftr" sz="quarter" idx="11"/>
+          </p:nvPr>
+        </p:nvSpPr>
+        <p:spPr>
+          <a:xfrm>
+            <a:off x="4038600" y="6356350"/>
+            <a:ext cx="4114800" cy="365125"/>
+          </a:xfrm>
+        </p:spPr>
+        <p:txBody>
+          <a:bodyPr/>
+          <a:lstStyle/>
+          <a:p>
+            <a:r>
+              <a:rPr lang="en-US" dirty="0">
+                <a:latin typeface="Avenir Next LT Pro Light" panose="020B0304020202020204" pitchFamily="34" charset="0"/>
+              </a:rPr>
+              <a:t>3. </a:t>
+            </a:r>
+            <a:r>
+              <a:rPr lang="en-US" dirty="0" err="1">
+                <a:latin typeface="Avenir Next LT Pro Light" panose="020B0304020202020204" pitchFamily="34" charset="0"/>
+              </a:rPr>
+              <a:t>Lernrunde</a:t>
+            </a:r>
+            <a:endParaRPr lang="en-US" dirty="0">
+              <a:latin typeface="Avenir Next LT Pro Light" panose="020B0304020202020204" pitchFamily="34" charset="0"/>
+            </a:endParaRPr>
+          </a:p>
+        </p:txBody>
+      </p:sp>
+    </p:spTree>
+    <p:extLst>
+      <p:ext uri="{BB962C8B-B14F-4D97-AF65-F5344CB8AC3E}">
+        <p14:creationId xmlns:p14="http://schemas.microsoft.com/office/powerpoint/2010/main" val="337629317"/>
       </p:ext>
     </p:extLst>
   </p:cSld>
@@ -18708,6 +18990,402 @@
     <p:extLst>
       <p:ext uri="{BB962C8B-B14F-4D97-AF65-F5344CB8AC3E}">
         <p14:creationId xmlns:p14="http://schemas.microsoft.com/office/powerpoint/2010/main" val="3100281767"/>
+      </p:ext>
+    </p:extLst>
+  </p:cSld>
+  <p:clrMapOvr>
+    <a:masterClrMapping/>
+  </p:clrMapOvr>
+</p:sld>
+</file>
+
+<file path=ppt/slides/slide20.xml><?xml version="1.0" encoding="utf-8"?>
+<p:sld xmlns:a="http://schemas.openxmlformats.org/drawingml/2006/main" xmlns:r="http://schemas.openxmlformats.org/officeDocument/2006/relationships" xmlns:p="http://schemas.openxmlformats.org/presentationml/2006/main">
+  <p:cSld>
+    <p:bg>
+      <p:bgPr>
+        <a:solidFill>
+          <a:schemeClr val="tx1">
+            <a:lumMod val="85000"/>
+            <a:lumOff val="15000"/>
+          </a:schemeClr>
+        </a:solidFill>
+        <a:effectLst/>
+      </p:bgPr>
+    </p:bg>
+    <p:spTree>
+      <p:nvGrpSpPr>
+        <p:cNvPr id="1" name=""/>
+        <p:cNvGrpSpPr/>
+        <p:nvPr/>
+      </p:nvGrpSpPr>
+      <p:grpSpPr>
+        <a:xfrm>
+          <a:off x="0" y="0"/>
+          <a:ext cx="0" cy="0"/>
+          <a:chOff x="0" y="0"/>
+          <a:chExt cx="0" cy="0"/>
+        </a:xfrm>
+      </p:grpSpPr>
+      <p:sp>
+        <p:nvSpPr>
+          <p:cNvPr id="2" name="Titel 1">
+            <a:extLst>
+              <a:ext uri="{FF2B5EF4-FFF2-40B4-BE49-F238E27FC236}">
+                <a16:creationId xmlns:a16="http://schemas.microsoft.com/office/drawing/2014/main" id="{747753E9-46C1-43E7-BF55-1C39C3D2263B}"/>
+              </a:ext>
+            </a:extLst>
+          </p:cNvPr>
+          <p:cNvSpPr>
+            <a:spLocks noGrp="1"/>
+          </p:cNvSpPr>
+          <p:nvPr>
+            <p:ph type="title"/>
+          </p:nvPr>
+        </p:nvSpPr>
+        <p:spPr/>
+        <p:txBody>
+          <a:bodyPr/>
+          <a:lstStyle/>
+          <a:p>
+            <a:r>
+              <a:rPr lang="de-DE" dirty="0">
+                <a:solidFill>
+                  <a:schemeClr val="bg1"/>
+                </a:solidFill>
+                <a:latin typeface="Avenir Next LT Pro Light" panose="020B0304020202020204" pitchFamily="34" charset="0"/>
+              </a:rPr>
+              <a:t>Feedback</a:t>
+            </a:r>
+            <a:endParaRPr lang="en-US" dirty="0">
+              <a:solidFill>
+                <a:schemeClr val="bg1"/>
+              </a:solidFill>
+              <a:latin typeface="Avenir Next LT Pro Light" panose="020B0304020202020204" pitchFamily="34" charset="0"/>
+            </a:endParaRPr>
+          </a:p>
+        </p:txBody>
+      </p:sp>
+      <p:pic>
+        <p:nvPicPr>
+          <p:cNvPr id="6" name="Grafik 5">
+            <a:extLst>
+              <a:ext uri="{FF2B5EF4-FFF2-40B4-BE49-F238E27FC236}">
+                <a16:creationId xmlns:a16="http://schemas.microsoft.com/office/drawing/2014/main" id="{3C459384-30EF-4DC7-B1BA-1B79EAF2014D}"/>
+              </a:ext>
+            </a:extLst>
+          </p:cNvPr>
+          <p:cNvPicPr>
+            <a:picLocks noChangeAspect="1"/>
+          </p:cNvPicPr>
+          <p:nvPr/>
+        </p:nvPicPr>
+        <p:blipFill>
+          <a:blip r:embed="rId2">
+            <a:extLst>
+              <a:ext uri="{28A0092B-C50C-407E-A947-70E740481C1C}">
+                <a14:useLocalDpi xmlns:a14="http://schemas.microsoft.com/office/drawing/2010/main" val="0"/>
+              </a:ext>
+            </a:extLst>
+          </a:blip>
+          <a:stretch>
+            <a:fillRect/>
+          </a:stretch>
+        </p:blipFill>
+        <p:spPr>
+          <a:xfrm>
+            <a:off x="3942397" y="1690688"/>
+            <a:ext cx="4307205" cy="4307205"/>
+          </a:xfrm>
+          <a:prstGeom prst="rect">
+            <a:avLst/>
+          </a:prstGeom>
+        </p:spPr>
+      </p:pic>
+    </p:spTree>
+    <p:extLst>
+      <p:ext uri="{BB962C8B-B14F-4D97-AF65-F5344CB8AC3E}">
+        <p14:creationId xmlns:p14="http://schemas.microsoft.com/office/powerpoint/2010/main" val="3096074278"/>
+      </p:ext>
+    </p:extLst>
+  </p:cSld>
+  <p:clrMapOvr>
+    <a:masterClrMapping/>
+  </p:clrMapOvr>
+</p:sld>
+</file>
+
+<file path=ppt/slides/slide21.xml><?xml version="1.0" encoding="utf-8"?>
+<p:sld xmlns:a="http://schemas.openxmlformats.org/drawingml/2006/main" xmlns:r="http://schemas.openxmlformats.org/officeDocument/2006/relationships" xmlns:p="http://schemas.openxmlformats.org/presentationml/2006/main">
+  <p:cSld>
+    <p:bg>
+      <p:bgPr>
+        <a:solidFill>
+          <a:schemeClr val="tx1">
+            <a:lumMod val="85000"/>
+            <a:lumOff val="15000"/>
+          </a:schemeClr>
+        </a:solidFill>
+        <a:effectLst/>
+      </p:bgPr>
+    </p:bg>
+    <p:spTree>
+      <p:nvGrpSpPr>
+        <p:cNvPr id="1" name=""/>
+        <p:cNvGrpSpPr/>
+        <p:nvPr/>
+      </p:nvGrpSpPr>
+      <p:grpSpPr>
+        <a:xfrm>
+          <a:off x="0" y="0"/>
+          <a:ext cx="0" cy="0"/>
+          <a:chOff x="0" y="0"/>
+          <a:chExt cx="0" cy="0"/>
+        </a:xfrm>
+      </p:grpSpPr>
+      <p:sp>
+        <p:nvSpPr>
+          <p:cNvPr id="2" name="Titel 1">
+            <a:extLst>
+              <a:ext uri="{FF2B5EF4-FFF2-40B4-BE49-F238E27FC236}">
+                <a16:creationId xmlns:a16="http://schemas.microsoft.com/office/drawing/2014/main" id="{747753E9-46C1-43E7-BF55-1C39C3D2263B}"/>
+              </a:ext>
+            </a:extLst>
+          </p:cNvPr>
+          <p:cNvSpPr>
+            <a:spLocks noGrp="1"/>
+          </p:cNvSpPr>
+          <p:nvPr>
+            <p:ph type="title"/>
+          </p:nvPr>
+        </p:nvSpPr>
+        <p:spPr>
+          <a:xfrm>
+            <a:off x="838200" y="2766218"/>
+            <a:ext cx="10515600" cy="1325563"/>
+          </a:xfrm>
+        </p:spPr>
+        <p:txBody>
+          <a:bodyPr/>
+          <a:lstStyle/>
+          <a:p>
+            <a:pPr algn="ctr"/>
+            <a:r>
+              <a:rPr lang="de-DE" dirty="0">
+                <a:solidFill>
+                  <a:schemeClr val="bg1"/>
+                </a:solidFill>
+                <a:latin typeface="Avenir Next LT Pro Light" panose="020B0304020202020204" pitchFamily="34" charset="0"/>
+              </a:rPr>
+              <a:t>Ideen für künftige </a:t>
+            </a:r>
+            <a:r>
+              <a:rPr lang="de-DE" dirty="0" err="1">
+                <a:solidFill>
+                  <a:schemeClr val="bg1"/>
+                </a:solidFill>
+                <a:latin typeface="Avenir Next LT Pro Light" panose="020B0304020202020204" pitchFamily="34" charset="0"/>
+              </a:rPr>
+              <a:t>Skill</a:t>
+            </a:r>
+            <a:r>
+              <a:rPr lang="de-DE" dirty="0">
+                <a:solidFill>
+                  <a:schemeClr val="bg1"/>
+                </a:solidFill>
+                <a:latin typeface="Avenir Next LT Pro Light" panose="020B0304020202020204" pitchFamily="34" charset="0"/>
+              </a:rPr>
+              <a:t> </a:t>
+            </a:r>
+            <a:r>
+              <a:rPr lang="de-DE" dirty="0" err="1">
+                <a:solidFill>
+                  <a:schemeClr val="bg1"/>
+                </a:solidFill>
+                <a:latin typeface="Avenir Next LT Pro Light" panose="020B0304020202020204" pitchFamily="34" charset="0"/>
+              </a:rPr>
+              <a:t>Saturdays</a:t>
+            </a:r>
+            <a:endParaRPr lang="en-US" dirty="0">
+              <a:solidFill>
+                <a:schemeClr val="bg1"/>
+              </a:solidFill>
+              <a:latin typeface="Avenir Next LT Pro Light" panose="020B0304020202020204" pitchFamily="34" charset="0"/>
+            </a:endParaRPr>
+          </a:p>
+        </p:txBody>
+      </p:sp>
+    </p:spTree>
+    <p:extLst>
+      <p:ext uri="{BB962C8B-B14F-4D97-AF65-F5344CB8AC3E}">
+        <p14:creationId xmlns:p14="http://schemas.microsoft.com/office/powerpoint/2010/main" val="2794481289"/>
+      </p:ext>
+    </p:extLst>
+  </p:cSld>
+  <p:clrMapOvr>
+    <a:masterClrMapping/>
+  </p:clrMapOvr>
+</p:sld>
+</file>
+
+<file path=ppt/slides/slide22.xml><?xml version="1.0" encoding="utf-8"?>
+<p:sld xmlns:a="http://schemas.openxmlformats.org/drawingml/2006/main" xmlns:r="http://schemas.openxmlformats.org/officeDocument/2006/relationships" xmlns:p="http://schemas.openxmlformats.org/presentationml/2006/main">
+  <p:cSld>
+    <p:bg>
+      <p:bgPr>
+        <a:solidFill>
+          <a:schemeClr val="tx1">
+            <a:lumMod val="85000"/>
+            <a:lumOff val="15000"/>
+          </a:schemeClr>
+        </a:solidFill>
+        <a:effectLst/>
+      </p:bgPr>
+    </p:bg>
+    <p:spTree>
+      <p:nvGrpSpPr>
+        <p:cNvPr id="1" name=""/>
+        <p:cNvGrpSpPr/>
+        <p:nvPr/>
+      </p:nvGrpSpPr>
+      <p:grpSpPr>
+        <a:xfrm>
+          <a:off x="0" y="0"/>
+          <a:ext cx="0" cy="0"/>
+          <a:chOff x="0" y="0"/>
+          <a:chExt cx="0" cy="0"/>
+        </a:xfrm>
+      </p:grpSpPr>
+      <p:sp>
+        <p:nvSpPr>
+          <p:cNvPr id="2" name="Titel 1">
+            <a:extLst>
+              <a:ext uri="{FF2B5EF4-FFF2-40B4-BE49-F238E27FC236}">
+                <a16:creationId xmlns:a16="http://schemas.microsoft.com/office/drawing/2014/main" id="{747753E9-46C1-43E7-BF55-1C39C3D2263B}"/>
+              </a:ext>
+            </a:extLst>
+          </p:cNvPr>
+          <p:cNvSpPr>
+            <a:spLocks noGrp="1"/>
+          </p:cNvSpPr>
+          <p:nvPr>
+            <p:ph type="title"/>
+          </p:nvPr>
+        </p:nvSpPr>
+        <p:spPr>
+          <a:xfrm>
+            <a:off x="838200" y="2766218"/>
+            <a:ext cx="10515600" cy="1325563"/>
+          </a:xfrm>
+        </p:spPr>
+        <p:txBody>
+          <a:bodyPr/>
+          <a:lstStyle/>
+          <a:p>
+            <a:r>
+              <a:rPr lang="de-DE" dirty="0">
+                <a:solidFill>
+                  <a:schemeClr val="bg1"/>
+                </a:solidFill>
+                <a:latin typeface="Avenir Next LT Pro Light" panose="020B0304020202020204" pitchFamily="34" charset="0"/>
+              </a:rPr>
+              <a:t>Danke euch allen! </a:t>
+            </a:r>
+            <a:r>
+              <a:rPr lang="de-DE" dirty="0" err="1">
+                <a:solidFill>
+                  <a:schemeClr val="bg1"/>
+                </a:solidFill>
+                <a:latin typeface="Avenir Next LT Pro Light" panose="020B0304020202020204" pitchFamily="34" charset="0"/>
+              </a:rPr>
+              <a:t>Get</a:t>
+            </a:r>
+            <a:r>
+              <a:rPr lang="de-DE" dirty="0">
+                <a:solidFill>
+                  <a:schemeClr val="bg1"/>
+                </a:solidFill>
+                <a:latin typeface="Avenir Next LT Pro Light" panose="020B0304020202020204" pitchFamily="34" charset="0"/>
+              </a:rPr>
+              <a:t> a </a:t>
+            </a:r>
+            <a:r>
+              <a:rPr lang="de-DE" dirty="0" err="1">
+                <a:solidFill>
+                  <a:schemeClr val="bg1"/>
+                </a:solidFill>
+                <a:latin typeface="Avenir Next LT Pro Light" panose="020B0304020202020204" pitchFamily="34" charset="0"/>
+              </a:rPr>
+              <a:t>drink</a:t>
+            </a:r>
+            <a:r>
+              <a:rPr lang="de-DE" dirty="0">
+                <a:solidFill>
+                  <a:schemeClr val="bg1"/>
+                </a:solidFill>
+                <a:latin typeface="Avenir Next LT Pro Light" panose="020B0304020202020204" pitchFamily="34" charset="0"/>
+              </a:rPr>
+              <a:t> </a:t>
+            </a:r>
+            <a:r>
+              <a:rPr lang="de-DE" dirty="0" err="1">
+                <a:solidFill>
+                  <a:schemeClr val="bg1"/>
+                </a:solidFill>
+                <a:latin typeface="Avenir Next LT Pro Light" panose="020B0304020202020204" pitchFamily="34" charset="0"/>
+              </a:rPr>
+              <a:t>or</a:t>
+            </a:r>
+            <a:r>
+              <a:rPr lang="de-DE" dirty="0">
+                <a:solidFill>
+                  <a:schemeClr val="bg1"/>
+                </a:solidFill>
+                <a:latin typeface="Avenir Next LT Pro Light" panose="020B0304020202020204" pitchFamily="34" charset="0"/>
+              </a:rPr>
+              <a:t> </a:t>
+            </a:r>
+            <a:r>
+              <a:rPr lang="de-DE" dirty="0" err="1">
+                <a:solidFill>
+                  <a:schemeClr val="bg1"/>
+                </a:solidFill>
+                <a:latin typeface="Avenir Next LT Pro Light" panose="020B0304020202020204" pitchFamily="34" charset="0"/>
+              </a:rPr>
+              <a:t>two</a:t>
+            </a:r>
+            <a:r>
+              <a:rPr lang="de-DE" dirty="0">
+                <a:solidFill>
+                  <a:schemeClr val="bg1"/>
+                </a:solidFill>
+                <a:latin typeface="Avenir Next LT Pro Light" panose="020B0304020202020204" pitchFamily="34" charset="0"/>
+              </a:rPr>
+              <a:t> </a:t>
+            </a:r>
+            <a:r>
+              <a:rPr lang="en-US" b="0" i="0" dirty="0">
+                <a:solidFill>
+                  <a:srgbClr val="333333"/>
+                </a:solidFill>
+                <a:effectLst/>
+                <a:latin typeface="Segoe UI Emoji" panose="020B0502040204020203" pitchFamily="34" charset="0"/>
+              </a:rPr>
+              <a:t>😋</a:t>
+            </a:r>
+            <a:endParaRPr lang="en-US" dirty="0">
+              <a:solidFill>
+                <a:schemeClr val="bg1"/>
+              </a:solidFill>
+              <a:latin typeface="Avenir Next LT Pro Light" panose="020B0304020202020204" pitchFamily="34" charset="0"/>
+            </a:endParaRPr>
+          </a:p>
+        </p:txBody>
+      </p:sp>
+    </p:spTree>
+    <p:extLst>
+      <p:ext uri="{BB962C8B-B14F-4D97-AF65-F5344CB8AC3E}">
+        <p14:creationId xmlns:p14="http://schemas.microsoft.com/office/powerpoint/2010/main" val="891544380"/>
       </p:ext>
     </p:extLst>
   </p:cSld>
@@ -19588,13 +20266,13 @@
           <p:nvPr>
             <p:extLst>
               <p:ext uri="{D42A27DB-BD31-4B8C-83A1-F6EECF244321}">
-                <p14:modId xmlns:p14="http://schemas.microsoft.com/office/powerpoint/2010/main" val="3667025719"/>
+                <p14:modId xmlns:p14="http://schemas.microsoft.com/office/powerpoint/2010/main" val="4207091441"/>
               </p:ext>
             </p:extLst>
           </p:nvPr>
         </p:nvGraphicFramePr>
         <p:xfrm>
-          <a:off x="838200" y="1898861"/>
+          <a:off x="838200" y="1690688"/>
           <a:ext cx="10515600" cy="4307840"/>
         </p:xfrm>
         <a:graphic>
@@ -20649,7 +21327,7 @@
                           <a:ea typeface="+mn-ea"/>
                           <a:cs typeface="+mn-cs"/>
                         </a:rPr>
-                        <a:t>achhaltig</a:t>
+                        <a:t>nachhaltig</a:t>
                       </a:r>
                       <a:endParaRPr lang="en-US" sz="1400" dirty="0">
                         <a:latin typeface="Avenir Next LT Pro Light" panose="020B0304020202020204" pitchFamily="34" charset="0"/>

</xml_diff>